<commit_message>
Up to page slide 12.
</commit_message>
<xml_diff>
--- a/slides.pptx
+++ b/slides.pptx
@@ -5,10 +5,21 @@
     <p:sldMasterId id="2147483648" r:id="rId1"/>
   </p:sldMasterIdLst>
   <p:notesMasterIdLst>
-    <p:notesMasterId r:id="rId3"/>
+    <p:notesMasterId r:id="rId14"/>
   </p:notesMasterIdLst>
   <p:sldIdLst>
     <p:sldId id="256" r:id="rId2"/>
+    <p:sldId id="257" r:id="rId3"/>
+    <p:sldId id="273" r:id="rId4"/>
+    <p:sldId id="264" r:id="rId5"/>
+    <p:sldId id="275" r:id="rId6"/>
+    <p:sldId id="276" r:id="rId7"/>
+    <p:sldId id="278" r:id="rId8"/>
+    <p:sldId id="280" r:id="rId9"/>
+    <p:sldId id="281" r:id="rId10"/>
+    <p:sldId id="282" r:id="rId11"/>
+    <p:sldId id="283" r:id="rId12"/>
+    <p:sldId id="284" r:id="rId13"/>
   </p:sldIdLst>
   <p:sldSz cx="9144000" cy="6858000" type="screen4x3"/>
   <p:notesSz cx="6858000" cy="9144000"/>
@@ -489,7 +500,7 @@
         </p:nvSpPr>
         <p:spPr>
           <a:xfrm>
-            <a:off x="685800" y="2130425"/>
+            <a:off x="685800" y="2130426"/>
             <a:ext cx="7772400" cy="1470025"/>
           </a:xfrm>
         </p:spPr>
@@ -901,7 +912,7 @@
         </p:nvSpPr>
         <p:spPr>
           <a:xfrm>
-            <a:off x="6629400" y="274638"/>
+            <a:off x="6629400" y="274639"/>
             <a:ext cx="2057400" cy="5851525"/>
           </a:xfrm>
         </p:spPr>
@@ -929,7 +940,7 @@
         </p:nvSpPr>
         <p:spPr>
           <a:xfrm>
-            <a:off x="457200" y="274638"/>
+            <a:off x="457200" y="274639"/>
             <a:ext cx="6019800" cy="5851525"/>
           </a:xfrm>
         </p:spPr>
@@ -1251,7 +1262,7 @@
         </p:nvSpPr>
         <p:spPr>
           <a:xfrm>
-            <a:off x="722313" y="4406900"/>
+            <a:off x="722313" y="4406901"/>
             <a:ext cx="7772400" cy="1362075"/>
           </a:xfrm>
         </p:spPr>
@@ -1520,7 +1531,7 @@
         </p:nvSpPr>
         <p:spPr>
           <a:xfrm>
-            <a:off x="457200" y="1600200"/>
+            <a:off x="457200" y="1600201"/>
             <a:ext cx="4038600" cy="4525963"/>
           </a:xfrm>
         </p:spPr>
@@ -1605,7 +1616,7 @@
         </p:nvSpPr>
         <p:spPr>
           <a:xfrm>
-            <a:off x="4648200" y="1600200"/>
+            <a:off x="4648200" y="1600201"/>
             <a:ext cx="4038600" cy="4525963"/>
           </a:xfrm>
         </p:spPr>
@@ -1813,7 +1824,7 @@
         <p:spPr>
           <a:xfrm>
             <a:off x="457200" y="1535113"/>
-            <a:ext cx="4040188" cy="639762"/>
+            <a:ext cx="4040188" cy="639763"/>
           </a:xfrm>
         </p:spPr>
         <p:txBody>
@@ -1962,8 +1973,8 @@
         </p:nvSpPr>
         <p:spPr>
           <a:xfrm>
-            <a:off x="4645025" y="1535113"/>
-            <a:ext cx="4041775" cy="639762"/>
+            <a:off x="4645027" y="1535113"/>
+            <a:ext cx="4041775" cy="639763"/>
           </a:xfrm>
         </p:spPr>
         <p:txBody>
@@ -2027,7 +2038,7 @@
         </p:nvSpPr>
         <p:spPr>
           <a:xfrm>
-            <a:off x="4645025" y="2174875"/>
+            <a:off x="4645027" y="2174875"/>
             <a:ext cx="4041775" cy="3951288"/>
           </a:xfrm>
         </p:spPr>
@@ -2420,8 +2431,8 @@
         </p:nvSpPr>
         <p:spPr>
           <a:xfrm>
-            <a:off x="457200" y="273050"/>
-            <a:ext cx="3008313" cy="1162050"/>
+            <a:off x="457202" y="273049"/>
+            <a:ext cx="3008313" cy="1162051"/>
           </a:xfrm>
         </p:spPr>
         <p:txBody>
@@ -2452,7 +2463,7 @@
         </p:nvSpPr>
         <p:spPr>
           <a:xfrm>
-            <a:off x="3575050" y="273050"/>
+            <a:off x="3575050" y="273052"/>
             <a:ext cx="5111750" cy="5853113"/>
           </a:xfrm>
         </p:spPr>
@@ -2537,7 +2548,7 @@
         </p:nvSpPr>
         <p:spPr>
           <a:xfrm>
-            <a:off x="457200" y="1435100"/>
+            <a:off x="457202" y="1435102"/>
             <a:ext cx="3008313" cy="4691063"/>
           </a:xfrm>
         </p:spPr>
@@ -2698,7 +2709,7 @@
         <p:spPr>
           <a:xfrm>
             <a:off x="1792288" y="4800600"/>
-            <a:ext cx="5486400" cy="566738"/>
+            <a:ext cx="5486400" cy="566739"/>
           </a:xfrm>
         </p:spPr>
         <p:txBody>
@@ -2791,7 +2802,7 @@
         <p:spPr>
           <a:xfrm>
             <a:off x="1792288" y="5367338"/>
-            <a:ext cx="5486400" cy="804862"/>
+            <a:ext cx="5486400" cy="804863"/>
           </a:xfrm>
         </p:spPr>
         <p:txBody>
@@ -2955,7 +2966,7 @@
         </p:nvSpPr>
         <p:spPr>
           <a:xfrm>
-            <a:off x="457200" y="274638"/>
+            <a:off x="457200" y="274639"/>
             <a:ext cx="8229600" cy="1143000"/>
           </a:xfrm>
           <a:prstGeom prst="rect">
@@ -2988,7 +2999,7 @@
         </p:nvSpPr>
         <p:spPr>
           <a:xfrm>
-            <a:off x="457200" y="1600200"/>
+            <a:off x="457200" y="1600201"/>
             <a:ext cx="8229600" cy="4525963"/>
           </a:xfrm>
           <a:prstGeom prst="rect">
@@ -3050,7 +3061,7 @@
         </p:nvSpPr>
         <p:spPr>
           <a:xfrm>
-            <a:off x="457200" y="6356350"/>
+            <a:off x="457200" y="6356351"/>
             <a:ext cx="2133600" cy="365125"/>
           </a:xfrm>
           <a:prstGeom prst="rect">
@@ -3091,7 +3102,7 @@
         </p:nvSpPr>
         <p:spPr>
           <a:xfrm>
-            <a:off x="3124200" y="6356350"/>
+            <a:off x="3124200" y="6356351"/>
             <a:ext cx="2895600" cy="365125"/>
           </a:xfrm>
           <a:prstGeom prst="rect">
@@ -3128,7 +3139,7 @@
         </p:nvSpPr>
         <p:spPr>
           <a:xfrm>
-            <a:off x="6553200" y="6356350"/>
+            <a:off x="6553200" y="6356351"/>
             <a:ext cx="2133600" cy="365125"/>
           </a:xfrm>
           <a:prstGeom prst="rect">
@@ -3460,7 +3471,7 @@
         </p:nvSpPr>
         <p:spPr>
           <a:xfrm>
-            <a:off x="685800" y="1779374"/>
+            <a:off x="685800" y="1779376"/>
             <a:ext cx="7772400" cy="1470025"/>
           </a:xfrm>
         </p:spPr>
@@ -3572,10 +3583,10 @@
         </p:nvGrpSpPr>
         <p:grpSpPr>
           <a:xfrm>
-            <a:off x="503548" y="4494018"/>
+            <a:off x="503548" y="4494017"/>
             <a:ext cx="8136904" cy="2031326"/>
             <a:chOff x="467544" y="4494018"/>
-            <a:chExt cx="8136904" cy="2031326"/>
+            <a:chExt cx="8136904" cy="2031325"/>
           </a:xfrm>
         </p:grpSpPr>
         <p:sp>
@@ -3587,7 +3598,7 @@
           <p:spPr>
             <a:xfrm>
               <a:off x="467544" y="4494019"/>
-              <a:ext cx="1800200" cy="2031325"/>
+              <a:ext cx="1800200" cy="2031324"/>
             </a:xfrm>
             <a:prstGeom prst="rect">
               <a:avLst/>
@@ -3724,7 +3735,7 @@
           <p:spPr>
             <a:xfrm>
               <a:off x="2906815" y="4494019"/>
-              <a:ext cx="2052228" cy="2031325"/>
+              <a:ext cx="2052228" cy="2031324"/>
             </a:xfrm>
             <a:prstGeom prst="rect">
               <a:avLst/>
@@ -3959,7 +3970,7 @@
           <p:spPr>
             <a:xfrm>
               <a:off x="5598114" y="4494018"/>
-              <a:ext cx="3006334" cy="2031325"/>
+              <a:ext cx="3006334" cy="2031324"/>
             </a:xfrm>
             <a:prstGeom prst="rect">
               <a:avLst/>
@@ -4123,7 +4134,7 @@
         </p:nvGrpSpPr>
         <p:grpSpPr>
           <a:xfrm>
-            <a:off x="1712756" y="116632"/>
+            <a:off x="1712758" y="116633"/>
             <a:ext cx="5718489" cy="1315889"/>
             <a:chOff x="1712756" y="116632"/>
             <a:chExt cx="5718489" cy="1315889"/>
@@ -4138,7 +4149,7 @@
           <p:spPr>
             <a:xfrm>
               <a:off x="3357148" y="116632"/>
-              <a:ext cx="2429704" cy="338554"/>
+              <a:ext cx="2375202" cy="338554"/>
             </a:xfrm>
             <a:prstGeom prst="rect">
               <a:avLst/>
@@ -4195,7 +4206,7 @@
           </p:nvSpPr>
           <p:spPr>
             <a:xfrm>
-              <a:off x="1712756" y="589910"/>
+              <a:off x="1712756" y="589911"/>
               <a:ext cx="5718489" cy="461665"/>
             </a:xfrm>
             <a:prstGeom prst="rect">
@@ -4301,10 +4312,4021 @@
 </p:sld>
 </file>
 
+<file path=ppt/slides/slide10.xml><?xml version="1.0" encoding="utf-8"?>
+<p:sld xmlns:a="http://schemas.openxmlformats.org/drawingml/2006/main" xmlns:r="http://schemas.openxmlformats.org/officeDocument/2006/relationships" xmlns:p="http://schemas.openxmlformats.org/presentationml/2006/main">
+  <p:cSld>
+    <p:spTree>
+      <p:nvGrpSpPr>
+        <p:cNvPr id="1" name=""/>
+        <p:cNvGrpSpPr/>
+        <p:nvPr/>
+      </p:nvGrpSpPr>
+      <p:grpSpPr>
+        <a:xfrm>
+          <a:off x="0" y="0"/>
+          <a:ext cx="0" cy="0"/>
+          <a:chOff x="0" y="0"/>
+          <a:chExt cx="0" cy="0"/>
+        </a:xfrm>
+      </p:grpSpPr>
+      <p:sp>
+        <p:nvSpPr>
+          <p:cNvPr id="2" name="Title 1"/>
+          <p:cNvSpPr>
+            <a:spLocks noGrp="1"/>
+          </p:cNvSpPr>
+          <p:nvPr>
+            <p:ph type="title"/>
+          </p:nvPr>
+        </p:nvSpPr>
+        <p:spPr>
+          <a:xfrm>
+            <a:off x="457200" y="0"/>
+            <a:ext cx="8229600" cy="1115616"/>
+          </a:xfrm>
+        </p:spPr>
+        <p:txBody>
+          <a:bodyPr>
+            <a:normAutofit/>
+          </a:bodyPr>
+          <a:lstStyle/>
+          <a:p>
+            <a:r>
+              <a:rPr lang="fr-FR" sz="4000" dirty="0" smtClean="0"/>
+              <a:t>Approches historiques</a:t>
+            </a:r>
+            <a:endParaRPr lang="en-US" sz="4000" dirty="0"/>
+          </a:p>
+        </p:txBody>
+      </p:sp>
+      <p:sp>
+        <p:nvSpPr>
+          <p:cNvPr id="3" name="TextBox 2"/>
+          <p:cNvSpPr txBox="1"/>
+          <p:nvPr/>
+        </p:nvSpPr>
+        <p:spPr>
+          <a:xfrm>
+            <a:off x="2013992" y="6084004"/>
+            <a:ext cx="5116016" cy="369332"/>
+          </a:xfrm>
+          <a:prstGeom prst="rect">
+            <a:avLst/>
+          </a:prstGeom>
+          <a:noFill/>
+        </p:spPr>
+        <p:txBody>
+          <a:bodyPr wrap="none" rtlCol="0">
+            <a:spAutoFit/>
+          </a:bodyPr>
+          <a:lstStyle/>
+          <a:p>
+            <a:pPr algn="ctr"/>
+            <a:r>
+              <a:rPr lang="fr-FR" dirty="0" smtClean="0"/>
+              <a:t>Propriété extraite d’une carte </a:t>
+            </a:r>
+            <a:r>
+              <a:rPr lang="fr-FR" i="1" dirty="0" err="1" smtClean="0"/>
+              <a:t>traceroute</a:t>
+            </a:r>
+            <a:r>
+              <a:rPr lang="fr-FR" dirty="0" smtClean="0"/>
+              <a:t>, </a:t>
+            </a:r>
+            <a:r>
+              <a:rPr lang="en-US" dirty="0" smtClean="0"/>
+              <a:t>DIMES, </a:t>
+            </a:r>
+            <a:r>
+              <a:rPr lang="en-US" dirty="0" err="1" smtClean="0"/>
+              <a:t>Shavitt</a:t>
+            </a:r>
+            <a:r>
+              <a:rPr lang="en-US" dirty="0" smtClean="0"/>
+              <a:t> </a:t>
+            </a:r>
+            <a:r>
+              <a:rPr lang="en-US" i="1" dirty="0" smtClean="0"/>
+              <a:t>et al.</a:t>
+            </a:r>
+            <a:r>
+              <a:rPr lang="en-US" dirty="0" smtClean="0"/>
+              <a:t>, 1999</a:t>
+            </a:r>
+            <a:endParaRPr lang="fr-FR" dirty="0" smtClean="0"/>
+          </a:p>
+        </p:txBody>
+      </p:sp>
+      <p:sp>
+        <p:nvSpPr>
+          <p:cNvPr id="4" name="TextBox 3"/>
+          <p:cNvSpPr txBox="1"/>
+          <p:nvPr/>
+        </p:nvSpPr>
+        <p:spPr>
+          <a:xfrm>
+            <a:off x="467544" y="1196752"/>
+            <a:ext cx="8308365" cy="461665"/>
+          </a:xfrm>
+          <a:prstGeom prst="rect">
+            <a:avLst/>
+          </a:prstGeom>
+          <a:noFill/>
+        </p:spPr>
+        <p:txBody>
+          <a:bodyPr wrap="none" rtlCol="0">
+            <a:spAutoFit/>
+          </a:bodyPr>
+          <a:lstStyle/>
+          <a:p>
+            <a:r>
+              <a:rPr lang="fr-FR" sz="2400" dirty="0" smtClean="0"/>
+              <a:t>3) Cartes déduites de mesures avec des outils de </a:t>
+            </a:r>
+            <a:r>
+              <a:rPr lang="fr-FR" sz="2400" dirty="0" err="1" smtClean="0"/>
+              <a:t>diagnotic</a:t>
+            </a:r>
+            <a:r>
+              <a:rPr lang="fr-FR" sz="2400" dirty="0" smtClean="0"/>
+              <a:t> (</a:t>
+            </a:r>
+            <a:r>
+              <a:rPr lang="fr-FR" sz="2400" i="1" dirty="0" err="1" smtClean="0"/>
+              <a:t>traceroute</a:t>
+            </a:r>
+            <a:r>
+              <a:rPr lang="fr-FR" sz="2400" dirty="0" smtClean="0"/>
+              <a:t>, </a:t>
+            </a:r>
+            <a:r>
+              <a:rPr lang="fr-FR" sz="2400" i="1" dirty="0" err="1" smtClean="0"/>
+              <a:t>tracetree</a:t>
+            </a:r>
+            <a:r>
+              <a:rPr lang="fr-FR" sz="2400" dirty="0" smtClean="0"/>
+              <a:t>…)</a:t>
+            </a:r>
+            <a:endParaRPr lang="en-US" sz="2400" dirty="0"/>
+          </a:p>
+        </p:txBody>
+      </p:sp>
+      <p:pic>
+        <p:nvPicPr>
+          <p:cNvPr id="3074" name="Picture 2"/>
+          <p:cNvPicPr>
+            <a:picLocks noChangeAspect="1" noChangeArrowheads="1"/>
+          </p:cNvPicPr>
+          <p:nvPr/>
+        </p:nvPicPr>
+        <p:blipFill>
+          <a:blip r:embed="rId2">
+            <a:extLst>
+              <a:ext uri="{28A0092B-C50C-407E-A947-70E740481C1C}">
+                <a14:useLocalDpi xmlns:a14="http://schemas.microsoft.com/office/drawing/2010/main" val="0"/>
+              </a:ext>
+            </a:extLst>
+          </a:blip>
+          <a:srcRect/>
+          <a:stretch>
+            <a:fillRect/>
+          </a:stretch>
+        </p:blipFill>
+        <p:spPr bwMode="auto">
+          <a:xfrm>
+            <a:off x="1729753" y="1705572"/>
+            <a:ext cx="5686082" cy="4315716"/>
+          </a:xfrm>
+          <a:prstGeom prst="rect">
+            <a:avLst/>
+          </a:prstGeom>
+          <a:noFill/>
+          <a:ln>
+            <a:noFill/>
+          </a:ln>
+          <a:effectLst/>
+          <a:extLst>
+            <a:ext uri="{909E8E84-426E-40DD-AFC4-6F175D3DCCD1}">
+              <a14:hiddenFill xmlns:a14="http://schemas.microsoft.com/office/drawing/2010/main">
+                <a:solidFill>
+                  <a:schemeClr val="accent1"/>
+                </a:solidFill>
+              </a14:hiddenFill>
+            </a:ext>
+            <a:ext uri="{91240B29-F687-4F45-9708-019B960494DF}">
+              <a14:hiddenLine xmlns:a14="http://schemas.microsoft.com/office/drawing/2010/main" w="9525">
+                <a:solidFill>
+                  <a:schemeClr val="tx1"/>
+                </a:solidFill>
+                <a:miter lim="800000"/>
+                <a:headEnd/>
+                <a:tailEnd/>
+              </a14:hiddenLine>
+            </a:ext>
+            <a:ext uri="{AF507438-7753-43E0-B8FC-AC1667EBCBE1}">
+              <a14:hiddenEffects xmlns:a14="http://schemas.microsoft.com/office/drawing/2010/main">
+                <a:effectLst>
+                  <a:outerShdw dist="35921" dir="2700000" algn="ctr" rotWithShape="0">
+                    <a:schemeClr val="bg2"/>
+                  </a:outerShdw>
+                </a:effectLst>
+              </a14:hiddenEffects>
+            </a:ext>
+          </a:extLst>
+        </p:spPr>
+      </p:pic>
+    </p:spTree>
+    <p:extLst>
+      <p:ext uri="{BB962C8B-B14F-4D97-AF65-F5344CB8AC3E}">
+        <p14:creationId xmlns:p14="http://schemas.microsoft.com/office/powerpoint/2010/main" val="3419054687"/>
+      </p:ext>
+    </p:extLst>
+  </p:cSld>
+  <p:clrMapOvr>
+    <a:masterClrMapping/>
+  </p:clrMapOvr>
+</p:sld>
+</file>
+
+<file path=ppt/slides/slide11.xml><?xml version="1.0" encoding="utf-8"?>
+<p:sld xmlns:a="http://schemas.openxmlformats.org/drawingml/2006/main" xmlns:r="http://schemas.openxmlformats.org/officeDocument/2006/relationships" xmlns:p="http://schemas.openxmlformats.org/presentationml/2006/main">
+  <p:cSld>
+    <p:spTree>
+      <p:nvGrpSpPr>
+        <p:cNvPr id="1" name=""/>
+        <p:cNvGrpSpPr/>
+        <p:nvPr/>
+      </p:nvGrpSpPr>
+      <p:grpSpPr>
+        <a:xfrm>
+          <a:off x="0" y="0"/>
+          <a:ext cx="0" cy="0"/>
+          <a:chOff x="0" y="0"/>
+          <a:chExt cx="0" cy="0"/>
+        </a:xfrm>
+      </p:grpSpPr>
+      <p:sp>
+        <p:nvSpPr>
+          <p:cNvPr id="2" name="Title 1"/>
+          <p:cNvSpPr>
+            <a:spLocks noGrp="1"/>
+          </p:cNvSpPr>
+          <p:nvPr>
+            <p:ph type="title"/>
+          </p:nvPr>
+        </p:nvSpPr>
+        <p:spPr>
+          <a:xfrm>
+            <a:off x="457200" y="0"/>
+            <a:ext cx="8229600" cy="1115616"/>
+          </a:xfrm>
+        </p:spPr>
+        <p:txBody>
+          <a:bodyPr>
+            <a:normAutofit/>
+          </a:bodyPr>
+          <a:lstStyle/>
+          <a:p>
+            <a:r>
+              <a:rPr lang="fr-FR" sz="4000" dirty="0" smtClean="0"/>
+              <a:t>Limites des approches historiques</a:t>
+            </a:r>
+            <a:endParaRPr lang="en-US" sz="4000" dirty="0"/>
+          </a:p>
+        </p:txBody>
+      </p:sp>
+      <p:grpSp>
+        <p:nvGrpSpPr>
+          <p:cNvPr id="6" name="Group 5"/>
+          <p:cNvGrpSpPr/>
+          <p:nvPr/>
+        </p:nvGrpSpPr>
+        <p:grpSpPr>
+          <a:xfrm>
+            <a:off x="1278342" y="1796916"/>
+            <a:ext cx="6587316" cy="3223811"/>
+            <a:chOff x="457964" y="1796916"/>
+            <a:chExt cx="6587316" cy="3223811"/>
+          </a:xfrm>
+        </p:grpSpPr>
+        <p:sp>
+          <p:nvSpPr>
+            <p:cNvPr id="4" name="TextBox 3"/>
+            <p:cNvSpPr txBox="1"/>
+            <p:nvPr/>
+          </p:nvSpPr>
+          <p:spPr>
+            <a:xfrm>
+              <a:off x="457964" y="1796916"/>
+              <a:ext cx="6587316" cy="1815882"/>
+            </a:xfrm>
+            <a:prstGeom prst="rect">
+              <a:avLst/>
+            </a:prstGeom>
+            <a:noFill/>
+          </p:spPr>
+          <p:txBody>
+            <a:bodyPr wrap="square" rtlCol="0">
+              <a:spAutoFit/>
+            </a:bodyPr>
+            <a:lstStyle/>
+            <a:p>
+              <a:pPr marL="342900" indent="-342900">
+                <a:buFontTx/>
+                <a:buChar char="-"/>
+              </a:pPr>
+              <a:r>
+                <a:rPr lang="fr-FR" sz="2800" dirty="0" smtClean="0"/>
+                <a:t>Problèmes techniques</a:t>
+              </a:r>
+            </a:p>
+            <a:p>
+              <a:pPr marL="342900" indent="-342900">
+                <a:buFontTx/>
+                <a:buChar char="-"/>
+              </a:pPr>
+              <a:r>
+                <a:rPr lang="fr-FR" sz="2800" dirty="0" smtClean="0"/>
+                <a:t>Passage à l’échelle</a:t>
+              </a:r>
+              <a:endParaRPr lang="fr-FR" sz="2800" dirty="0"/>
+            </a:p>
+            <a:p>
+              <a:pPr marL="342900" indent="-342900">
+                <a:buFontTx/>
+                <a:buChar char="-"/>
+              </a:pPr>
+              <a:r>
+                <a:rPr lang="fr-FR" sz="2800" dirty="0" smtClean="0"/>
+                <a:t>Erreurs d’interprétation</a:t>
+              </a:r>
+            </a:p>
+            <a:p>
+              <a:pPr marL="342900" indent="-342900">
+                <a:buFontTx/>
+                <a:buChar char="-"/>
+              </a:pPr>
+              <a:r>
+                <a:rPr lang="fr-FR" sz="2800" dirty="0" smtClean="0"/>
+                <a:t>Biais intrinsèque</a:t>
+              </a:r>
+            </a:p>
+          </p:txBody>
+        </p:sp>
+        <p:sp>
+          <p:nvSpPr>
+            <p:cNvPr id="5" name="TextBox 4"/>
+            <p:cNvSpPr txBox="1"/>
+            <p:nvPr/>
+          </p:nvSpPr>
+          <p:spPr>
+            <a:xfrm>
+              <a:off x="457964" y="4005064"/>
+              <a:ext cx="6587316" cy="1015663"/>
+            </a:xfrm>
+            <a:prstGeom prst="rect">
+              <a:avLst/>
+            </a:prstGeom>
+            <a:noFill/>
+          </p:spPr>
+          <p:txBody>
+            <a:bodyPr wrap="none" rtlCol="0">
+              <a:spAutoFit/>
+            </a:bodyPr>
+            <a:lstStyle/>
+            <a:p>
+              <a:pPr marL="342900" indent="-342900">
+                <a:buFont typeface="Arial" panose="020B0604020202020204" pitchFamily="34" charset="0"/>
+                <a:buChar char="•"/>
+              </a:pPr>
+              <a:r>
+                <a:rPr lang="fr-FR" sz="2400" dirty="0" smtClean="0"/>
+                <a:t>Encore beaucoup de controverses</a:t>
+              </a:r>
+            </a:p>
+            <a:p>
+              <a:pPr marL="171450" indent="-171450">
+                <a:buFont typeface="Arial" panose="020B0604020202020204" pitchFamily="34" charset="0"/>
+                <a:buChar char="•"/>
+              </a:pPr>
+              <a:endParaRPr lang="fr-FR" sz="1200" dirty="0" smtClean="0"/>
+            </a:p>
+            <a:p>
+              <a:pPr marL="342900" indent="-342900">
+                <a:buFont typeface="Arial" panose="020B0604020202020204" pitchFamily="34" charset="0"/>
+                <a:buChar char="•"/>
+              </a:pPr>
+              <a:r>
+                <a:rPr lang="fr-FR" sz="2400" dirty="0" smtClean="0"/>
+                <a:t>Propriétés topologiques fondamentales toujours mal connues</a:t>
+              </a:r>
+            </a:p>
+          </p:txBody>
+        </p:sp>
+      </p:grpSp>
+    </p:spTree>
+    <p:extLst>
+      <p:ext uri="{BB962C8B-B14F-4D97-AF65-F5344CB8AC3E}">
+        <p14:creationId xmlns:p14="http://schemas.microsoft.com/office/powerpoint/2010/main" val="3649856451"/>
+      </p:ext>
+    </p:extLst>
+  </p:cSld>
+  <p:clrMapOvr>
+    <a:masterClrMapping/>
+  </p:clrMapOvr>
+</p:sld>
+</file>
+
+<file path=ppt/slides/slide12.xml><?xml version="1.0" encoding="utf-8"?>
+<p:sld xmlns:a="http://schemas.openxmlformats.org/drawingml/2006/main" xmlns:r="http://schemas.openxmlformats.org/officeDocument/2006/relationships" xmlns:p="http://schemas.openxmlformats.org/presentationml/2006/main">
+  <p:cSld>
+    <p:spTree>
+      <p:nvGrpSpPr>
+        <p:cNvPr id="1" name=""/>
+        <p:cNvGrpSpPr/>
+        <p:nvPr/>
+      </p:nvGrpSpPr>
+      <p:grpSpPr>
+        <a:xfrm>
+          <a:off x="0" y="0"/>
+          <a:ext cx="0" cy="0"/>
+          <a:chOff x="0" y="0"/>
+          <a:chExt cx="0" cy="0"/>
+        </a:xfrm>
+      </p:grpSpPr>
+      <p:sp>
+        <p:nvSpPr>
+          <p:cNvPr id="2" name="Title 1"/>
+          <p:cNvSpPr>
+            <a:spLocks noGrp="1"/>
+          </p:cNvSpPr>
+          <p:nvPr>
+            <p:ph type="title"/>
+          </p:nvPr>
+        </p:nvSpPr>
+        <p:spPr>
+          <a:xfrm>
+            <a:off x="457200" y="0"/>
+            <a:ext cx="8229600" cy="1115616"/>
+          </a:xfrm>
+        </p:spPr>
+        <p:txBody>
+          <a:bodyPr>
+            <a:normAutofit/>
+          </a:bodyPr>
+          <a:lstStyle/>
+          <a:p>
+            <a:r>
+              <a:rPr lang="fr-FR" sz="4000" dirty="0" smtClean="0"/>
+              <a:t>Notre approche</a:t>
+            </a:r>
+            <a:endParaRPr lang="en-US" sz="4000" dirty="0"/>
+          </a:p>
+        </p:txBody>
+      </p:sp>
+      <p:sp>
+        <p:nvSpPr>
+          <p:cNvPr id="4" name="TextBox 3"/>
+          <p:cNvSpPr txBox="1"/>
+          <p:nvPr/>
+        </p:nvSpPr>
+        <p:spPr>
+          <a:xfrm>
+            <a:off x="1437257" y="1976641"/>
+            <a:ext cx="6269486" cy="3108543"/>
+          </a:xfrm>
+          <a:prstGeom prst="rect">
+            <a:avLst/>
+          </a:prstGeom>
+          <a:noFill/>
+        </p:spPr>
+        <p:txBody>
+          <a:bodyPr wrap="square" rtlCol="0">
+            <a:spAutoFit/>
+          </a:bodyPr>
+          <a:lstStyle/>
+          <a:p>
+            <a:pPr marL="457200" indent="-457200">
+              <a:buFont typeface="Wingdings" panose="05000000000000000000" pitchFamily="2" charset="2"/>
+              <a:buChar char="ü"/>
+            </a:pPr>
+            <a:r>
+              <a:rPr lang="fr-FR" sz="2400" dirty="0" smtClean="0"/>
+              <a:t>Définition formelle de nos objets et de nos outils</a:t>
+            </a:r>
+          </a:p>
+          <a:p>
+            <a:pPr marL="171450" indent="-171450">
+              <a:buFont typeface="Wingdings" panose="05000000000000000000" pitchFamily="2" charset="2"/>
+              <a:buChar char="ü"/>
+            </a:pPr>
+            <a:endParaRPr lang="fr-FR" sz="1200" dirty="0" smtClean="0"/>
+          </a:p>
+          <a:p>
+            <a:pPr marL="457200" indent="-457200">
+              <a:buFont typeface="Wingdings" panose="05000000000000000000" pitchFamily="2" charset="2"/>
+              <a:buChar char="ü"/>
+            </a:pPr>
+            <a:r>
+              <a:rPr lang="fr-FR" sz="2400" dirty="0" smtClean="0"/>
+              <a:t>Mesures précises d’observables topologiques</a:t>
+            </a:r>
+          </a:p>
+          <a:p>
+            <a:pPr marL="171450" indent="-171450">
+              <a:buFont typeface="Wingdings" panose="05000000000000000000" pitchFamily="2" charset="2"/>
+              <a:buChar char="ü"/>
+            </a:pPr>
+            <a:endParaRPr lang="fr-FR" sz="1200" dirty="0" smtClean="0"/>
+          </a:p>
+          <a:p>
+            <a:pPr marL="457200" indent="-457200">
+              <a:buFont typeface="Wingdings" panose="05000000000000000000" pitchFamily="2" charset="2"/>
+              <a:buChar char="ü"/>
+            </a:pPr>
+            <a:r>
+              <a:rPr lang="fr-FR" sz="2400" dirty="0" smtClean="0"/>
+              <a:t>Echantillonnage rigoureux du réseau</a:t>
+            </a:r>
+          </a:p>
+          <a:p>
+            <a:endParaRPr lang="fr-FR" sz="2400" dirty="0" smtClean="0"/>
+          </a:p>
+          <a:p>
+            <a:pPr marL="457200" indent="-457200">
+              <a:buFont typeface="Arial" panose="020B0604020202020204" pitchFamily="34" charset="0"/>
+              <a:buChar char="•"/>
+            </a:pPr>
+            <a:endParaRPr lang="fr-FR" sz="2400" dirty="0"/>
+          </a:p>
+          <a:p>
+            <a:pPr marL="457200" indent="-457200">
+              <a:buFont typeface="Wingdings" panose="05000000000000000000" pitchFamily="2" charset="2"/>
+              <a:buChar char="ü"/>
+            </a:pPr>
+            <a:r>
+              <a:rPr lang="fr-FR" sz="2400" dirty="0" smtClean="0"/>
+              <a:t>Estimation fiable d’une propriété topologique du réseau</a:t>
+            </a:r>
+          </a:p>
+          <a:p>
+            <a:endParaRPr lang="fr-FR" sz="2800" dirty="0"/>
+          </a:p>
+        </p:txBody>
+      </p:sp>
+    </p:spTree>
+    <p:extLst>
+      <p:ext uri="{BB962C8B-B14F-4D97-AF65-F5344CB8AC3E}">
+        <p14:creationId xmlns:p14="http://schemas.microsoft.com/office/powerpoint/2010/main" val="3964017747"/>
+      </p:ext>
+    </p:extLst>
+  </p:cSld>
+  <p:clrMapOvr>
+    <a:masterClrMapping/>
+  </p:clrMapOvr>
+</p:sld>
+</file>
+
+<file path=ppt/slides/slide2.xml><?xml version="1.0" encoding="utf-8"?>
+<p:sld xmlns:a="http://schemas.openxmlformats.org/drawingml/2006/main" xmlns:r="http://schemas.openxmlformats.org/officeDocument/2006/relationships" xmlns:p="http://schemas.openxmlformats.org/presentationml/2006/main">
+  <p:cSld>
+    <p:spTree>
+      <p:nvGrpSpPr>
+        <p:cNvPr id="1" name=""/>
+        <p:cNvGrpSpPr/>
+        <p:nvPr/>
+      </p:nvGrpSpPr>
+      <p:grpSpPr>
+        <a:xfrm>
+          <a:off x="0" y="0"/>
+          <a:ext cx="0" cy="0"/>
+          <a:chOff x="0" y="0"/>
+          <a:chExt cx="0" cy="0"/>
+        </a:xfrm>
+      </p:grpSpPr>
+      <p:sp>
+        <p:nvSpPr>
+          <p:cNvPr id="2" name="Title 1"/>
+          <p:cNvSpPr>
+            <a:spLocks noGrp="1"/>
+          </p:cNvSpPr>
+          <p:nvPr>
+            <p:ph type="title"/>
+          </p:nvPr>
+        </p:nvSpPr>
+        <p:spPr>
+          <a:xfrm>
+            <a:off x="457200" y="-27384"/>
+            <a:ext cx="8229600" cy="1143000"/>
+          </a:xfrm>
+        </p:spPr>
+        <p:txBody>
+          <a:bodyPr>
+            <a:normAutofit/>
+          </a:bodyPr>
+          <a:lstStyle/>
+          <a:p>
+            <a:r>
+              <a:rPr lang="fr-FR" sz="3600" dirty="0" smtClean="0"/>
+              <a:t>Organisation de l’exposé</a:t>
+            </a:r>
+            <a:endParaRPr lang="en-US" sz="3600" dirty="0"/>
+          </a:p>
+        </p:txBody>
+      </p:sp>
+      <p:sp>
+        <p:nvSpPr>
+          <p:cNvPr id="3" name="Content Placeholder 2"/>
+          <p:cNvSpPr>
+            <a:spLocks noGrp="1"/>
+          </p:cNvSpPr>
+          <p:nvPr>
+            <p:ph idx="1"/>
+          </p:nvPr>
+        </p:nvSpPr>
+        <p:spPr>
+          <a:xfrm>
+            <a:off x="457200" y="1484784"/>
+            <a:ext cx="8229600" cy="4349079"/>
+          </a:xfrm>
+        </p:spPr>
+        <p:txBody>
+          <a:bodyPr/>
+          <a:lstStyle/>
+          <a:p>
+            <a:pPr marL="514350" indent="-514350">
+              <a:lnSpc>
+                <a:spcPct val="150000"/>
+              </a:lnSpc>
+              <a:buSzPct val="100000"/>
+              <a:buFont typeface="+mj-lt"/>
+              <a:buAutoNum type="arabicPeriod"/>
+            </a:pPr>
+            <a:r>
+              <a:rPr lang="fr-FR" dirty="0" smtClean="0"/>
+              <a:t>Topologie d’Internet : enjeux et problématiques</a:t>
+            </a:r>
+          </a:p>
+          <a:p>
+            <a:pPr marL="514350" indent="-514350">
+              <a:lnSpc>
+                <a:spcPct val="150000"/>
+              </a:lnSpc>
+              <a:buSzPct val="100000"/>
+              <a:buFont typeface="+mj-lt"/>
+              <a:buAutoNum type="arabicPeriod"/>
+            </a:pPr>
+            <a:r>
+              <a:rPr lang="fr-FR" dirty="0" smtClean="0"/>
+              <a:t>Distribution de degrés au niveau logique</a:t>
+            </a:r>
+          </a:p>
+          <a:p>
+            <a:pPr marL="514350" indent="-514350">
+              <a:lnSpc>
+                <a:spcPct val="150000"/>
+              </a:lnSpc>
+              <a:buSzPct val="100000"/>
+              <a:buFont typeface="+mj-lt"/>
+              <a:buAutoNum type="arabicPeriod"/>
+            </a:pPr>
+            <a:r>
+              <a:rPr lang="fr-FR" dirty="0" smtClean="0"/>
+              <a:t>Distribution de degrés au niveau physique</a:t>
+            </a:r>
+          </a:p>
+          <a:p>
+            <a:pPr marL="514350" indent="-514350">
+              <a:lnSpc>
+                <a:spcPct val="150000"/>
+              </a:lnSpc>
+              <a:buSzPct val="100000"/>
+              <a:buFont typeface="+mj-lt"/>
+              <a:buAutoNum type="arabicPeriod"/>
+            </a:pPr>
+            <a:r>
+              <a:rPr lang="fr-FR" dirty="0" smtClean="0"/>
+              <a:t>Tables de transmission</a:t>
+            </a:r>
+          </a:p>
+          <a:p>
+            <a:pPr marL="514350" indent="-514350">
+              <a:lnSpc>
+                <a:spcPct val="150000"/>
+              </a:lnSpc>
+              <a:buSzPct val="100000"/>
+              <a:buFont typeface="+mj-lt"/>
+              <a:buAutoNum type="arabicPeriod"/>
+            </a:pPr>
+            <a:r>
+              <a:rPr lang="fr-FR" dirty="0" smtClean="0"/>
+              <a:t>Conclusions et perspectives</a:t>
+            </a:r>
+            <a:endParaRPr lang="en-US" dirty="0"/>
+          </a:p>
+        </p:txBody>
+      </p:sp>
+    </p:spTree>
+    <p:extLst>
+      <p:ext uri="{BB962C8B-B14F-4D97-AF65-F5344CB8AC3E}">
+        <p14:creationId xmlns:p14="http://schemas.microsoft.com/office/powerpoint/2010/main" val="1276945455"/>
+      </p:ext>
+    </p:extLst>
+  </p:cSld>
+  <p:clrMapOvr>
+    <a:masterClrMapping/>
+  </p:clrMapOvr>
+</p:sld>
+</file>
+
+<file path=ppt/slides/slide3.xml><?xml version="1.0" encoding="utf-8"?>
+<p:sld xmlns:a="http://schemas.openxmlformats.org/drawingml/2006/main" xmlns:r="http://schemas.openxmlformats.org/officeDocument/2006/relationships" xmlns:p="http://schemas.openxmlformats.org/presentationml/2006/main">
+  <p:cSld>
+    <p:spTree>
+      <p:nvGrpSpPr>
+        <p:cNvPr id="1" name=""/>
+        <p:cNvGrpSpPr/>
+        <p:nvPr/>
+      </p:nvGrpSpPr>
+      <p:grpSpPr>
+        <a:xfrm>
+          <a:off x="0" y="0"/>
+          <a:ext cx="0" cy="0"/>
+          <a:chOff x="0" y="0"/>
+          <a:chExt cx="0" cy="0"/>
+        </a:xfrm>
+      </p:grpSpPr>
+      <p:sp>
+        <p:nvSpPr>
+          <p:cNvPr id="2" name="Title 1"/>
+          <p:cNvSpPr>
+            <a:spLocks noGrp="1"/>
+          </p:cNvSpPr>
+          <p:nvPr>
+            <p:ph type="title"/>
+          </p:nvPr>
+        </p:nvSpPr>
+        <p:spPr>
+          <a:xfrm>
+            <a:off x="457200" y="0"/>
+            <a:ext cx="8229600" cy="1115616"/>
+          </a:xfrm>
+        </p:spPr>
+        <p:txBody>
+          <a:bodyPr>
+            <a:normAutofit/>
+          </a:bodyPr>
+          <a:lstStyle/>
+          <a:p>
+            <a:r>
+              <a:rPr lang="fr-FR" sz="4000" dirty="0" smtClean="0"/>
+              <a:t>À quoi sert Internet ?</a:t>
+            </a:r>
+            <a:endParaRPr lang="en-US" sz="4000" dirty="0"/>
+          </a:p>
+        </p:txBody>
+      </p:sp>
+      <p:sp>
+        <p:nvSpPr>
+          <p:cNvPr id="4" name="TextBox 3"/>
+          <p:cNvSpPr txBox="1"/>
+          <p:nvPr/>
+        </p:nvSpPr>
+        <p:spPr>
+          <a:xfrm>
+            <a:off x="532979" y="1412776"/>
+            <a:ext cx="7991931" cy="400110"/>
+          </a:xfrm>
+          <a:prstGeom prst="rect">
+            <a:avLst/>
+          </a:prstGeom>
+          <a:noFill/>
+        </p:spPr>
+        <p:txBody>
+          <a:bodyPr wrap="none" rtlCol="0">
+            <a:spAutoFit/>
+          </a:bodyPr>
+          <a:lstStyle/>
+          <a:p>
+            <a:pPr algn="ctr"/>
+            <a:r>
+              <a:rPr lang="fr-FR" sz="2000" dirty="0" smtClean="0">
+                <a:cs typeface="Arial" panose="020B0604020202020204" pitchFamily="34" charset="0"/>
+              </a:rPr>
+              <a:t>Internet est le support de très nombreuses applications : Web, Email, musique, vidéo, achats…</a:t>
+            </a:r>
+          </a:p>
+        </p:txBody>
+      </p:sp>
+      <p:grpSp>
+        <p:nvGrpSpPr>
+          <p:cNvPr id="15" name="Group 14"/>
+          <p:cNvGrpSpPr/>
+          <p:nvPr/>
+        </p:nvGrpSpPr>
+        <p:grpSpPr>
+          <a:xfrm>
+            <a:off x="2713670" y="2440923"/>
+            <a:ext cx="3630548" cy="2376264"/>
+            <a:chOff x="2771800" y="1916832"/>
+            <a:chExt cx="3630548" cy="2376264"/>
+          </a:xfrm>
+        </p:grpSpPr>
+        <p:sp>
+          <p:nvSpPr>
+            <p:cNvPr id="3" name="TextBox 2"/>
+            <p:cNvSpPr txBox="1"/>
+            <p:nvPr/>
+          </p:nvSpPr>
+          <p:spPr>
+            <a:xfrm>
+              <a:off x="3131840" y="2418565"/>
+              <a:ext cx="1008112" cy="369332"/>
+            </a:xfrm>
+            <a:prstGeom prst="rect">
+              <a:avLst/>
+            </a:prstGeom>
+            <a:noFill/>
+          </p:spPr>
+          <p:txBody>
+            <a:bodyPr wrap="square" rtlCol="0">
+              <a:spAutoFit/>
+            </a:bodyPr>
+            <a:lstStyle/>
+            <a:p>
+              <a:pPr algn="r"/>
+              <a:r>
+                <a:rPr lang="fr-FR" dirty="0" smtClean="0"/>
+                <a:t>Application</a:t>
+              </a:r>
+              <a:endParaRPr lang="en-US" dirty="0"/>
+            </a:p>
+          </p:txBody>
+        </p:sp>
+        <p:sp>
+          <p:nvSpPr>
+            <p:cNvPr id="6" name="TextBox 5"/>
+            <p:cNvSpPr txBox="1"/>
+            <p:nvPr/>
+          </p:nvSpPr>
+          <p:spPr>
+            <a:xfrm>
+              <a:off x="3131840" y="2920298"/>
+              <a:ext cx="1008112" cy="369332"/>
+            </a:xfrm>
+            <a:prstGeom prst="rect">
+              <a:avLst/>
+            </a:prstGeom>
+            <a:noFill/>
+          </p:spPr>
+          <p:txBody>
+            <a:bodyPr wrap="square" rtlCol="0">
+              <a:spAutoFit/>
+            </a:bodyPr>
+            <a:lstStyle/>
+            <a:p>
+              <a:pPr algn="r"/>
+              <a:r>
+                <a:rPr lang="fr-FR" dirty="0" smtClean="0"/>
+                <a:t>Transport</a:t>
+              </a:r>
+              <a:endParaRPr lang="en-US" dirty="0"/>
+            </a:p>
+          </p:txBody>
+        </p:sp>
+        <p:sp>
+          <p:nvSpPr>
+            <p:cNvPr id="7" name="TextBox 6"/>
+            <p:cNvSpPr txBox="1"/>
+            <p:nvPr/>
+          </p:nvSpPr>
+          <p:spPr>
+            <a:xfrm>
+              <a:off x="3131840" y="3422031"/>
+              <a:ext cx="1008112" cy="369332"/>
+            </a:xfrm>
+            <a:prstGeom prst="rect">
+              <a:avLst/>
+            </a:prstGeom>
+            <a:noFill/>
+          </p:spPr>
+          <p:txBody>
+            <a:bodyPr wrap="square" rtlCol="0">
+              <a:spAutoFit/>
+            </a:bodyPr>
+            <a:lstStyle/>
+            <a:p>
+              <a:pPr algn="r"/>
+              <a:r>
+                <a:rPr lang="fr-FR" dirty="0" smtClean="0"/>
+                <a:t>Réseau</a:t>
+              </a:r>
+              <a:endParaRPr lang="en-US" dirty="0"/>
+            </a:p>
+          </p:txBody>
+        </p:sp>
+        <p:sp>
+          <p:nvSpPr>
+            <p:cNvPr id="8" name="TextBox 7"/>
+            <p:cNvSpPr txBox="1"/>
+            <p:nvPr/>
+          </p:nvSpPr>
+          <p:spPr>
+            <a:xfrm>
+              <a:off x="2771800" y="3923764"/>
+              <a:ext cx="1368152" cy="369332"/>
+            </a:xfrm>
+            <a:prstGeom prst="rect">
+              <a:avLst/>
+            </a:prstGeom>
+            <a:noFill/>
+          </p:spPr>
+          <p:txBody>
+            <a:bodyPr wrap="square" rtlCol="0">
+              <a:spAutoFit/>
+            </a:bodyPr>
+            <a:lstStyle/>
+            <a:p>
+              <a:pPr algn="r"/>
+              <a:r>
+                <a:rPr lang="fr-FR" dirty="0" smtClean="0"/>
+                <a:t>Données-lien</a:t>
+              </a:r>
+              <a:endParaRPr lang="en-US" dirty="0"/>
+            </a:p>
+          </p:txBody>
+        </p:sp>
+        <p:sp>
+          <p:nvSpPr>
+            <p:cNvPr id="9" name="TextBox 8"/>
+            <p:cNvSpPr txBox="1"/>
+            <p:nvPr/>
+          </p:nvSpPr>
+          <p:spPr>
+            <a:xfrm>
+              <a:off x="4644008" y="2418565"/>
+              <a:ext cx="1008112" cy="369332"/>
+            </a:xfrm>
+            <a:prstGeom prst="rect">
+              <a:avLst/>
+            </a:prstGeom>
+            <a:noFill/>
+          </p:spPr>
+          <p:txBody>
+            <a:bodyPr wrap="square" rtlCol="0">
+              <a:spAutoFit/>
+            </a:bodyPr>
+            <a:lstStyle/>
+            <a:p>
+              <a:r>
+                <a:rPr lang="fr-FR" dirty="0" smtClean="0"/>
+                <a:t>HTTP</a:t>
+              </a:r>
+              <a:endParaRPr lang="en-US" dirty="0"/>
+            </a:p>
+          </p:txBody>
+        </p:sp>
+        <p:sp>
+          <p:nvSpPr>
+            <p:cNvPr id="10" name="TextBox 9"/>
+            <p:cNvSpPr txBox="1"/>
+            <p:nvPr/>
+          </p:nvSpPr>
+          <p:spPr>
+            <a:xfrm>
+              <a:off x="4644008" y="2920298"/>
+              <a:ext cx="1008112" cy="369332"/>
+            </a:xfrm>
+            <a:prstGeom prst="rect">
+              <a:avLst/>
+            </a:prstGeom>
+            <a:noFill/>
+          </p:spPr>
+          <p:txBody>
+            <a:bodyPr wrap="square" rtlCol="0">
+              <a:spAutoFit/>
+            </a:bodyPr>
+            <a:lstStyle/>
+            <a:p>
+              <a:r>
+                <a:rPr lang="fr-FR" dirty="0" smtClean="0"/>
+                <a:t>TCP</a:t>
+              </a:r>
+            </a:p>
+          </p:txBody>
+        </p:sp>
+        <p:sp>
+          <p:nvSpPr>
+            <p:cNvPr id="11" name="TextBox 10"/>
+            <p:cNvSpPr txBox="1"/>
+            <p:nvPr/>
+          </p:nvSpPr>
+          <p:spPr>
+            <a:xfrm>
+              <a:off x="4644008" y="3422031"/>
+              <a:ext cx="1008112" cy="369332"/>
+            </a:xfrm>
+            <a:prstGeom prst="rect">
+              <a:avLst/>
+            </a:prstGeom>
+            <a:noFill/>
+          </p:spPr>
+          <p:txBody>
+            <a:bodyPr wrap="square" rtlCol="0">
+              <a:spAutoFit/>
+            </a:bodyPr>
+            <a:lstStyle/>
+            <a:p>
+              <a:r>
+                <a:rPr lang="fr-FR" dirty="0" smtClean="0"/>
+                <a:t>IP</a:t>
+              </a:r>
+              <a:endParaRPr lang="en-US" dirty="0"/>
+            </a:p>
+          </p:txBody>
+        </p:sp>
+        <p:sp>
+          <p:nvSpPr>
+            <p:cNvPr id="12" name="TextBox 11"/>
+            <p:cNvSpPr txBox="1"/>
+            <p:nvPr/>
+          </p:nvSpPr>
+          <p:spPr>
+            <a:xfrm>
+              <a:off x="4644008" y="3923764"/>
+              <a:ext cx="1758340" cy="369332"/>
+            </a:xfrm>
+            <a:prstGeom prst="rect">
+              <a:avLst/>
+            </a:prstGeom>
+            <a:noFill/>
+          </p:spPr>
+          <p:txBody>
+            <a:bodyPr wrap="square" rtlCol="0">
+              <a:spAutoFit/>
+            </a:bodyPr>
+            <a:lstStyle/>
+            <a:p>
+              <a:r>
+                <a:rPr lang="fr-FR" dirty="0" smtClean="0"/>
+                <a:t>MAC/Ethernet</a:t>
+              </a:r>
+              <a:endParaRPr lang="en-US" dirty="0"/>
+            </a:p>
+          </p:txBody>
+        </p:sp>
+        <p:sp>
+          <p:nvSpPr>
+            <p:cNvPr id="13" name="TextBox 12"/>
+            <p:cNvSpPr txBox="1"/>
+            <p:nvPr/>
+          </p:nvSpPr>
+          <p:spPr>
+            <a:xfrm>
+              <a:off x="3131840" y="1916832"/>
+              <a:ext cx="1008112" cy="369332"/>
+            </a:xfrm>
+            <a:prstGeom prst="rect">
+              <a:avLst/>
+            </a:prstGeom>
+            <a:noFill/>
+          </p:spPr>
+          <p:txBody>
+            <a:bodyPr wrap="square" rtlCol="0">
+              <a:spAutoFit/>
+            </a:bodyPr>
+            <a:lstStyle/>
+            <a:p>
+              <a:pPr algn="r"/>
+              <a:r>
+                <a:rPr lang="fr-FR" b="1" dirty="0" smtClean="0"/>
+                <a:t>Couche</a:t>
+              </a:r>
+              <a:endParaRPr lang="en-US" b="1" dirty="0"/>
+            </a:p>
+          </p:txBody>
+        </p:sp>
+        <p:sp>
+          <p:nvSpPr>
+            <p:cNvPr id="14" name="TextBox 13"/>
+            <p:cNvSpPr txBox="1"/>
+            <p:nvPr/>
+          </p:nvSpPr>
+          <p:spPr>
+            <a:xfrm>
+              <a:off x="4644008" y="1916832"/>
+              <a:ext cx="1008112" cy="369332"/>
+            </a:xfrm>
+            <a:prstGeom prst="rect">
+              <a:avLst/>
+            </a:prstGeom>
+            <a:noFill/>
+          </p:spPr>
+          <p:txBody>
+            <a:bodyPr wrap="square" rtlCol="0">
+              <a:spAutoFit/>
+            </a:bodyPr>
+            <a:lstStyle/>
+            <a:p>
+              <a:r>
+                <a:rPr lang="fr-FR" b="1" dirty="0" smtClean="0"/>
+                <a:t>Exemple</a:t>
+              </a:r>
+              <a:endParaRPr lang="en-US" b="1" dirty="0"/>
+            </a:p>
+          </p:txBody>
+        </p:sp>
+      </p:grpSp>
+      <p:sp>
+        <p:nvSpPr>
+          <p:cNvPr id="16" name="TextBox 15"/>
+          <p:cNvSpPr txBox="1"/>
+          <p:nvPr/>
+        </p:nvSpPr>
+        <p:spPr>
+          <a:xfrm>
+            <a:off x="510601" y="5445224"/>
+            <a:ext cx="8036687" cy="369332"/>
+          </a:xfrm>
+          <a:prstGeom prst="rect">
+            <a:avLst/>
+          </a:prstGeom>
+          <a:noFill/>
+        </p:spPr>
+        <p:txBody>
+          <a:bodyPr wrap="none" rtlCol="0">
+            <a:spAutoFit/>
+          </a:bodyPr>
+          <a:lstStyle/>
+          <a:p>
+            <a:pPr algn="ctr"/>
+            <a:r>
+              <a:rPr lang="fr-FR" dirty="0" smtClean="0"/>
+              <a:t>Toutes ces activités utilisent le même réseau fondamental pour communiquer entre les différentes parties.</a:t>
+            </a:r>
+            <a:endParaRPr lang="en-US" dirty="0"/>
+          </a:p>
+        </p:txBody>
+      </p:sp>
+    </p:spTree>
+    <p:extLst>
+      <p:ext uri="{BB962C8B-B14F-4D97-AF65-F5344CB8AC3E}">
+        <p14:creationId xmlns:p14="http://schemas.microsoft.com/office/powerpoint/2010/main" val="4230988189"/>
+      </p:ext>
+    </p:extLst>
+  </p:cSld>
+  <p:clrMapOvr>
+    <a:masterClrMapping/>
+  </p:clrMapOvr>
+</p:sld>
+</file>
+
+<file path=ppt/slides/slide4.xml><?xml version="1.0" encoding="utf-8"?>
+<p:sld xmlns:a="http://schemas.openxmlformats.org/drawingml/2006/main" xmlns:r="http://schemas.openxmlformats.org/officeDocument/2006/relationships" xmlns:p="http://schemas.openxmlformats.org/presentationml/2006/main">
+  <p:cSld>
+    <p:spTree>
+      <p:nvGrpSpPr>
+        <p:cNvPr id="1" name=""/>
+        <p:cNvGrpSpPr/>
+        <p:nvPr/>
+      </p:nvGrpSpPr>
+      <p:grpSpPr>
+        <a:xfrm>
+          <a:off x="0" y="0"/>
+          <a:ext cx="0" cy="0"/>
+          <a:chOff x="0" y="0"/>
+          <a:chExt cx="0" cy="0"/>
+        </a:xfrm>
+      </p:grpSpPr>
+      <p:sp>
+        <p:nvSpPr>
+          <p:cNvPr id="2" name="Title 1"/>
+          <p:cNvSpPr>
+            <a:spLocks noGrp="1"/>
+          </p:cNvSpPr>
+          <p:nvPr>
+            <p:ph type="title"/>
+          </p:nvPr>
+        </p:nvSpPr>
+        <p:spPr>
+          <a:xfrm>
+            <a:off x="457200" y="0"/>
+            <a:ext cx="8229600" cy="1115616"/>
+          </a:xfrm>
+        </p:spPr>
+        <p:txBody>
+          <a:bodyPr>
+            <a:normAutofit/>
+          </a:bodyPr>
+          <a:lstStyle/>
+          <a:p>
+            <a:r>
+              <a:rPr lang="fr-FR" sz="4000" dirty="0" smtClean="0"/>
+              <a:t>Transport d’information sur Internet</a:t>
+            </a:r>
+            <a:endParaRPr lang="en-US" sz="4000" dirty="0"/>
+          </a:p>
+        </p:txBody>
+      </p:sp>
+      <p:grpSp>
+        <p:nvGrpSpPr>
+          <p:cNvPr id="16" name="Group 15"/>
+          <p:cNvGrpSpPr/>
+          <p:nvPr/>
+        </p:nvGrpSpPr>
+        <p:grpSpPr>
+          <a:xfrm>
+            <a:off x="827584" y="3207459"/>
+            <a:ext cx="1440160" cy="369332"/>
+            <a:chOff x="827584" y="3140968"/>
+            <a:chExt cx="1440160" cy="369332"/>
+          </a:xfrm>
+        </p:grpSpPr>
+        <p:sp>
+          <p:nvSpPr>
+            <p:cNvPr id="10" name="Rectangle 9"/>
+            <p:cNvSpPr/>
+            <p:nvPr/>
+          </p:nvSpPr>
+          <p:spPr>
+            <a:xfrm>
+              <a:off x="827584" y="3140968"/>
+              <a:ext cx="1440160" cy="369332"/>
+            </a:xfrm>
+            <a:prstGeom prst="rect">
+              <a:avLst/>
+            </a:prstGeom>
+          </p:spPr>
+          <p:style>
+            <a:lnRef idx="2">
+              <a:schemeClr val="accent1">
+                <a:shade val="50000"/>
+              </a:schemeClr>
+            </a:lnRef>
+            <a:fillRef idx="1">
+              <a:schemeClr val="accent1"/>
+            </a:fillRef>
+            <a:effectRef idx="0">
+              <a:schemeClr val="accent1"/>
+            </a:effectRef>
+            <a:fontRef idx="minor">
+              <a:schemeClr val="lt1"/>
+            </a:fontRef>
+          </p:style>
+          <p:txBody>
+            <a:bodyPr rtlCol="0" anchor="ctr"/>
+            <a:lstStyle/>
+            <a:p>
+              <a:pPr algn="ctr"/>
+              <a:endParaRPr lang="en-US"/>
+            </a:p>
+          </p:txBody>
+        </p:sp>
+        <p:sp>
+          <p:nvSpPr>
+            <p:cNvPr id="5" name="TextBox 4"/>
+            <p:cNvSpPr txBox="1"/>
+            <p:nvPr/>
+          </p:nvSpPr>
+          <p:spPr>
+            <a:xfrm>
+              <a:off x="931598" y="3156357"/>
+              <a:ext cx="1232132" cy="338554"/>
+            </a:xfrm>
+            <a:prstGeom prst="rect">
+              <a:avLst/>
+            </a:prstGeom>
+            <a:noFill/>
+          </p:spPr>
+          <p:txBody>
+            <a:bodyPr wrap="none" rtlCol="0">
+              <a:spAutoFit/>
+            </a:bodyPr>
+            <a:lstStyle/>
+            <a:p>
+              <a:r>
+                <a:rPr lang="fr-FR" sz="1600" dirty="0" smtClean="0"/>
+                <a:t>Mon ordinateur</a:t>
+              </a:r>
+            </a:p>
+          </p:txBody>
+        </p:sp>
+      </p:grpSp>
+      <p:grpSp>
+        <p:nvGrpSpPr>
+          <p:cNvPr id="17" name="Group 16"/>
+          <p:cNvGrpSpPr/>
+          <p:nvPr/>
+        </p:nvGrpSpPr>
+        <p:grpSpPr>
+          <a:xfrm>
+            <a:off x="3423154" y="2940623"/>
+            <a:ext cx="1944216" cy="903005"/>
+            <a:chOff x="3347864" y="2940623"/>
+            <a:chExt cx="1944216" cy="903005"/>
+          </a:xfrm>
+        </p:grpSpPr>
+        <p:sp>
+          <p:nvSpPr>
+            <p:cNvPr id="12" name="Rectangle 11"/>
+            <p:cNvSpPr/>
+            <p:nvPr/>
+          </p:nvSpPr>
+          <p:spPr>
+            <a:xfrm>
+              <a:off x="3347864" y="2940623"/>
+              <a:ext cx="1944216" cy="903005"/>
+            </a:xfrm>
+            <a:prstGeom prst="rect">
+              <a:avLst/>
+            </a:prstGeom>
+          </p:spPr>
+          <p:style>
+            <a:lnRef idx="2">
+              <a:schemeClr val="accent1">
+                <a:shade val="50000"/>
+              </a:schemeClr>
+            </a:lnRef>
+            <a:fillRef idx="1">
+              <a:schemeClr val="accent1"/>
+            </a:fillRef>
+            <a:effectRef idx="0">
+              <a:schemeClr val="accent1"/>
+            </a:effectRef>
+            <a:fontRef idx="minor">
+              <a:schemeClr val="lt1"/>
+            </a:fontRef>
+          </p:style>
+          <p:txBody>
+            <a:bodyPr rtlCol="0" anchor="ctr"/>
+            <a:lstStyle/>
+            <a:p>
+              <a:pPr algn="ctr"/>
+              <a:endParaRPr lang="en-US"/>
+            </a:p>
+          </p:txBody>
+        </p:sp>
+        <p:sp>
+          <p:nvSpPr>
+            <p:cNvPr id="11" name="TextBox 10"/>
+            <p:cNvSpPr txBox="1"/>
+            <p:nvPr/>
+          </p:nvSpPr>
+          <p:spPr>
+            <a:xfrm>
+              <a:off x="3639337" y="3068960"/>
+              <a:ext cx="1361270" cy="646331"/>
+            </a:xfrm>
+            <a:prstGeom prst="rect">
+              <a:avLst/>
+            </a:prstGeom>
+            <a:noFill/>
+          </p:spPr>
+          <p:txBody>
+            <a:bodyPr wrap="none" rtlCol="0">
+              <a:spAutoFit/>
+            </a:bodyPr>
+            <a:lstStyle/>
+            <a:p>
+              <a:r>
+                <a:rPr lang="fr-FR" sz="3600" dirty="0" smtClean="0"/>
+                <a:t>Internet</a:t>
+              </a:r>
+              <a:endParaRPr lang="en-US" sz="3600" dirty="0"/>
+            </a:p>
+          </p:txBody>
+        </p:sp>
+      </p:grpSp>
+      <p:grpSp>
+        <p:nvGrpSpPr>
+          <p:cNvPr id="15" name="Group 14"/>
+          <p:cNvGrpSpPr/>
+          <p:nvPr/>
+        </p:nvGrpSpPr>
+        <p:grpSpPr>
+          <a:xfrm>
+            <a:off x="6522780" y="3207459"/>
+            <a:ext cx="1440160" cy="369332"/>
+            <a:chOff x="6522780" y="3336287"/>
+            <a:chExt cx="1440160" cy="369332"/>
+          </a:xfrm>
+        </p:grpSpPr>
+        <p:sp>
+          <p:nvSpPr>
+            <p:cNvPr id="14" name="Rectangle 13"/>
+            <p:cNvSpPr/>
+            <p:nvPr/>
+          </p:nvSpPr>
+          <p:spPr>
+            <a:xfrm>
+              <a:off x="6522780" y="3336287"/>
+              <a:ext cx="1440160" cy="369332"/>
+            </a:xfrm>
+            <a:prstGeom prst="rect">
+              <a:avLst/>
+            </a:prstGeom>
+          </p:spPr>
+          <p:style>
+            <a:lnRef idx="2">
+              <a:schemeClr val="accent1">
+                <a:shade val="50000"/>
+              </a:schemeClr>
+            </a:lnRef>
+            <a:fillRef idx="1">
+              <a:schemeClr val="accent1"/>
+            </a:fillRef>
+            <a:effectRef idx="0">
+              <a:schemeClr val="accent1"/>
+            </a:effectRef>
+            <a:fontRef idx="minor">
+              <a:schemeClr val="lt1"/>
+            </a:fontRef>
+          </p:style>
+          <p:txBody>
+            <a:bodyPr rtlCol="0" anchor="ctr"/>
+            <a:lstStyle/>
+            <a:p>
+              <a:pPr algn="ctr"/>
+              <a:endParaRPr lang="en-US"/>
+            </a:p>
+          </p:txBody>
+        </p:sp>
+        <p:sp>
+          <p:nvSpPr>
+            <p:cNvPr id="13" name="TextBox 12"/>
+            <p:cNvSpPr txBox="1"/>
+            <p:nvPr/>
+          </p:nvSpPr>
+          <p:spPr>
+            <a:xfrm>
+              <a:off x="6703289" y="3336287"/>
+              <a:ext cx="1079142" cy="369332"/>
+            </a:xfrm>
+            <a:prstGeom prst="rect">
+              <a:avLst/>
+            </a:prstGeom>
+            <a:noFill/>
+          </p:spPr>
+          <p:txBody>
+            <a:bodyPr wrap="none" rtlCol="0">
+              <a:spAutoFit/>
+            </a:bodyPr>
+            <a:lstStyle/>
+            <a:p>
+              <a:r>
+                <a:rPr lang="fr-FR" dirty="0" smtClean="0"/>
+                <a:t>Google.com</a:t>
+              </a:r>
+              <a:endParaRPr lang="en-US" dirty="0"/>
+            </a:p>
+          </p:txBody>
+        </p:sp>
+      </p:grpSp>
+      <p:sp>
+        <p:nvSpPr>
+          <p:cNvPr id="26" name="Right Arrow 25"/>
+          <p:cNvSpPr/>
+          <p:nvPr/>
+        </p:nvSpPr>
+        <p:spPr>
+          <a:xfrm>
+            <a:off x="2345479" y="3265675"/>
+            <a:ext cx="1008112" cy="252899"/>
+          </a:xfrm>
+          <a:prstGeom prst="rightArrow">
+            <a:avLst/>
+          </a:prstGeom>
+        </p:spPr>
+        <p:style>
+          <a:lnRef idx="2">
+            <a:schemeClr val="accent1">
+              <a:shade val="50000"/>
+            </a:schemeClr>
+          </a:lnRef>
+          <a:fillRef idx="1">
+            <a:schemeClr val="accent1"/>
+          </a:fillRef>
+          <a:effectRef idx="0">
+            <a:schemeClr val="accent1"/>
+          </a:effectRef>
+          <a:fontRef idx="minor">
+            <a:schemeClr val="lt1"/>
+          </a:fontRef>
+        </p:style>
+        <p:txBody>
+          <a:bodyPr rtlCol="0" anchor="ctr"/>
+          <a:lstStyle/>
+          <a:p>
+            <a:pPr algn="ctr"/>
+            <a:endParaRPr lang="en-US"/>
+          </a:p>
+        </p:txBody>
+      </p:sp>
+      <p:sp>
+        <p:nvSpPr>
+          <p:cNvPr id="27" name="Right Arrow 26"/>
+          <p:cNvSpPr/>
+          <p:nvPr/>
+        </p:nvSpPr>
+        <p:spPr>
+          <a:xfrm>
+            <a:off x="5436096" y="3268883"/>
+            <a:ext cx="1008112" cy="252899"/>
+          </a:xfrm>
+          <a:prstGeom prst="rightArrow">
+            <a:avLst/>
+          </a:prstGeom>
+        </p:spPr>
+        <p:style>
+          <a:lnRef idx="2">
+            <a:schemeClr val="accent1">
+              <a:shade val="50000"/>
+            </a:schemeClr>
+          </a:lnRef>
+          <a:fillRef idx="1">
+            <a:schemeClr val="accent1"/>
+          </a:fillRef>
+          <a:effectRef idx="0">
+            <a:schemeClr val="accent1"/>
+          </a:effectRef>
+          <a:fontRef idx="minor">
+            <a:schemeClr val="lt1"/>
+          </a:fontRef>
+        </p:style>
+        <p:txBody>
+          <a:bodyPr rtlCol="0" anchor="ctr"/>
+          <a:lstStyle/>
+          <a:p>
+            <a:pPr algn="ctr"/>
+            <a:endParaRPr lang="en-US"/>
+          </a:p>
+        </p:txBody>
+      </p:sp>
+      <p:sp>
+        <p:nvSpPr>
+          <p:cNvPr id="28" name="TextBox 27"/>
+          <p:cNvSpPr txBox="1"/>
+          <p:nvPr/>
+        </p:nvSpPr>
+        <p:spPr>
+          <a:xfrm>
+            <a:off x="539552" y="4437112"/>
+            <a:ext cx="2079800" cy="369332"/>
+          </a:xfrm>
+          <a:prstGeom prst="rect">
+            <a:avLst/>
+          </a:prstGeom>
+          <a:noFill/>
+        </p:spPr>
+        <p:txBody>
+          <a:bodyPr wrap="none" rtlCol="0">
+            <a:spAutoFit/>
+          </a:bodyPr>
+          <a:lstStyle/>
+          <a:p>
+            <a:r>
+              <a:rPr lang="fr-FR" dirty="0" smtClean="0"/>
+              <a:t>Durée du transfert : 20ms</a:t>
+            </a:r>
+            <a:endParaRPr lang="en-US" dirty="0"/>
+          </a:p>
+        </p:txBody>
+      </p:sp>
+      <p:sp>
+        <p:nvSpPr>
+          <p:cNvPr id="29" name="TextBox 28"/>
+          <p:cNvSpPr txBox="1"/>
+          <p:nvPr/>
+        </p:nvSpPr>
+        <p:spPr>
+          <a:xfrm>
+            <a:off x="467544" y="1187460"/>
+            <a:ext cx="6775316" cy="369332"/>
+          </a:xfrm>
+          <a:prstGeom prst="rect">
+            <a:avLst/>
+          </a:prstGeom>
+          <a:noFill/>
+        </p:spPr>
+        <p:txBody>
+          <a:bodyPr wrap="none" rtlCol="0">
+            <a:spAutoFit/>
+          </a:bodyPr>
+          <a:lstStyle/>
+          <a:p>
+            <a:r>
+              <a:rPr lang="fr-FR" dirty="0" smtClean="0"/>
+              <a:t>Que se passe-t-il lorsqu’on charge une page sur le web ? Par exemple, </a:t>
+            </a:r>
+            <a:r>
+              <a:rPr lang="fr-FR" dirty="0" smtClean="0">
+                <a:hlinkClick r:id="rId2"/>
+              </a:rPr>
+              <a:t>www.google.com</a:t>
+            </a:r>
+            <a:r>
+              <a:rPr lang="fr-FR" dirty="0" smtClean="0"/>
+              <a:t> ?</a:t>
+            </a:r>
+            <a:endParaRPr lang="en-US" sz="2000" dirty="0">
+              <a:latin typeface="Arial" panose="020B0604020202020204" pitchFamily="34" charset="0"/>
+              <a:cs typeface="Arial" panose="020B0604020202020204" pitchFamily="34" charset="0"/>
+            </a:endParaRPr>
+          </a:p>
+        </p:txBody>
+      </p:sp>
+    </p:spTree>
+    <p:extLst>
+      <p:ext uri="{BB962C8B-B14F-4D97-AF65-F5344CB8AC3E}">
+        <p14:creationId xmlns:p14="http://schemas.microsoft.com/office/powerpoint/2010/main" val="1685268997"/>
+      </p:ext>
+    </p:extLst>
+  </p:cSld>
+  <p:clrMapOvr>
+    <a:masterClrMapping/>
+  </p:clrMapOvr>
+</p:sld>
+</file>
+
+<file path=ppt/slides/slide5.xml><?xml version="1.0" encoding="utf-8"?>
+<p:sld xmlns:a="http://schemas.openxmlformats.org/drawingml/2006/main" xmlns:r="http://schemas.openxmlformats.org/officeDocument/2006/relationships" xmlns:p="http://schemas.openxmlformats.org/presentationml/2006/main">
+  <p:cSld>
+    <p:spTree>
+      <p:nvGrpSpPr>
+        <p:cNvPr id="1" name=""/>
+        <p:cNvGrpSpPr/>
+        <p:nvPr/>
+      </p:nvGrpSpPr>
+      <p:grpSpPr>
+        <a:xfrm>
+          <a:off x="0" y="0"/>
+          <a:ext cx="0" cy="0"/>
+          <a:chOff x="0" y="0"/>
+          <a:chExt cx="0" cy="0"/>
+        </a:xfrm>
+      </p:grpSpPr>
+      <p:sp>
+        <p:nvSpPr>
+          <p:cNvPr id="2" name="Title 1"/>
+          <p:cNvSpPr>
+            <a:spLocks noGrp="1"/>
+          </p:cNvSpPr>
+          <p:nvPr>
+            <p:ph type="title"/>
+          </p:nvPr>
+        </p:nvSpPr>
+        <p:spPr>
+          <a:xfrm>
+            <a:off x="457200" y="0"/>
+            <a:ext cx="8229600" cy="1115616"/>
+          </a:xfrm>
+        </p:spPr>
+        <p:txBody>
+          <a:bodyPr>
+            <a:normAutofit/>
+          </a:bodyPr>
+          <a:lstStyle/>
+          <a:p>
+            <a:r>
+              <a:rPr lang="fr-FR" sz="4000" dirty="0" smtClean="0"/>
+              <a:t>Transport d’information sur Internet</a:t>
+            </a:r>
+            <a:endParaRPr lang="en-US" sz="4000" dirty="0"/>
+          </a:p>
+        </p:txBody>
+      </p:sp>
+      <p:sp>
+        <p:nvSpPr>
+          <p:cNvPr id="4" name="TextBox 3"/>
+          <p:cNvSpPr txBox="1"/>
+          <p:nvPr/>
+        </p:nvSpPr>
+        <p:spPr>
+          <a:xfrm>
+            <a:off x="467544" y="1187460"/>
+            <a:ext cx="6775316" cy="369332"/>
+          </a:xfrm>
+          <a:prstGeom prst="rect">
+            <a:avLst/>
+          </a:prstGeom>
+          <a:noFill/>
+        </p:spPr>
+        <p:txBody>
+          <a:bodyPr wrap="none" rtlCol="0">
+            <a:spAutoFit/>
+          </a:bodyPr>
+          <a:lstStyle/>
+          <a:p>
+            <a:r>
+              <a:rPr lang="fr-FR" dirty="0" smtClean="0"/>
+              <a:t>Que se passe-t-il lorsqu’on charge une page sur le web ? Par exemple, </a:t>
+            </a:r>
+            <a:r>
+              <a:rPr lang="fr-FR" dirty="0" smtClean="0">
+                <a:hlinkClick r:id="rId2"/>
+              </a:rPr>
+              <a:t>www.google.com</a:t>
+            </a:r>
+            <a:r>
+              <a:rPr lang="fr-FR" dirty="0" smtClean="0"/>
+              <a:t> ?</a:t>
+            </a:r>
+            <a:endParaRPr lang="en-US" sz="2000" dirty="0">
+              <a:latin typeface="Arial" panose="020B0604020202020204" pitchFamily="34" charset="0"/>
+              <a:cs typeface="Arial" panose="020B0604020202020204" pitchFamily="34" charset="0"/>
+            </a:endParaRPr>
+          </a:p>
+        </p:txBody>
+      </p:sp>
+      <p:grpSp>
+        <p:nvGrpSpPr>
+          <p:cNvPr id="16" name="Group 15"/>
+          <p:cNvGrpSpPr/>
+          <p:nvPr/>
+        </p:nvGrpSpPr>
+        <p:grpSpPr>
+          <a:xfrm>
+            <a:off x="827584" y="3207459"/>
+            <a:ext cx="1440160" cy="369332"/>
+            <a:chOff x="827584" y="3140968"/>
+            <a:chExt cx="1440160" cy="369332"/>
+          </a:xfrm>
+        </p:grpSpPr>
+        <p:sp>
+          <p:nvSpPr>
+            <p:cNvPr id="10" name="Rectangle 9"/>
+            <p:cNvSpPr/>
+            <p:nvPr/>
+          </p:nvSpPr>
+          <p:spPr>
+            <a:xfrm>
+              <a:off x="827584" y="3140968"/>
+              <a:ext cx="1440160" cy="369332"/>
+            </a:xfrm>
+            <a:prstGeom prst="rect">
+              <a:avLst/>
+            </a:prstGeom>
+          </p:spPr>
+          <p:style>
+            <a:lnRef idx="2">
+              <a:schemeClr val="accent1">
+                <a:shade val="50000"/>
+              </a:schemeClr>
+            </a:lnRef>
+            <a:fillRef idx="1">
+              <a:schemeClr val="accent1"/>
+            </a:fillRef>
+            <a:effectRef idx="0">
+              <a:schemeClr val="accent1"/>
+            </a:effectRef>
+            <a:fontRef idx="minor">
+              <a:schemeClr val="lt1"/>
+            </a:fontRef>
+          </p:style>
+          <p:txBody>
+            <a:bodyPr rtlCol="0" anchor="ctr"/>
+            <a:lstStyle/>
+            <a:p>
+              <a:pPr algn="ctr"/>
+              <a:endParaRPr lang="en-US"/>
+            </a:p>
+          </p:txBody>
+        </p:sp>
+        <p:sp>
+          <p:nvSpPr>
+            <p:cNvPr id="5" name="TextBox 4"/>
+            <p:cNvSpPr txBox="1"/>
+            <p:nvPr/>
+          </p:nvSpPr>
+          <p:spPr>
+            <a:xfrm>
+              <a:off x="827584" y="3156357"/>
+              <a:ext cx="1440160" cy="338554"/>
+            </a:xfrm>
+            <a:prstGeom prst="rect">
+              <a:avLst/>
+            </a:prstGeom>
+            <a:noFill/>
+          </p:spPr>
+          <p:txBody>
+            <a:bodyPr wrap="square" rtlCol="0">
+              <a:spAutoFit/>
+            </a:bodyPr>
+            <a:lstStyle/>
+            <a:p>
+              <a:pPr algn="ctr"/>
+              <a:r>
+                <a:rPr lang="fr-FR" sz="1600" dirty="0" smtClean="0"/>
+                <a:t>127.0.0.1</a:t>
+              </a:r>
+            </a:p>
+          </p:txBody>
+        </p:sp>
+      </p:grpSp>
+      <p:grpSp>
+        <p:nvGrpSpPr>
+          <p:cNvPr id="15" name="Group 14"/>
+          <p:cNvGrpSpPr/>
+          <p:nvPr/>
+        </p:nvGrpSpPr>
+        <p:grpSpPr>
+          <a:xfrm>
+            <a:off x="6522780" y="3207459"/>
+            <a:ext cx="1440160" cy="369332"/>
+            <a:chOff x="6522780" y="3336287"/>
+            <a:chExt cx="1440160" cy="369332"/>
+          </a:xfrm>
+        </p:grpSpPr>
+        <p:sp>
+          <p:nvSpPr>
+            <p:cNvPr id="14" name="Rectangle 13"/>
+            <p:cNvSpPr/>
+            <p:nvPr/>
+          </p:nvSpPr>
+          <p:spPr>
+            <a:xfrm>
+              <a:off x="6522780" y="3336287"/>
+              <a:ext cx="1440160" cy="369332"/>
+            </a:xfrm>
+            <a:prstGeom prst="rect">
+              <a:avLst/>
+            </a:prstGeom>
+          </p:spPr>
+          <p:style>
+            <a:lnRef idx="2">
+              <a:schemeClr val="accent1">
+                <a:shade val="50000"/>
+              </a:schemeClr>
+            </a:lnRef>
+            <a:fillRef idx="1">
+              <a:schemeClr val="accent1"/>
+            </a:fillRef>
+            <a:effectRef idx="0">
+              <a:schemeClr val="accent1"/>
+            </a:effectRef>
+            <a:fontRef idx="minor">
+              <a:schemeClr val="lt1"/>
+            </a:fontRef>
+          </p:style>
+          <p:txBody>
+            <a:bodyPr rtlCol="0" anchor="ctr"/>
+            <a:lstStyle/>
+            <a:p>
+              <a:pPr algn="ctr"/>
+              <a:endParaRPr lang="en-US"/>
+            </a:p>
+          </p:txBody>
+        </p:sp>
+        <p:sp>
+          <p:nvSpPr>
+            <p:cNvPr id="13" name="TextBox 12"/>
+            <p:cNvSpPr txBox="1"/>
+            <p:nvPr/>
+          </p:nvSpPr>
+          <p:spPr>
+            <a:xfrm>
+              <a:off x="6522780" y="3336287"/>
+              <a:ext cx="1439187" cy="369332"/>
+            </a:xfrm>
+            <a:prstGeom prst="rect">
+              <a:avLst/>
+            </a:prstGeom>
+            <a:noFill/>
+          </p:spPr>
+          <p:txBody>
+            <a:bodyPr wrap="square" rtlCol="0">
+              <a:spAutoFit/>
+            </a:bodyPr>
+            <a:lstStyle/>
+            <a:p>
+              <a:pPr algn="ctr"/>
+              <a:r>
+                <a:rPr lang="fr-FR" dirty="0" smtClean="0"/>
+                <a:t>74.125.71.102</a:t>
+              </a:r>
+              <a:endParaRPr lang="en-US" dirty="0"/>
+            </a:p>
+          </p:txBody>
+        </p:sp>
+      </p:grpSp>
+      <p:grpSp>
+        <p:nvGrpSpPr>
+          <p:cNvPr id="9" name="Group 8"/>
+          <p:cNvGrpSpPr/>
+          <p:nvPr/>
+        </p:nvGrpSpPr>
+        <p:grpSpPr>
+          <a:xfrm>
+            <a:off x="3744100" y="1835532"/>
+            <a:ext cx="1471180" cy="369332"/>
+            <a:chOff x="3779912" y="2204864"/>
+            <a:chExt cx="1471180" cy="369332"/>
+          </a:xfrm>
+        </p:grpSpPr>
+        <p:sp>
+          <p:nvSpPr>
+            <p:cNvPr id="6" name="Rectangle 5"/>
+            <p:cNvSpPr/>
+            <p:nvPr/>
+          </p:nvSpPr>
+          <p:spPr>
+            <a:xfrm>
+              <a:off x="3779912" y="2204864"/>
+              <a:ext cx="1471180" cy="369332"/>
+            </a:xfrm>
+            <a:prstGeom prst="rect">
+              <a:avLst/>
+            </a:prstGeom>
+          </p:spPr>
+          <p:style>
+            <a:lnRef idx="2">
+              <a:schemeClr val="accent1">
+                <a:shade val="50000"/>
+              </a:schemeClr>
+            </a:lnRef>
+            <a:fillRef idx="1">
+              <a:schemeClr val="accent1"/>
+            </a:fillRef>
+            <a:effectRef idx="0">
+              <a:schemeClr val="accent1"/>
+            </a:effectRef>
+            <a:fontRef idx="minor">
+              <a:schemeClr val="lt1"/>
+            </a:fontRef>
+          </p:style>
+          <p:txBody>
+            <a:bodyPr rtlCol="0" anchor="ctr"/>
+            <a:lstStyle/>
+            <a:p>
+              <a:pPr algn="ctr"/>
+              <a:endParaRPr lang="en-US"/>
+            </a:p>
+          </p:txBody>
+        </p:sp>
+        <p:sp>
+          <p:nvSpPr>
+            <p:cNvPr id="3" name="TextBox 2"/>
+            <p:cNvSpPr txBox="1"/>
+            <p:nvPr/>
+          </p:nvSpPr>
+          <p:spPr>
+            <a:xfrm>
+              <a:off x="3779912" y="2204864"/>
+              <a:ext cx="1471180" cy="369332"/>
+            </a:xfrm>
+            <a:prstGeom prst="rect">
+              <a:avLst/>
+            </a:prstGeom>
+            <a:noFill/>
+          </p:spPr>
+          <p:txBody>
+            <a:bodyPr wrap="square" rtlCol="0">
+              <a:spAutoFit/>
+            </a:bodyPr>
+            <a:lstStyle/>
+            <a:p>
+              <a:pPr algn="ctr"/>
+              <a:r>
+                <a:rPr lang="fr-FR" dirty="0" smtClean="0"/>
+                <a:t>192.168.0.1</a:t>
+              </a:r>
+              <a:endParaRPr lang="en-US" dirty="0"/>
+            </a:p>
+          </p:txBody>
+        </p:sp>
+      </p:grpSp>
+      <p:grpSp>
+        <p:nvGrpSpPr>
+          <p:cNvPr id="8" name="Group 7"/>
+          <p:cNvGrpSpPr/>
+          <p:nvPr/>
+        </p:nvGrpSpPr>
+        <p:grpSpPr>
+          <a:xfrm>
+            <a:off x="3757377" y="2389735"/>
+            <a:ext cx="1444626" cy="369332"/>
+            <a:chOff x="3806466" y="2744314"/>
+            <a:chExt cx="1444626" cy="369332"/>
+          </a:xfrm>
+        </p:grpSpPr>
+        <p:sp>
+          <p:nvSpPr>
+            <p:cNvPr id="21" name="Rectangle 20"/>
+            <p:cNvSpPr/>
+            <p:nvPr/>
+          </p:nvSpPr>
+          <p:spPr>
+            <a:xfrm>
+              <a:off x="3806466" y="2744314"/>
+              <a:ext cx="1444626" cy="369332"/>
+            </a:xfrm>
+            <a:prstGeom prst="rect">
+              <a:avLst/>
+            </a:prstGeom>
+          </p:spPr>
+          <p:style>
+            <a:lnRef idx="2">
+              <a:schemeClr val="accent1">
+                <a:shade val="50000"/>
+              </a:schemeClr>
+            </a:lnRef>
+            <a:fillRef idx="1">
+              <a:schemeClr val="accent1"/>
+            </a:fillRef>
+            <a:effectRef idx="0">
+              <a:schemeClr val="accent1"/>
+            </a:effectRef>
+            <a:fontRef idx="minor">
+              <a:schemeClr val="lt1"/>
+            </a:fontRef>
+          </p:style>
+          <p:txBody>
+            <a:bodyPr rtlCol="0" anchor="ctr"/>
+            <a:lstStyle/>
+            <a:p>
+              <a:pPr algn="ctr"/>
+              <a:endParaRPr lang="en-US"/>
+            </a:p>
+          </p:txBody>
+        </p:sp>
+        <p:sp>
+          <p:nvSpPr>
+            <p:cNvPr id="22" name="TextBox 21"/>
+            <p:cNvSpPr txBox="1"/>
+            <p:nvPr/>
+          </p:nvSpPr>
+          <p:spPr>
+            <a:xfrm>
+              <a:off x="3806466" y="2744314"/>
+              <a:ext cx="1444626" cy="369332"/>
+            </a:xfrm>
+            <a:prstGeom prst="rect">
+              <a:avLst/>
+            </a:prstGeom>
+            <a:noFill/>
+          </p:spPr>
+          <p:txBody>
+            <a:bodyPr wrap="square" rtlCol="0">
+              <a:spAutoFit/>
+            </a:bodyPr>
+            <a:lstStyle/>
+            <a:p>
+              <a:pPr algn="ctr"/>
+              <a:r>
+                <a:rPr lang="fr-FR" dirty="0" smtClean="0"/>
+                <a:t>213.245.254.145</a:t>
+              </a:r>
+              <a:endParaRPr lang="en-US" dirty="0"/>
+            </a:p>
+          </p:txBody>
+        </p:sp>
+      </p:grpSp>
+      <p:grpSp>
+        <p:nvGrpSpPr>
+          <p:cNvPr id="7" name="Group 6"/>
+          <p:cNvGrpSpPr/>
+          <p:nvPr/>
+        </p:nvGrpSpPr>
+        <p:grpSpPr>
+          <a:xfrm>
+            <a:off x="3757377" y="6269153"/>
+            <a:ext cx="1444626" cy="369332"/>
+            <a:chOff x="3779912" y="3376736"/>
+            <a:chExt cx="1444626" cy="369332"/>
+          </a:xfrm>
+        </p:grpSpPr>
+        <p:sp>
+          <p:nvSpPr>
+            <p:cNvPr id="23" name="Rectangle 22"/>
+            <p:cNvSpPr/>
+            <p:nvPr/>
+          </p:nvSpPr>
+          <p:spPr>
+            <a:xfrm>
+              <a:off x="3779912" y="3376736"/>
+              <a:ext cx="1444626" cy="369332"/>
+            </a:xfrm>
+            <a:prstGeom prst="rect">
+              <a:avLst/>
+            </a:prstGeom>
+          </p:spPr>
+          <p:style>
+            <a:lnRef idx="2">
+              <a:schemeClr val="accent1">
+                <a:shade val="50000"/>
+              </a:schemeClr>
+            </a:lnRef>
+            <a:fillRef idx="1">
+              <a:schemeClr val="accent1"/>
+            </a:fillRef>
+            <a:effectRef idx="0">
+              <a:schemeClr val="accent1"/>
+            </a:effectRef>
+            <a:fontRef idx="minor">
+              <a:schemeClr val="lt1"/>
+            </a:fontRef>
+          </p:style>
+          <p:txBody>
+            <a:bodyPr rtlCol="0" anchor="ctr"/>
+            <a:lstStyle/>
+            <a:p>
+              <a:pPr algn="ctr"/>
+              <a:endParaRPr lang="en-US"/>
+            </a:p>
+          </p:txBody>
+        </p:sp>
+        <p:sp>
+          <p:nvSpPr>
+            <p:cNvPr id="24" name="TextBox 23"/>
+            <p:cNvSpPr txBox="1"/>
+            <p:nvPr/>
+          </p:nvSpPr>
+          <p:spPr>
+            <a:xfrm>
+              <a:off x="3826401" y="3376736"/>
+              <a:ext cx="1351653" cy="369332"/>
+            </a:xfrm>
+            <a:prstGeom prst="rect">
+              <a:avLst/>
+            </a:prstGeom>
+            <a:noFill/>
+          </p:spPr>
+          <p:txBody>
+            <a:bodyPr wrap="none" rtlCol="0">
+              <a:spAutoFit/>
+            </a:bodyPr>
+            <a:lstStyle/>
+            <a:p>
+              <a:pPr algn="ctr"/>
+              <a:r>
+                <a:rPr lang="fr-FR" dirty="0" smtClean="0"/>
+                <a:t>216.239.51.121</a:t>
+              </a:r>
+              <a:endParaRPr lang="en-US" dirty="0"/>
+            </a:p>
+          </p:txBody>
+        </p:sp>
+      </p:grpSp>
+      <p:grpSp>
+        <p:nvGrpSpPr>
+          <p:cNvPr id="28" name="Group 27"/>
+          <p:cNvGrpSpPr/>
+          <p:nvPr/>
+        </p:nvGrpSpPr>
+        <p:grpSpPr>
+          <a:xfrm>
+            <a:off x="3757377" y="3498141"/>
+            <a:ext cx="1444626" cy="369332"/>
+            <a:chOff x="3779912" y="3376736"/>
+            <a:chExt cx="1444626" cy="369332"/>
+          </a:xfrm>
+        </p:grpSpPr>
+        <p:sp>
+          <p:nvSpPr>
+            <p:cNvPr id="29" name="Rectangle 28"/>
+            <p:cNvSpPr/>
+            <p:nvPr/>
+          </p:nvSpPr>
+          <p:spPr>
+            <a:xfrm>
+              <a:off x="3779912" y="3376736"/>
+              <a:ext cx="1444626" cy="369332"/>
+            </a:xfrm>
+            <a:prstGeom prst="rect">
+              <a:avLst/>
+            </a:prstGeom>
+          </p:spPr>
+          <p:style>
+            <a:lnRef idx="2">
+              <a:schemeClr val="accent1">
+                <a:shade val="50000"/>
+              </a:schemeClr>
+            </a:lnRef>
+            <a:fillRef idx="1">
+              <a:schemeClr val="accent1"/>
+            </a:fillRef>
+            <a:effectRef idx="0">
+              <a:schemeClr val="accent1"/>
+            </a:effectRef>
+            <a:fontRef idx="minor">
+              <a:schemeClr val="lt1"/>
+            </a:fontRef>
+          </p:style>
+          <p:txBody>
+            <a:bodyPr rtlCol="0" anchor="ctr"/>
+            <a:lstStyle/>
+            <a:p>
+              <a:pPr algn="ctr"/>
+              <a:endParaRPr lang="en-US"/>
+            </a:p>
+          </p:txBody>
+        </p:sp>
+        <p:sp>
+          <p:nvSpPr>
+            <p:cNvPr id="30" name="TextBox 29"/>
+            <p:cNvSpPr txBox="1"/>
+            <p:nvPr/>
+          </p:nvSpPr>
+          <p:spPr>
+            <a:xfrm>
+              <a:off x="3826401" y="3376736"/>
+              <a:ext cx="1351652" cy="369332"/>
+            </a:xfrm>
+            <a:prstGeom prst="rect">
+              <a:avLst/>
+            </a:prstGeom>
+            <a:noFill/>
+          </p:spPr>
+          <p:txBody>
+            <a:bodyPr wrap="none" rtlCol="0">
+              <a:spAutoFit/>
+            </a:bodyPr>
+            <a:lstStyle/>
+            <a:p>
+              <a:pPr algn="ctr"/>
+              <a:r>
+                <a:rPr lang="fr-FR" dirty="0" smtClean="0"/>
+                <a:t>172.19.128.170</a:t>
+              </a:r>
+            </a:p>
+          </p:txBody>
+        </p:sp>
+      </p:grpSp>
+      <p:grpSp>
+        <p:nvGrpSpPr>
+          <p:cNvPr id="31" name="Group 30"/>
+          <p:cNvGrpSpPr/>
+          <p:nvPr/>
+        </p:nvGrpSpPr>
+        <p:grpSpPr>
+          <a:xfrm>
+            <a:off x="3757377" y="4052344"/>
+            <a:ext cx="1444626" cy="369332"/>
+            <a:chOff x="3779912" y="3376736"/>
+            <a:chExt cx="1444626" cy="369332"/>
+          </a:xfrm>
+        </p:grpSpPr>
+        <p:sp>
+          <p:nvSpPr>
+            <p:cNvPr id="32" name="Rectangle 31"/>
+            <p:cNvSpPr/>
+            <p:nvPr/>
+          </p:nvSpPr>
+          <p:spPr>
+            <a:xfrm>
+              <a:off x="3779912" y="3376736"/>
+              <a:ext cx="1444626" cy="369332"/>
+            </a:xfrm>
+            <a:prstGeom prst="rect">
+              <a:avLst/>
+            </a:prstGeom>
+          </p:spPr>
+          <p:style>
+            <a:lnRef idx="2">
+              <a:schemeClr val="accent1">
+                <a:shade val="50000"/>
+              </a:schemeClr>
+            </a:lnRef>
+            <a:fillRef idx="1">
+              <a:schemeClr val="accent1"/>
+            </a:fillRef>
+            <a:effectRef idx="0">
+              <a:schemeClr val="accent1"/>
+            </a:effectRef>
+            <a:fontRef idx="minor">
+              <a:schemeClr val="lt1"/>
+            </a:fontRef>
+          </p:style>
+          <p:txBody>
+            <a:bodyPr rtlCol="0" anchor="ctr"/>
+            <a:lstStyle/>
+            <a:p>
+              <a:pPr algn="ctr"/>
+              <a:endParaRPr lang="en-US"/>
+            </a:p>
+          </p:txBody>
+        </p:sp>
+        <p:sp>
+          <p:nvSpPr>
+            <p:cNvPr id="33" name="TextBox 32"/>
+            <p:cNvSpPr txBox="1"/>
+            <p:nvPr/>
+          </p:nvSpPr>
+          <p:spPr>
+            <a:xfrm>
+              <a:off x="3919375" y="3376736"/>
+              <a:ext cx="1165704" cy="369332"/>
+            </a:xfrm>
+            <a:prstGeom prst="rect">
+              <a:avLst/>
+            </a:prstGeom>
+            <a:noFill/>
+          </p:spPr>
+          <p:txBody>
+            <a:bodyPr wrap="none" rtlCol="0">
+              <a:spAutoFit/>
+            </a:bodyPr>
+            <a:lstStyle/>
+            <a:p>
+              <a:pPr algn="ctr"/>
+              <a:r>
+                <a:rPr lang="fr-FR" dirty="0" smtClean="0"/>
+                <a:t>80.236.1.161</a:t>
+              </a:r>
+              <a:endParaRPr lang="en-US" dirty="0"/>
+            </a:p>
+          </p:txBody>
+        </p:sp>
+      </p:grpSp>
+      <p:grpSp>
+        <p:nvGrpSpPr>
+          <p:cNvPr id="34" name="Group 33"/>
+          <p:cNvGrpSpPr/>
+          <p:nvPr/>
+        </p:nvGrpSpPr>
+        <p:grpSpPr>
+          <a:xfrm>
+            <a:off x="3757377" y="4606547"/>
+            <a:ext cx="1444626" cy="369332"/>
+            <a:chOff x="3779912" y="3376736"/>
+            <a:chExt cx="1444626" cy="369332"/>
+          </a:xfrm>
+        </p:grpSpPr>
+        <p:sp>
+          <p:nvSpPr>
+            <p:cNvPr id="35" name="Rectangle 34"/>
+            <p:cNvSpPr/>
+            <p:nvPr/>
+          </p:nvSpPr>
+          <p:spPr>
+            <a:xfrm>
+              <a:off x="3779912" y="3376736"/>
+              <a:ext cx="1444626" cy="369332"/>
+            </a:xfrm>
+            <a:prstGeom prst="rect">
+              <a:avLst/>
+            </a:prstGeom>
+          </p:spPr>
+          <p:style>
+            <a:lnRef idx="2">
+              <a:schemeClr val="accent1">
+                <a:shade val="50000"/>
+              </a:schemeClr>
+            </a:lnRef>
+            <a:fillRef idx="1">
+              <a:schemeClr val="accent1"/>
+            </a:fillRef>
+            <a:effectRef idx="0">
+              <a:schemeClr val="accent1"/>
+            </a:effectRef>
+            <a:fontRef idx="minor">
+              <a:schemeClr val="lt1"/>
+            </a:fontRef>
+          </p:style>
+          <p:txBody>
+            <a:bodyPr rtlCol="0" anchor="ctr"/>
+            <a:lstStyle/>
+            <a:p>
+              <a:pPr algn="ctr"/>
+              <a:endParaRPr lang="en-US"/>
+            </a:p>
+          </p:txBody>
+        </p:sp>
+        <p:sp>
+          <p:nvSpPr>
+            <p:cNvPr id="36" name="TextBox 35"/>
+            <p:cNvSpPr txBox="1"/>
+            <p:nvPr/>
+          </p:nvSpPr>
+          <p:spPr>
+            <a:xfrm>
+              <a:off x="3872888" y="3376736"/>
+              <a:ext cx="1258679" cy="369332"/>
+            </a:xfrm>
+            <a:prstGeom prst="rect">
+              <a:avLst/>
+            </a:prstGeom>
+            <a:noFill/>
+          </p:spPr>
+          <p:txBody>
+            <a:bodyPr wrap="none" rtlCol="0">
+              <a:spAutoFit/>
+            </a:bodyPr>
+            <a:lstStyle/>
+            <a:p>
+              <a:pPr algn="ctr"/>
+              <a:r>
+                <a:rPr lang="fr-FR" dirty="0" smtClean="0"/>
+                <a:t>72.14.239.205</a:t>
+              </a:r>
+              <a:endParaRPr lang="en-US" dirty="0"/>
+            </a:p>
+          </p:txBody>
+        </p:sp>
+      </p:grpSp>
+      <p:grpSp>
+        <p:nvGrpSpPr>
+          <p:cNvPr id="37" name="Group 36"/>
+          <p:cNvGrpSpPr/>
+          <p:nvPr/>
+        </p:nvGrpSpPr>
+        <p:grpSpPr>
+          <a:xfrm>
+            <a:off x="3757377" y="5160750"/>
+            <a:ext cx="1444626" cy="369332"/>
+            <a:chOff x="3779912" y="3376736"/>
+            <a:chExt cx="1444626" cy="369332"/>
+          </a:xfrm>
+        </p:grpSpPr>
+        <p:sp>
+          <p:nvSpPr>
+            <p:cNvPr id="38" name="Rectangle 37"/>
+            <p:cNvSpPr/>
+            <p:nvPr/>
+          </p:nvSpPr>
+          <p:spPr>
+            <a:xfrm>
+              <a:off x="3779912" y="3376736"/>
+              <a:ext cx="1444626" cy="369332"/>
+            </a:xfrm>
+            <a:prstGeom prst="rect">
+              <a:avLst/>
+            </a:prstGeom>
+          </p:spPr>
+          <p:style>
+            <a:lnRef idx="2">
+              <a:schemeClr val="accent1">
+                <a:shade val="50000"/>
+              </a:schemeClr>
+            </a:lnRef>
+            <a:fillRef idx="1">
+              <a:schemeClr val="accent1"/>
+            </a:fillRef>
+            <a:effectRef idx="0">
+              <a:schemeClr val="accent1"/>
+            </a:effectRef>
+            <a:fontRef idx="minor">
+              <a:schemeClr val="lt1"/>
+            </a:fontRef>
+          </p:style>
+          <p:txBody>
+            <a:bodyPr rtlCol="0" anchor="ctr"/>
+            <a:lstStyle/>
+            <a:p>
+              <a:pPr algn="ctr"/>
+              <a:endParaRPr lang="en-US"/>
+            </a:p>
+          </p:txBody>
+        </p:sp>
+        <p:sp>
+          <p:nvSpPr>
+            <p:cNvPr id="39" name="TextBox 38"/>
+            <p:cNvSpPr txBox="1"/>
+            <p:nvPr/>
+          </p:nvSpPr>
+          <p:spPr>
+            <a:xfrm>
+              <a:off x="3872888" y="3376736"/>
+              <a:ext cx="1258679" cy="369332"/>
+            </a:xfrm>
+            <a:prstGeom prst="rect">
+              <a:avLst/>
+            </a:prstGeom>
+            <a:noFill/>
+          </p:spPr>
+          <p:txBody>
+            <a:bodyPr wrap="none" rtlCol="0">
+              <a:spAutoFit/>
+            </a:bodyPr>
+            <a:lstStyle/>
+            <a:p>
+              <a:pPr algn="ctr"/>
+              <a:r>
+                <a:rPr lang="fr-FR" dirty="0" smtClean="0"/>
+                <a:t>209.85.245.81</a:t>
+              </a:r>
+              <a:endParaRPr lang="en-US" dirty="0"/>
+            </a:p>
+          </p:txBody>
+        </p:sp>
+      </p:grpSp>
+      <p:grpSp>
+        <p:nvGrpSpPr>
+          <p:cNvPr id="40" name="Group 39"/>
+          <p:cNvGrpSpPr/>
+          <p:nvPr/>
+        </p:nvGrpSpPr>
+        <p:grpSpPr>
+          <a:xfrm>
+            <a:off x="3757377" y="5714953"/>
+            <a:ext cx="1444626" cy="369332"/>
+            <a:chOff x="3779912" y="3376736"/>
+            <a:chExt cx="1444626" cy="369332"/>
+          </a:xfrm>
+        </p:grpSpPr>
+        <p:sp>
+          <p:nvSpPr>
+            <p:cNvPr id="41" name="Rectangle 40"/>
+            <p:cNvSpPr/>
+            <p:nvPr/>
+          </p:nvSpPr>
+          <p:spPr>
+            <a:xfrm>
+              <a:off x="3779912" y="3376736"/>
+              <a:ext cx="1444626" cy="369332"/>
+            </a:xfrm>
+            <a:prstGeom prst="rect">
+              <a:avLst/>
+            </a:prstGeom>
+          </p:spPr>
+          <p:style>
+            <a:lnRef idx="2">
+              <a:schemeClr val="accent1">
+                <a:shade val="50000"/>
+              </a:schemeClr>
+            </a:lnRef>
+            <a:fillRef idx="1">
+              <a:schemeClr val="accent1"/>
+            </a:fillRef>
+            <a:effectRef idx="0">
+              <a:schemeClr val="accent1"/>
+            </a:effectRef>
+            <a:fontRef idx="minor">
+              <a:schemeClr val="lt1"/>
+            </a:fontRef>
+          </p:style>
+          <p:txBody>
+            <a:bodyPr rtlCol="0" anchor="ctr"/>
+            <a:lstStyle/>
+            <a:p>
+              <a:pPr algn="ctr"/>
+              <a:endParaRPr lang="en-US"/>
+            </a:p>
+          </p:txBody>
+        </p:sp>
+        <p:sp>
+          <p:nvSpPr>
+            <p:cNvPr id="42" name="TextBox 41"/>
+            <p:cNvSpPr txBox="1"/>
+            <p:nvPr/>
+          </p:nvSpPr>
+          <p:spPr>
+            <a:xfrm>
+              <a:off x="3826401" y="3376736"/>
+              <a:ext cx="1351653" cy="369332"/>
+            </a:xfrm>
+            <a:prstGeom prst="rect">
+              <a:avLst/>
+            </a:prstGeom>
+            <a:noFill/>
+          </p:spPr>
+          <p:txBody>
+            <a:bodyPr wrap="none" rtlCol="0">
+              <a:spAutoFit/>
+            </a:bodyPr>
+            <a:lstStyle/>
+            <a:p>
+              <a:pPr algn="ctr"/>
+              <a:r>
+                <a:rPr lang="fr-FR" dirty="0" smtClean="0"/>
+                <a:t>216.239.51.110</a:t>
+              </a:r>
+              <a:endParaRPr lang="en-US" dirty="0"/>
+            </a:p>
+          </p:txBody>
+        </p:sp>
+      </p:grpSp>
+      <p:grpSp>
+        <p:nvGrpSpPr>
+          <p:cNvPr id="43" name="Group 42"/>
+          <p:cNvGrpSpPr/>
+          <p:nvPr/>
+        </p:nvGrpSpPr>
+        <p:grpSpPr>
+          <a:xfrm>
+            <a:off x="3757377" y="2943938"/>
+            <a:ext cx="1444626" cy="369332"/>
+            <a:chOff x="3779912" y="3376736"/>
+            <a:chExt cx="1444626" cy="369332"/>
+          </a:xfrm>
+        </p:grpSpPr>
+        <p:sp>
+          <p:nvSpPr>
+            <p:cNvPr id="44" name="Rectangle 43"/>
+            <p:cNvSpPr/>
+            <p:nvPr/>
+          </p:nvSpPr>
+          <p:spPr>
+            <a:xfrm>
+              <a:off x="3779912" y="3376736"/>
+              <a:ext cx="1444626" cy="369332"/>
+            </a:xfrm>
+            <a:prstGeom prst="rect">
+              <a:avLst/>
+            </a:prstGeom>
+          </p:spPr>
+          <p:style>
+            <a:lnRef idx="2">
+              <a:schemeClr val="accent1">
+                <a:shade val="50000"/>
+              </a:schemeClr>
+            </a:lnRef>
+            <a:fillRef idx="1">
+              <a:schemeClr val="accent1"/>
+            </a:fillRef>
+            <a:effectRef idx="0">
+              <a:schemeClr val="accent1"/>
+            </a:effectRef>
+            <a:fontRef idx="minor">
+              <a:schemeClr val="lt1"/>
+            </a:fontRef>
+          </p:style>
+          <p:txBody>
+            <a:bodyPr rtlCol="0" anchor="ctr"/>
+            <a:lstStyle/>
+            <a:p>
+              <a:pPr algn="ctr"/>
+              <a:endParaRPr lang="en-US"/>
+            </a:p>
+          </p:txBody>
+        </p:sp>
+        <p:sp>
+          <p:nvSpPr>
+            <p:cNvPr id="45" name="TextBox 44"/>
+            <p:cNvSpPr txBox="1"/>
+            <p:nvPr/>
+          </p:nvSpPr>
+          <p:spPr>
+            <a:xfrm>
+              <a:off x="3779912" y="3376736"/>
+              <a:ext cx="1444626" cy="369332"/>
+            </a:xfrm>
+            <a:prstGeom prst="rect">
+              <a:avLst/>
+            </a:prstGeom>
+            <a:noFill/>
+          </p:spPr>
+          <p:txBody>
+            <a:bodyPr wrap="none" rtlCol="0">
+              <a:spAutoFit/>
+            </a:bodyPr>
+            <a:lstStyle/>
+            <a:p>
+              <a:pPr algn="ctr"/>
+              <a:r>
+                <a:rPr lang="fr-FR" dirty="0" smtClean="0"/>
+                <a:t>213.245.254.145</a:t>
+              </a:r>
+              <a:endParaRPr lang="en-US" dirty="0"/>
+            </a:p>
+          </p:txBody>
+        </p:sp>
+      </p:grpSp>
+      <p:cxnSp>
+        <p:nvCxnSpPr>
+          <p:cNvPr id="46" name="Straight Arrow Connector 45"/>
+          <p:cNvCxnSpPr>
+            <a:stCxn id="10" idx="3"/>
+            <a:endCxn id="6" idx="1"/>
+          </p:cNvCxnSpPr>
+          <p:nvPr/>
+        </p:nvCxnSpPr>
+        <p:spPr>
+          <a:xfrm flipV="1">
+            <a:off x="2267744" y="2020198"/>
+            <a:ext cx="1476356" cy="1371927"/>
+          </a:xfrm>
+          <a:prstGeom prst="straightConnector1">
+            <a:avLst/>
+          </a:prstGeom>
+          <a:ln>
+            <a:tailEnd type="arrow"/>
+          </a:ln>
+        </p:spPr>
+        <p:style>
+          <a:lnRef idx="1">
+            <a:schemeClr val="dk1"/>
+          </a:lnRef>
+          <a:fillRef idx="0">
+            <a:schemeClr val="dk1"/>
+          </a:fillRef>
+          <a:effectRef idx="0">
+            <a:schemeClr val="dk1"/>
+          </a:effectRef>
+          <a:fontRef idx="minor">
+            <a:schemeClr val="tx1"/>
+          </a:fontRef>
+        </p:style>
+      </p:cxnSp>
+      <p:cxnSp>
+        <p:nvCxnSpPr>
+          <p:cNvPr id="50" name="Straight Arrow Connector 49"/>
+          <p:cNvCxnSpPr>
+            <a:stCxn id="3" idx="2"/>
+            <a:endCxn id="22" idx="0"/>
+          </p:cNvCxnSpPr>
+          <p:nvPr/>
+        </p:nvCxnSpPr>
+        <p:spPr>
+          <a:xfrm>
+            <a:off x="4479690" y="2204864"/>
+            <a:ext cx="0" cy="184871"/>
+          </a:xfrm>
+          <a:prstGeom prst="straightConnector1">
+            <a:avLst/>
+          </a:prstGeom>
+          <a:ln>
+            <a:tailEnd type="arrow"/>
+          </a:ln>
+        </p:spPr>
+        <p:style>
+          <a:lnRef idx="1">
+            <a:schemeClr val="dk1"/>
+          </a:lnRef>
+          <a:fillRef idx="0">
+            <a:schemeClr val="dk1"/>
+          </a:fillRef>
+          <a:effectRef idx="0">
+            <a:schemeClr val="dk1"/>
+          </a:effectRef>
+          <a:fontRef idx="minor">
+            <a:schemeClr val="tx1"/>
+          </a:fontRef>
+        </p:style>
+      </p:cxnSp>
+      <p:cxnSp>
+        <p:nvCxnSpPr>
+          <p:cNvPr id="52" name="Straight Arrow Connector 51"/>
+          <p:cNvCxnSpPr>
+            <a:stCxn id="21" idx="2"/>
+            <a:endCxn id="45" idx="0"/>
+          </p:cNvCxnSpPr>
+          <p:nvPr/>
+        </p:nvCxnSpPr>
+        <p:spPr>
+          <a:xfrm>
+            <a:off x="4479690" y="2759067"/>
+            <a:ext cx="0" cy="184871"/>
+          </a:xfrm>
+          <a:prstGeom prst="straightConnector1">
+            <a:avLst/>
+          </a:prstGeom>
+          <a:ln>
+            <a:tailEnd type="arrow"/>
+          </a:ln>
+        </p:spPr>
+        <p:style>
+          <a:lnRef idx="1">
+            <a:schemeClr val="dk1"/>
+          </a:lnRef>
+          <a:fillRef idx="0">
+            <a:schemeClr val="dk1"/>
+          </a:fillRef>
+          <a:effectRef idx="0">
+            <a:schemeClr val="dk1"/>
+          </a:effectRef>
+          <a:fontRef idx="minor">
+            <a:schemeClr val="tx1"/>
+          </a:fontRef>
+        </p:style>
+      </p:cxnSp>
+      <p:cxnSp>
+        <p:nvCxnSpPr>
+          <p:cNvPr id="54" name="Straight Arrow Connector 53"/>
+          <p:cNvCxnSpPr>
+            <a:stCxn id="45" idx="2"/>
+            <a:endCxn id="30" idx="0"/>
+          </p:cNvCxnSpPr>
+          <p:nvPr/>
+        </p:nvCxnSpPr>
+        <p:spPr>
+          <a:xfrm>
+            <a:off x="4479690" y="3313270"/>
+            <a:ext cx="2" cy="184871"/>
+          </a:xfrm>
+          <a:prstGeom prst="straightConnector1">
+            <a:avLst/>
+          </a:prstGeom>
+          <a:ln>
+            <a:tailEnd type="arrow"/>
+          </a:ln>
+        </p:spPr>
+        <p:style>
+          <a:lnRef idx="1">
+            <a:schemeClr val="dk1"/>
+          </a:lnRef>
+          <a:fillRef idx="0">
+            <a:schemeClr val="dk1"/>
+          </a:fillRef>
+          <a:effectRef idx="0">
+            <a:schemeClr val="dk1"/>
+          </a:effectRef>
+          <a:fontRef idx="minor">
+            <a:schemeClr val="tx1"/>
+          </a:fontRef>
+        </p:style>
+      </p:cxnSp>
+      <p:cxnSp>
+        <p:nvCxnSpPr>
+          <p:cNvPr id="56" name="Straight Arrow Connector 55"/>
+          <p:cNvCxnSpPr>
+            <a:stCxn id="29" idx="2"/>
+            <a:endCxn id="33" idx="0"/>
+          </p:cNvCxnSpPr>
+          <p:nvPr/>
+        </p:nvCxnSpPr>
+        <p:spPr>
+          <a:xfrm>
+            <a:off x="4479690" y="3867473"/>
+            <a:ext cx="2" cy="184871"/>
+          </a:xfrm>
+          <a:prstGeom prst="straightConnector1">
+            <a:avLst/>
+          </a:prstGeom>
+          <a:ln>
+            <a:tailEnd type="arrow"/>
+          </a:ln>
+        </p:spPr>
+        <p:style>
+          <a:lnRef idx="1">
+            <a:schemeClr val="dk1"/>
+          </a:lnRef>
+          <a:fillRef idx="0">
+            <a:schemeClr val="dk1"/>
+          </a:fillRef>
+          <a:effectRef idx="0">
+            <a:schemeClr val="dk1"/>
+          </a:effectRef>
+          <a:fontRef idx="minor">
+            <a:schemeClr val="tx1"/>
+          </a:fontRef>
+        </p:style>
+      </p:cxnSp>
+      <p:cxnSp>
+        <p:nvCxnSpPr>
+          <p:cNvPr id="58" name="Straight Arrow Connector 57"/>
+          <p:cNvCxnSpPr>
+            <a:stCxn id="32" idx="2"/>
+            <a:endCxn id="36" idx="0"/>
+          </p:cNvCxnSpPr>
+          <p:nvPr/>
+        </p:nvCxnSpPr>
+        <p:spPr>
+          <a:xfrm>
+            <a:off x="4479690" y="4421676"/>
+            <a:ext cx="3" cy="184871"/>
+          </a:xfrm>
+          <a:prstGeom prst="straightConnector1">
+            <a:avLst/>
+          </a:prstGeom>
+          <a:ln>
+            <a:tailEnd type="arrow"/>
+          </a:ln>
+        </p:spPr>
+        <p:style>
+          <a:lnRef idx="1">
+            <a:schemeClr val="dk1"/>
+          </a:lnRef>
+          <a:fillRef idx="0">
+            <a:schemeClr val="dk1"/>
+          </a:fillRef>
+          <a:effectRef idx="0">
+            <a:schemeClr val="dk1"/>
+          </a:effectRef>
+          <a:fontRef idx="minor">
+            <a:schemeClr val="tx1"/>
+          </a:fontRef>
+        </p:style>
+      </p:cxnSp>
+      <p:cxnSp>
+        <p:nvCxnSpPr>
+          <p:cNvPr id="60" name="Straight Arrow Connector 59"/>
+          <p:cNvCxnSpPr>
+            <a:stCxn id="35" idx="2"/>
+            <a:endCxn id="39" idx="0"/>
+          </p:cNvCxnSpPr>
+          <p:nvPr/>
+        </p:nvCxnSpPr>
+        <p:spPr>
+          <a:xfrm>
+            <a:off x="4479690" y="4975879"/>
+            <a:ext cx="3" cy="184871"/>
+          </a:xfrm>
+          <a:prstGeom prst="straightConnector1">
+            <a:avLst/>
+          </a:prstGeom>
+          <a:ln>
+            <a:tailEnd type="arrow"/>
+          </a:ln>
+        </p:spPr>
+        <p:style>
+          <a:lnRef idx="1">
+            <a:schemeClr val="dk1"/>
+          </a:lnRef>
+          <a:fillRef idx="0">
+            <a:schemeClr val="dk1"/>
+          </a:fillRef>
+          <a:effectRef idx="0">
+            <a:schemeClr val="dk1"/>
+          </a:effectRef>
+          <a:fontRef idx="minor">
+            <a:schemeClr val="tx1"/>
+          </a:fontRef>
+        </p:style>
+      </p:cxnSp>
+      <p:cxnSp>
+        <p:nvCxnSpPr>
+          <p:cNvPr id="62" name="Straight Arrow Connector 61"/>
+          <p:cNvCxnSpPr>
+            <a:stCxn id="38" idx="2"/>
+            <a:endCxn id="42" idx="0"/>
+          </p:cNvCxnSpPr>
+          <p:nvPr/>
+        </p:nvCxnSpPr>
+        <p:spPr>
+          <a:xfrm>
+            <a:off x="4479690" y="5530082"/>
+            <a:ext cx="3" cy="184871"/>
+          </a:xfrm>
+          <a:prstGeom prst="straightConnector1">
+            <a:avLst/>
+          </a:prstGeom>
+          <a:ln>
+            <a:tailEnd type="arrow"/>
+          </a:ln>
+        </p:spPr>
+        <p:style>
+          <a:lnRef idx="1">
+            <a:schemeClr val="dk1"/>
+          </a:lnRef>
+          <a:fillRef idx="0">
+            <a:schemeClr val="dk1"/>
+          </a:fillRef>
+          <a:effectRef idx="0">
+            <a:schemeClr val="dk1"/>
+          </a:effectRef>
+          <a:fontRef idx="minor">
+            <a:schemeClr val="tx1"/>
+          </a:fontRef>
+        </p:style>
+      </p:cxnSp>
+      <p:cxnSp>
+        <p:nvCxnSpPr>
+          <p:cNvPr id="64" name="Straight Arrow Connector 63"/>
+          <p:cNvCxnSpPr>
+            <a:stCxn id="41" idx="2"/>
+            <a:endCxn id="24" idx="0"/>
+          </p:cNvCxnSpPr>
+          <p:nvPr/>
+        </p:nvCxnSpPr>
+        <p:spPr>
+          <a:xfrm>
+            <a:off x="4479690" y="6084285"/>
+            <a:ext cx="3" cy="184868"/>
+          </a:xfrm>
+          <a:prstGeom prst="straightConnector1">
+            <a:avLst/>
+          </a:prstGeom>
+          <a:ln>
+            <a:tailEnd type="arrow"/>
+          </a:ln>
+        </p:spPr>
+        <p:style>
+          <a:lnRef idx="1">
+            <a:schemeClr val="dk1"/>
+          </a:lnRef>
+          <a:fillRef idx="0">
+            <a:schemeClr val="dk1"/>
+          </a:fillRef>
+          <a:effectRef idx="0">
+            <a:schemeClr val="dk1"/>
+          </a:effectRef>
+          <a:fontRef idx="minor">
+            <a:schemeClr val="tx1"/>
+          </a:fontRef>
+        </p:style>
+      </p:cxnSp>
+      <p:cxnSp>
+        <p:nvCxnSpPr>
+          <p:cNvPr id="66" name="Straight Arrow Connector 65"/>
+          <p:cNvCxnSpPr>
+            <a:stCxn id="23" idx="3"/>
+            <a:endCxn id="14" idx="1"/>
+          </p:cNvCxnSpPr>
+          <p:nvPr/>
+        </p:nvCxnSpPr>
+        <p:spPr>
+          <a:xfrm flipV="1">
+            <a:off x="5202003" y="3392125"/>
+            <a:ext cx="1320777" cy="3061694"/>
+          </a:xfrm>
+          <a:prstGeom prst="straightConnector1">
+            <a:avLst/>
+          </a:prstGeom>
+          <a:ln>
+            <a:tailEnd type="arrow"/>
+          </a:ln>
+        </p:spPr>
+        <p:style>
+          <a:lnRef idx="1">
+            <a:schemeClr val="dk1"/>
+          </a:lnRef>
+          <a:fillRef idx="0">
+            <a:schemeClr val="dk1"/>
+          </a:fillRef>
+          <a:effectRef idx="0">
+            <a:schemeClr val="dk1"/>
+          </a:effectRef>
+          <a:fontRef idx="minor">
+            <a:schemeClr val="tx1"/>
+          </a:fontRef>
+        </p:style>
+      </p:cxnSp>
+      <p:sp>
+        <p:nvSpPr>
+          <p:cNvPr id="69" name="TextBox 68"/>
+          <p:cNvSpPr txBox="1"/>
+          <p:nvPr/>
+        </p:nvSpPr>
+        <p:spPr>
+          <a:xfrm>
+            <a:off x="539552" y="4437112"/>
+            <a:ext cx="2079800" cy="369332"/>
+          </a:xfrm>
+          <a:prstGeom prst="rect">
+            <a:avLst/>
+          </a:prstGeom>
+          <a:noFill/>
+        </p:spPr>
+        <p:txBody>
+          <a:bodyPr wrap="none" rtlCol="0">
+            <a:spAutoFit/>
+          </a:bodyPr>
+          <a:lstStyle/>
+          <a:p>
+            <a:r>
+              <a:rPr lang="fr-FR" dirty="0" smtClean="0"/>
+              <a:t>Durée du transfert : 20ms</a:t>
+            </a:r>
+            <a:endParaRPr lang="en-US" dirty="0"/>
+          </a:p>
+        </p:txBody>
+      </p:sp>
+    </p:spTree>
+    <p:extLst>
+      <p:ext uri="{BB962C8B-B14F-4D97-AF65-F5344CB8AC3E}">
+        <p14:creationId xmlns:p14="http://schemas.microsoft.com/office/powerpoint/2010/main" val="724441117"/>
+      </p:ext>
+    </p:extLst>
+  </p:cSld>
+  <p:clrMapOvr>
+    <a:masterClrMapping/>
+  </p:clrMapOvr>
+</p:sld>
+</file>
+
+<file path=ppt/slides/slide6.xml><?xml version="1.0" encoding="utf-8"?>
+<p:sld xmlns:a="http://schemas.openxmlformats.org/drawingml/2006/main" xmlns:r="http://schemas.openxmlformats.org/officeDocument/2006/relationships" xmlns:p="http://schemas.openxmlformats.org/presentationml/2006/main">
+  <p:cSld>
+    <p:spTree>
+      <p:nvGrpSpPr>
+        <p:cNvPr id="1" name=""/>
+        <p:cNvGrpSpPr/>
+        <p:nvPr/>
+      </p:nvGrpSpPr>
+      <p:grpSpPr>
+        <a:xfrm>
+          <a:off x="0" y="0"/>
+          <a:ext cx="0" cy="0"/>
+          <a:chOff x="0" y="0"/>
+          <a:chExt cx="0" cy="0"/>
+        </a:xfrm>
+      </p:grpSpPr>
+      <p:sp>
+        <p:nvSpPr>
+          <p:cNvPr id="2" name="Title 1"/>
+          <p:cNvSpPr>
+            <a:spLocks noGrp="1"/>
+          </p:cNvSpPr>
+          <p:nvPr>
+            <p:ph type="title"/>
+          </p:nvPr>
+        </p:nvSpPr>
+        <p:spPr>
+          <a:xfrm>
+            <a:off x="457200" y="0"/>
+            <a:ext cx="8229600" cy="1115616"/>
+          </a:xfrm>
+        </p:spPr>
+        <p:txBody>
+          <a:bodyPr>
+            <a:normAutofit/>
+          </a:bodyPr>
+          <a:lstStyle/>
+          <a:p>
+            <a:r>
+              <a:rPr lang="fr-FR" sz="4000" dirty="0" smtClean="0"/>
+              <a:t>Internet est-elle une boîte noire ?</a:t>
+            </a:r>
+            <a:endParaRPr lang="en-US" sz="4000" dirty="0"/>
+          </a:p>
+        </p:txBody>
+      </p:sp>
+      <p:sp>
+        <p:nvSpPr>
+          <p:cNvPr id="3" name="TextBox 2"/>
+          <p:cNvSpPr txBox="1"/>
+          <p:nvPr/>
+        </p:nvSpPr>
+        <p:spPr>
+          <a:xfrm>
+            <a:off x="216771" y="1484784"/>
+            <a:ext cx="4589077" cy="1938992"/>
+          </a:xfrm>
+          <a:prstGeom prst="rect">
+            <a:avLst/>
+          </a:prstGeom>
+          <a:noFill/>
+        </p:spPr>
+        <p:txBody>
+          <a:bodyPr wrap="none" rtlCol="0">
+            <a:spAutoFit/>
+          </a:bodyPr>
+          <a:lstStyle/>
+          <a:p>
+            <a:pPr marL="342900" indent="-342900">
+              <a:lnSpc>
+                <a:spcPct val="150000"/>
+              </a:lnSpc>
+              <a:buFont typeface="Arial" panose="020B0604020202020204" pitchFamily="34" charset="0"/>
+              <a:buChar char="•"/>
+            </a:pPr>
+            <a:r>
+              <a:rPr lang="fr-FR" sz="2000" dirty="0" smtClean="0"/>
+              <a:t>Construction extraordinairement complexe</a:t>
+            </a:r>
+          </a:p>
+          <a:p>
+            <a:pPr marL="342900" indent="-342900">
+              <a:lnSpc>
+                <a:spcPct val="150000"/>
+              </a:lnSpc>
+              <a:buFont typeface="Arial" panose="020B0604020202020204" pitchFamily="34" charset="0"/>
+              <a:buChar char="•"/>
+            </a:pPr>
+            <a:r>
+              <a:rPr lang="fr-FR" sz="2000" dirty="0" smtClean="0"/>
+              <a:t>Histoire longue et décentralisée</a:t>
+            </a:r>
+          </a:p>
+          <a:p>
+            <a:pPr marL="342900" indent="-342900">
+              <a:lnSpc>
+                <a:spcPct val="150000"/>
+              </a:lnSpc>
+              <a:buFont typeface="Arial" panose="020B0604020202020204" pitchFamily="34" charset="0"/>
+              <a:buChar char="•"/>
+            </a:pPr>
+            <a:r>
+              <a:rPr lang="fr-FR" sz="2000" dirty="0" smtClean="0"/>
+              <a:t>Structure « </a:t>
+            </a:r>
+            <a:r>
+              <a:rPr lang="fr-FR" sz="2000" dirty="0" err="1" smtClean="0"/>
+              <a:t>bottom</a:t>
+            </a:r>
+            <a:r>
+              <a:rPr lang="fr-FR" sz="2000" dirty="0" smtClean="0"/>
+              <a:t>-up » plutôt que « top-down »</a:t>
+            </a:r>
+          </a:p>
+          <a:p>
+            <a:pPr marL="342900" indent="-342900">
+              <a:lnSpc>
+                <a:spcPct val="150000"/>
+              </a:lnSpc>
+              <a:buFont typeface="Arial" panose="020B0604020202020204" pitchFamily="34" charset="0"/>
+              <a:buChar char="•"/>
+            </a:pPr>
+            <a:r>
+              <a:rPr lang="fr-FR" sz="2000" dirty="0" smtClean="0"/>
+              <a:t>Pas de carte précise</a:t>
+            </a:r>
+          </a:p>
+        </p:txBody>
+      </p:sp>
+      <p:sp>
+        <p:nvSpPr>
+          <p:cNvPr id="18" name="TextBox 17"/>
+          <p:cNvSpPr txBox="1"/>
+          <p:nvPr/>
+        </p:nvSpPr>
+        <p:spPr>
+          <a:xfrm>
+            <a:off x="5265908" y="1484784"/>
+            <a:ext cx="3620928" cy="1938992"/>
+          </a:xfrm>
+          <a:prstGeom prst="rect">
+            <a:avLst/>
+          </a:prstGeom>
+          <a:noFill/>
+        </p:spPr>
+        <p:txBody>
+          <a:bodyPr wrap="none" rtlCol="0">
+            <a:spAutoFit/>
+          </a:bodyPr>
+          <a:lstStyle/>
+          <a:p>
+            <a:pPr algn="r">
+              <a:lnSpc>
+                <a:spcPct val="150000"/>
+              </a:lnSpc>
+            </a:pPr>
+            <a:r>
+              <a:rPr lang="fr-FR" sz="2000" dirty="0" smtClean="0">
+                <a:solidFill>
+                  <a:schemeClr val="bg2">
+                    <a:lumMod val="50000"/>
+                  </a:schemeClr>
+                </a:solidFill>
+              </a:rPr>
+              <a:t>Milliards d’ordinateurs sur la terre entière</a:t>
+            </a:r>
+          </a:p>
+          <a:p>
+            <a:pPr algn="r">
+              <a:lnSpc>
+                <a:spcPct val="150000"/>
+              </a:lnSpc>
+            </a:pPr>
+            <a:r>
+              <a:rPr lang="fr-FR" sz="2000" dirty="0" smtClean="0">
+                <a:solidFill>
+                  <a:schemeClr val="bg2">
+                    <a:lumMod val="50000"/>
+                  </a:schemeClr>
+                </a:solidFill>
+              </a:rPr>
+              <a:t>Plus de 40 ans sans gouvernance centrale</a:t>
+            </a:r>
+          </a:p>
+          <a:p>
+            <a:pPr algn="r">
+              <a:lnSpc>
+                <a:spcPct val="150000"/>
+              </a:lnSpc>
+            </a:pPr>
+            <a:r>
+              <a:rPr lang="fr-FR" sz="2000" dirty="0" smtClean="0">
+                <a:solidFill>
+                  <a:schemeClr val="bg2">
+                    <a:lumMod val="50000"/>
+                  </a:schemeClr>
+                </a:solidFill>
+              </a:rPr>
+              <a:t>N’importe qui peut brancher un terminal</a:t>
+            </a:r>
+          </a:p>
+          <a:p>
+            <a:pPr algn="r">
+              <a:lnSpc>
+                <a:spcPct val="150000"/>
+              </a:lnSpc>
+            </a:pPr>
+            <a:r>
+              <a:rPr lang="fr-FR" sz="2000" dirty="0" smtClean="0">
+                <a:solidFill>
+                  <a:schemeClr val="bg2">
+                    <a:lumMod val="50000"/>
+                  </a:schemeClr>
+                </a:solidFill>
+              </a:rPr>
+              <a:t>Seulement des fragments parcellaires</a:t>
+            </a:r>
+          </a:p>
+        </p:txBody>
+      </p:sp>
+      <p:sp>
+        <p:nvSpPr>
+          <p:cNvPr id="6" name="TextBox 5"/>
+          <p:cNvSpPr txBox="1"/>
+          <p:nvPr/>
+        </p:nvSpPr>
+        <p:spPr>
+          <a:xfrm>
+            <a:off x="467544" y="3645024"/>
+            <a:ext cx="7903510" cy="2400657"/>
+          </a:xfrm>
+          <a:prstGeom prst="rect">
+            <a:avLst/>
+          </a:prstGeom>
+          <a:noFill/>
+        </p:spPr>
+        <p:txBody>
+          <a:bodyPr wrap="none" rtlCol="0">
+            <a:spAutoFit/>
+          </a:bodyPr>
+          <a:lstStyle/>
+          <a:p>
+            <a:pPr>
+              <a:lnSpc>
+                <a:spcPct val="150000"/>
+              </a:lnSpc>
+            </a:pPr>
+            <a:r>
+              <a:rPr lang="fr-FR" sz="2000" dirty="0" smtClean="0"/>
+              <a:t>Le réseau </a:t>
+            </a:r>
+            <a:r>
+              <a:rPr lang="fr-FR" sz="2000" i="1" dirty="0" smtClean="0"/>
+              <a:t>fonctionne</a:t>
+            </a:r>
+            <a:r>
+              <a:rPr lang="fr-FR" sz="2000" dirty="0" smtClean="0"/>
+              <a:t>, il n’a pas (trop) de pannes, mais ses propriétés précises sont discutées :</a:t>
+            </a:r>
+          </a:p>
+          <a:p>
+            <a:pPr marL="285750" indent="-285750">
+              <a:lnSpc>
+                <a:spcPct val="150000"/>
+              </a:lnSpc>
+              <a:buFontTx/>
+              <a:buChar char="-"/>
+            </a:pPr>
+            <a:r>
+              <a:rPr lang="fr-FR" sz="2000" b="1" dirty="0" smtClean="0"/>
+              <a:t>Diamètre</a:t>
+            </a:r>
+            <a:r>
+              <a:rPr lang="fr-FR" sz="2000" dirty="0" smtClean="0"/>
+              <a:t> du réseau (longueur des routes)</a:t>
+            </a:r>
+          </a:p>
+          <a:p>
+            <a:pPr marL="285750" indent="-285750">
+              <a:lnSpc>
+                <a:spcPct val="150000"/>
+              </a:lnSpc>
+              <a:buFontTx/>
+              <a:buChar char="-"/>
+            </a:pPr>
+            <a:r>
+              <a:rPr lang="fr-FR" sz="2000" b="1" dirty="0" smtClean="0"/>
+              <a:t>Plus courts chemins </a:t>
+            </a:r>
+            <a:r>
+              <a:rPr lang="fr-FR" sz="2000" dirty="0" smtClean="0"/>
+              <a:t>(routes optimales)</a:t>
+            </a:r>
+          </a:p>
+          <a:p>
+            <a:pPr marL="285750" indent="-285750">
+              <a:lnSpc>
+                <a:spcPct val="150000"/>
+              </a:lnSpc>
+              <a:buFontTx/>
+              <a:buChar char="-"/>
+            </a:pPr>
+            <a:r>
+              <a:rPr lang="fr-FR" sz="2000" b="1" dirty="0" smtClean="0"/>
+              <a:t>Vulnérabilité</a:t>
+            </a:r>
+            <a:r>
+              <a:rPr lang="fr-FR" sz="2000" dirty="0" smtClean="0"/>
+              <a:t> aux attaques ciblées</a:t>
+            </a:r>
+          </a:p>
+          <a:p>
+            <a:pPr marL="285750" indent="-285750">
+              <a:lnSpc>
+                <a:spcPct val="150000"/>
+              </a:lnSpc>
+              <a:buFontTx/>
+              <a:buChar char="-"/>
+            </a:pPr>
+            <a:r>
+              <a:rPr lang="fr-FR" sz="2000" dirty="0" smtClean="0"/>
+              <a:t>Résilience aux </a:t>
+            </a:r>
+            <a:r>
+              <a:rPr lang="fr-FR" sz="2000" b="1" dirty="0" smtClean="0"/>
+              <a:t>pannes</a:t>
+            </a:r>
+          </a:p>
+        </p:txBody>
+      </p:sp>
+    </p:spTree>
+    <p:extLst>
+      <p:ext uri="{BB962C8B-B14F-4D97-AF65-F5344CB8AC3E}">
+        <p14:creationId xmlns:p14="http://schemas.microsoft.com/office/powerpoint/2010/main" val="2790096604"/>
+      </p:ext>
+    </p:extLst>
+  </p:cSld>
+  <p:clrMapOvr>
+    <a:masterClrMapping/>
+  </p:clrMapOvr>
+</p:sld>
+</file>
+
+<file path=ppt/slides/slide7.xml><?xml version="1.0" encoding="utf-8"?>
+<p:sld xmlns:a="http://schemas.openxmlformats.org/drawingml/2006/main" xmlns:r="http://schemas.openxmlformats.org/officeDocument/2006/relationships" xmlns:p="http://schemas.openxmlformats.org/presentationml/2006/main">
+  <p:cSld>
+    <p:spTree>
+      <p:nvGrpSpPr>
+        <p:cNvPr id="1" name=""/>
+        <p:cNvGrpSpPr/>
+        <p:nvPr/>
+      </p:nvGrpSpPr>
+      <p:grpSpPr>
+        <a:xfrm>
+          <a:off x="0" y="0"/>
+          <a:ext cx="0" cy="0"/>
+          <a:chOff x="0" y="0"/>
+          <a:chExt cx="0" cy="0"/>
+        </a:xfrm>
+      </p:grpSpPr>
+      <p:sp>
+        <p:nvSpPr>
+          <p:cNvPr id="2" name="Title 1"/>
+          <p:cNvSpPr>
+            <a:spLocks noGrp="1"/>
+          </p:cNvSpPr>
+          <p:nvPr>
+            <p:ph type="title"/>
+          </p:nvPr>
+        </p:nvSpPr>
+        <p:spPr>
+          <a:xfrm>
+            <a:off x="457200" y="0"/>
+            <a:ext cx="8229600" cy="1115616"/>
+          </a:xfrm>
+        </p:spPr>
+        <p:txBody>
+          <a:bodyPr>
+            <a:normAutofit/>
+          </a:bodyPr>
+          <a:lstStyle/>
+          <a:p>
+            <a:r>
+              <a:rPr lang="fr-FR" sz="4000" dirty="0" smtClean="0"/>
+              <a:t>Des enjeux majeurs</a:t>
+            </a:r>
+            <a:endParaRPr lang="en-US" sz="4000" dirty="0"/>
+          </a:p>
+        </p:txBody>
+      </p:sp>
+      <p:sp>
+        <p:nvSpPr>
+          <p:cNvPr id="4" name="TextBox 3"/>
+          <p:cNvSpPr txBox="1"/>
+          <p:nvPr/>
+        </p:nvSpPr>
+        <p:spPr>
+          <a:xfrm>
+            <a:off x="323528" y="1124744"/>
+            <a:ext cx="8280921" cy="2554545"/>
+          </a:xfrm>
+          <a:prstGeom prst="rect">
+            <a:avLst/>
+          </a:prstGeom>
+          <a:noFill/>
+        </p:spPr>
+        <p:txBody>
+          <a:bodyPr wrap="square" rtlCol="0">
+            <a:spAutoFit/>
+          </a:bodyPr>
+          <a:lstStyle/>
+          <a:p>
+            <a:r>
+              <a:rPr lang="fr-FR" sz="2400" u="sng" dirty="0" smtClean="0"/>
+              <a:t>Enjeux industriels</a:t>
+            </a:r>
+          </a:p>
+          <a:p>
+            <a:pPr marL="285750" indent="-285750">
+              <a:buFontTx/>
+              <a:buChar char="-"/>
+            </a:pPr>
+            <a:r>
+              <a:rPr lang="fr-FR" sz="2400" dirty="0" smtClean="0"/>
+              <a:t>Toute l’économie numérique repose sur l’intégrité et la fiabilité d’Internet</a:t>
+            </a:r>
+          </a:p>
+          <a:p>
+            <a:pPr marL="285750" indent="-285750">
+              <a:buFontTx/>
+              <a:buChar char="-"/>
+            </a:pPr>
+            <a:r>
+              <a:rPr lang="fr-FR" sz="2400" dirty="0" smtClean="0"/>
+              <a:t>Presque toutes les industries utilisent Internet à un niveau ou à un autre</a:t>
+            </a:r>
+          </a:p>
+          <a:p>
+            <a:pPr marL="285750" indent="-285750">
+              <a:buFontTx/>
+              <a:buChar char="-"/>
+            </a:pPr>
+            <a:r>
+              <a:rPr lang="fr-FR" sz="2400" dirty="0" smtClean="0"/>
+              <a:t>La mission d’Internet est d’être </a:t>
+            </a:r>
+            <a:r>
+              <a:rPr lang="fr-FR" sz="2400" b="1" dirty="0" smtClean="0"/>
+              <a:t>le </a:t>
+            </a:r>
+            <a:r>
+              <a:rPr lang="fr-FR" sz="2400" dirty="0" smtClean="0"/>
+              <a:t>réseau de télécommunication</a:t>
+            </a:r>
+          </a:p>
+          <a:p>
+            <a:endParaRPr lang="fr-FR" sz="1200" b="1" dirty="0"/>
+          </a:p>
+          <a:p>
+            <a:r>
+              <a:rPr lang="fr-FR" sz="2400" b="1" dirty="0" smtClean="0"/>
+              <a:t>Internet est un réseau stratégique pour pratiquement toute activité industrielle en 2015, </a:t>
+            </a:r>
+            <a:r>
+              <a:rPr lang="fr-FR" sz="2400" dirty="0" smtClean="0"/>
+              <a:t>au moins dans les pays fortement développés.</a:t>
+            </a:r>
+            <a:endParaRPr lang="en-US" sz="2400" dirty="0"/>
+          </a:p>
+        </p:txBody>
+      </p:sp>
+      <p:sp>
+        <p:nvSpPr>
+          <p:cNvPr id="8" name="TextBox 7"/>
+          <p:cNvSpPr txBox="1"/>
+          <p:nvPr/>
+        </p:nvSpPr>
+        <p:spPr>
+          <a:xfrm>
+            <a:off x="323528" y="3933056"/>
+            <a:ext cx="8280921" cy="2554545"/>
+          </a:xfrm>
+          <a:prstGeom prst="rect">
+            <a:avLst/>
+          </a:prstGeom>
+          <a:noFill/>
+        </p:spPr>
+        <p:txBody>
+          <a:bodyPr wrap="square" rtlCol="0">
+            <a:spAutoFit/>
+          </a:bodyPr>
+          <a:lstStyle/>
+          <a:p>
+            <a:r>
+              <a:rPr lang="fr-FR" sz="2400" u="sng" dirty="0" smtClean="0"/>
+              <a:t>Enjeux théoriques</a:t>
+            </a:r>
+          </a:p>
+          <a:p>
+            <a:pPr marL="285750" indent="-285750">
+              <a:buFontTx/>
+              <a:buChar char="-"/>
+            </a:pPr>
+            <a:r>
+              <a:rPr lang="fr-FR" sz="2400" dirty="0" smtClean="0"/>
+              <a:t>Théorie des graphes</a:t>
+            </a:r>
+          </a:p>
+          <a:p>
+            <a:pPr marL="285750" indent="-285750">
+              <a:buFontTx/>
+              <a:buChar char="-"/>
+            </a:pPr>
+            <a:r>
+              <a:rPr lang="fr-FR" sz="2400" dirty="0" smtClean="0"/>
+              <a:t>Métrologie des réseaux complexes</a:t>
+            </a:r>
+          </a:p>
+          <a:p>
+            <a:pPr marL="285750" indent="-285750">
+              <a:buFontTx/>
+              <a:buChar char="-"/>
+            </a:pPr>
+            <a:r>
+              <a:rPr lang="fr-FR" sz="2400" dirty="0" smtClean="0"/>
+              <a:t>Emergence et systèmes complexes</a:t>
+            </a:r>
+          </a:p>
+          <a:p>
+            <a:endParaRPr lang="fr-FR" sz="1200" dirty="0"/>
+          </a:p>
+          <a:p>
+            <a:r>
+              <a:rPr lang="fr-FR" sz="2400" b="1" dirty="0" smtClean="0"/>
+              <a:t>Internet est l’un des objets fondamentaux de plusieurs théories</a:t>
+            </a:r>
+            <a:r>
+              <a:rPr lang="fr-FR" sz="2400" dirty="0" smtClean="0"/>
+              <a:t>, particulièrement de théories au cœur des approches interdisciplinaires.</a:t>
+            </a:r>
+            <a:endParaRPr lang="en-US" sz="2400" dirty="0"/>
+          </a:p>
+        </p:txBody>
+      </p:sp>
+    </p:spTree>
+    <p:extLst>
+      <p:ext uri="{BB962C8B-B14F-4D97-AF65-F5344CB8AC3E}">
+        <p14:creationId xmlns:p14="http://schemas.microsoft.com/office/powerpoint/2010/main" val="3647498037"/>
+      </p:ext>
+    </p:extLst>
+  </p:cSld>
+  <p:clrMapOvr>
+    <a:masterClrMapping/>
+  </p:clrMapOvr>
+</p:sld>
+</file>
+
+<file path=ppt/slides/slide8.xml><?xml version="1.0" encoding="utf-8"?>
+<p:sld xmlns:a="http://schemas.openxmlformats.org/drawingml/2006/main" xmlns:r="http://schemas.openxmlformats.org/officeDocument/2006/relationships" xmlns:p="http://schemas.openxmlformats.org/presentationml/2006/main">
+  <p:cSld>
+    <p:spTree>
+      <p:nvGrpSpPr>
+        <p:cNvPr id="1" name=""/>
+        <p:cNvGrpSpPr/>
+        <p:nvPr/>
+      </p:nvGrpSpPr>
+      <p:grpSpPr>
+        <a:xfrm>
+          <a:off x="0" y="0"/>
+          <a:ext cx="0" cy="0"/>
+          <a:chOff x="0" y="0"/>
+          <a:chExt cx="0" cy="0"/>
+        </a:xfrm>
+      </p:grpSpPr>
+      <p:sp>
+        <p:nvSpPr>
+          <p:cNvPr id="2" name="Title 1"/>
+          <p:cNvSpPr>
+            <a:spLocks noGrp="1"/>
+          </p:cNvSpPr>
+          <p:nvPr>
+            <p:ph type="title"/>
+          </p:nvPr>
+        </p:nvSpPr>
+        <p:spPr>
+          <a:xfrm>
+            <a:off x="457200" y="0"/>
+            <a:ext cx="8229600" cy="1115616"/>
+          </a:xfrm>
+        </p:spPr>
+        <p:txBody>
+          <a:bodyPr>
+            <a:normAutofit/>
+          </a:bodyPr>
+          <a:lstStyle/>
+          <a:p>
+            <a:r>
+              <a:rPr lang="fr-FR" sz="4000" dirty="0" smtClean="0"/>
+              <a:t>Approches historiques</a:t>
+            </a:r>
+            <a:endParaRPr lang="en-US" sz="4000" dirty="0"/>
+          </a:p>
+        </p:txBody>
+      </p:sp>
+      <p:sp>
+        <p:nvSpPr>
+          <p:cNvPr id="3" name="TextBox 2"/>
+          <p:cNvSpPr txBox="1"/>
+          <p:nvPr/>
+        </p:nvSpPr>
+        <p:spPr>
+          <a:xfrm>
+            <a:off x="2606334" y="6084004"/>
+            <a:ext cx="3931333" cy="369332"/>
+          </a:xfrm>
+          <a:prstGeom prst="rect">
+            <a:avLst/>
+          </a:prstGeom>
+          <a:noFill/>
+        </p:spPr>
+        <p:txBody>
+          <a:bodyPr wrap="none" rtlCol="0">
+            <a:spAutoFit/>
+          </a:bodyPr>
+          <a:lstStyle/>
+          <a:p>
+            <a:pPr algn="ctr"/>
+            <a:r>
+              <a:rPr lang="fr-FR" dirty="0" smtClean="0"/>
+              <a:t>Carte du réseau ARPANET, </a:t>
+            </a:r>
+            <a:r>
+              <a:rPr lang="fr-FR" i="1" dirty="0" smtClean="0"/>
+              <a:t>BNN Technologies, </a:t>
+            </a:r>
+            <a:r>
+              <a:rPr lang="fr-FR" dirty="0" smtClean="0"/>
+              <a:t>1977</a:t>
+            </a:r>
+            <a:endParaRPr lang="en-US" i="1" dirty="0"/>
+          </a:p>
+        </p:txBody>
+      </p:sp>
+      <p:pic>
+        <p:nvPicPr>
+          <p:cNvPr id="1026" name="Picture 2" descr="C:\Users\Elie Rotenberg\git\phd\src\images\arpa-1977.jpg"/>
+          <p:cNvPicPr>
+            <a:picLocks noChangeAspect="1" noChangeArrowheads="1"/>
+          </p:cNvPicPr>
+          <p:nvPr/>
+        </p:nvPicPr>
+        <p:blipFill>
+          <a:blip r:embed="rId2" cstate="print">
+            <a:extLst>
+              <a:ext uri="{28A0092B-C50C-407E-A947-70E740481C1C}">
+                <a14:useLocalDpi xmlns:a14="http://schemas.microsoft.com/office/drawing/2010/main" val="0"/>
+              </a:ext>
+            </a:extLst>
+          </a:blip>
+          <a:srcRect/>
+          <a:stretch>
+            <a:fillRect/>
+          </a:stretch>
+        </p:blipFill>
+        <p:spPr bwMode="auto">
+          <a:xfrm>
+            <a:off x="1979712" y="2175308"/>
+            <a:ext cx="5184576" cy="3391804"/>
+          </a:xfrm>
+          <a:prstGeom prst="rect">
+            <a:avLst/>
+          </a:prstGeom>
+          <a:noFill/>
+          <a:extLst>
+            <a:ext uri="{909E8E84-426E-40DD-AFC4-6F175D3DCCD1}">
+              <a14:hiddenFill xmlns:a14="http://schemas.microsoft.com/office/drawing/2010/main">
+                <a:solidFill>
+                  <a:srgbClr val="FFFFFF"/>
+                </a:solidFill>
+              </a14:hiddenFill>
+            </a:ext>
+          </a:extLst>
+        </p:spPr>
+      </p:pic>
+      <p:sp>
+        <p:nvSpPr>
+          <p:cNvPr id="4" name="TextBox 3"/>
+          <p:cNvSpPr txBox="1"/>
+          <p:nvPr/>
+        </p:nvSpPr>
+        <p:spPr>
+          <a:xfrm>
+            <a:off x="467544" y="1196752"/>
+            <a:ext cx="6661311" cy="461665"/>
+          </a:xfrm>
+          <a:prstGeom prst="rect">
+            <a:avLst/>
+          </a:prstGeom>
+          <a:noFill/>
+        </p:spPr>
+        <p:txBody>
+          <a:bodyPr wrap="none" rtlCol="0">
+            <a:spAutoFit/>
+          </a:bodyPr>
+          <a:lstStyle/>
+          <a:p>
+            <a:r>
+              <a:rPr lang="fr-FR" sz="2400" dirty="0" smtClean="0"/>
+              <a:t>1) Cartes basées sur les déclarations des autorités administratives</a:t>
+            </a:r>
+            <a:endParaRPr lang="en-US" sz="2400" dirty="0"/>
+          </a:p>
+        </p:txBody>
+      </p:sp>
+    </p:spTree>
+    <p:extLst>
+      <p:ext uri="{BB962C8B-B14F-4D97-AF65-F5344CB8AC3E}">
+        <p14:creationId xmlns:p14="http://schemas.microsoft.com/office/powerpoint/2010/main" val="3787438928"/>
+      </p:ext>
+    </p:extLst>
+  </p:cSld>
+  <p:clrMapOvr>
+    <a:masterClrMapping/>
+  </p:clrMapOvr>
+</p:sld>
+</file>
+
+<file path=ppt/slides/slide9.xml><?xml version="1.0" encoding="utf-8"?>
+<p:sld xmlns:a="http://schemas.openxmlformats.org/drawingml/2006/main" xmlns:r="http://schemas.openxmlformats.org/officeDocument/2006/relationships" xmlns:p="http://schemas.openxmlformats.org/presentationml/2006/main">
+  <p:cSld>
+    <p:spTree>
+      <p:nvGrpSpPr>
+        <p:cNvPr id="1" name=""/>
+        <p:cNvGrpSpPr/>
+        <p:nvPr/>
+      </p:nvGrpSpPr>
+      <p:grpSpPr>
+        <a:xfrm>
+          <a:off x="0" y="0"/>
+          <a:ext cx="0" cy="0"/>
+          <a:chOff x="0" y="0"/>
+          <a:chExt cx="0" cy="0"/>
+        </a:xfrm>
+      </p:grpSpPr>
+      <p:sp>
+        <p:nvSpPr>
+          <p:cNvPr id="2" name="Title 1"/>
+          <p:cNvSpPr>
+            <a:spLocks noGrp="1"/>
+          </p:cNvSpPr>
+          <p:nvPr>
+            <p:ph type="title"/>
+          </p:nvPr>
+        </p:nvSpPr>
+        <p:spPr>
+          <a:xfrm>
+            <a:off x="457200" y="0"/>
+            <a:ext cx="8229600" cy="1115616"/>
+          </a:xfrm>
+        </p:spPr>
+        <p:txBody>
+          <a:bodyPr>
+            <a:normAutofit/>
+          </a:bodyPr>
+          <a:lstStyle/>
+          <a:p>
+            <a:r>
+              <a:rPr lang="fr-FR" sz="4000" dirty="0" smtClean="0"/>
+              <a:t>Approches historiques</a:t>
+            </a:r>
+            <a:endParaRPr lang="en-US" sz="4000" dirty="0"/>
+          </a:p>
+        </p:txBody>
+      </p:sp>
+      <p:sp>
+        <p:nvSpPr>
+          <p:cNvPr id="3" name="TextBox 2"/>
+          <p:cNvSpPr txBox="1"/>
+          <p:nvPr/>
+        </p:nvSpPr>
+        <p:spPr>
+          <a:xfrm>
+            <a:off x="2716268" y="6084004"/>
+            <a:ext cx="3711465" cy="369332"/>
+          </a:xfrm>
+          <a:prstGeom prst="rect">
+            <a:avLst/>
+          </a:prstGeom>
+          <a:noFill/>
+        </p:spPr>
+        <p:txBody>
+          <a:bodyPr wrap="none" rtlCol="0">
+            <a:spAutoFit/>
+          </a:bodyPr>
+          <a:lstStyle/>
+          <a:p>
+            <a:pPr algn="ctr"/>
+            <a:r>
+              <a:rPr lang="fr-FR" dirty="0" smtClean="0"/>
+              <a:t>Réseau généré par simulation, </a:t>
+            </a:r>
+            <a:r>
+              <a:rPr lang="fr-FR" dirty="0" err="1" smtClean="0"/>
+              <a:t>Doar</a:t>
+            </a:r>
+            <a:r>
+              <a:rPr lang="fr-FR" dirty="0" smtClean="0"/>
+              <a:t> e</a:t>
+            </a:r>
+            <a:r>
+              <a:rPr lang="fr-FR" i="1" dirty="0" smtClean="0"/>
+              <a:t>t al., 1996</a:t>
+            </a:r>
+            <a:endParaRPr lang="en-US" i="1" dirty="0"/>
+          </a:p>
+        </p:txBody>
+      </p:sp>
+      <p:sp>
+        <p:nvSpPr>
+          <p:cNvPr id="4" name="TextBox 3"/>
+          <p:cNvSpPr txBox="1"/>
+          <p:nvPr/>
+        </p:nvSpPr>
+        <p:spPr>
+          <a:xfrm>
+            <a:off x="467544" y="1196752"/>
+            <a:ext cx="8020914" cy="461665"/>
+          </a:xfrm>
+          <a:prstGeom prst="rect">
+            <a:avLst/>
+          </a:prstGeom>
+          <a:noFill/>
+        </p:spPr>
+        <p:txBody>
+          <a:bodyPr wrap="none" rtlCol="0">
+            <a:spAutoFit/>
+          </a:bodyPr>
+          <a:lstStyle/>
+          <a:p>
+            <a:r>
+              <a:rPr lang="fr-FR" sz="2400" dirty="0"/>
+              <a:t>2</a:t>
+            </a:r>
+            <a:r>
+              <a:rPr lang="fr-FR" sz="2400" dirty="0" smtClean="0"/>
+              <a:t>) Graphes générés à partir d’une connaissance </a:t>
+            </a:r>
+            <a:r>
+              <a:rPr lang="fr-FR" sz="2400" i="1" dirty="0" smtClean="0"/>
+              <a:t>a priori </a:t>
+            </a:r>
+            <a:r>
+              <a:rPr lang="fr-FR" sz="2400" dirty="0" smtClean="0"/>
+              <a:t>des éléments du réseau</a:t>
+            </a:r>
+            <a:endParaRPr lang="en-US" sz="2400" dirty="0"/>
+          </a:p>
+        </p:txBody>
+      </p:sp>
+      <p:pic>
+        <p:nvPicPr>
+          <p:cNvPr id="2050" name="Picture 2"/>
+          <p:cNvPicPr>
+            <a:picLocks noChangeAspect="1" noChangeArrowheads="1"/>
+          </p:cNvPicPr>
+          <p:nvPr/>
+        </p:nvPicPr>
+        <p:blipFill>
+          <a:blip r:embed="rId2">
+            <a:extLst>
+              <a:ext uri="{28A0092B-C50C-407E-A947-70E740481C1C}">
+                <a14:useLocalDpi xmlns:a14="http://schemas.microsoft.com/office/drawing/2010/main" val="0"/>
+              </a:ext>
+            </a:extLst>
+          </a:blip>
+          <a:srcRect/>
+          <a:stretch>
+            <a:fillRect/>
+          </a:stretch>
+        </p:blipFill>
+        <p:spPr bwMode="auto">
+          <a:xfrm>
+            <a:off x="1477244" y="1769638"/>
+            <a:ext cx="6191100" cy="4035626"/>
+          </a:xfrm>
+          <a:prstGeom prst="rect">
+            <a:avLst/>
+          </a:prstGeom>
+          <a:noFill/>
+          <a:ln>
+            <a:noFill/>
+          </a:ln>
+          <a:effectLst/>
+          <a:extLst>
+            <a:ext uri="{909E8E84-426E-40DD-AFC4-6F175D3DCCD1}">
+              <a14:hiddenFill xmlns:a14="http://schemas.microsoft.com/office/drawing/2010/main">
+                <a:solidFill>
+                  <a:schemeClr val="accent1"/>
+                </a:solidFill>
+              </a14:hiddenFill>
+            </a:ext>
+            <a:ext uri="{91240B29-F687-4F45-9708-019B960494DF}">
+              <a14:hiddenLine xmlns:a14="http://schemas.microsoft.com/office/drawing/2010/main" w="9525">
+                <a:solidFill>
+                  <a:schemeClr val="tx1"/>
+                </a:solidFill>
+                <a:miter lim="800000"/>
+                <a:headEnd/>
+                <a:tailEnd/>
+              </a14:hiddenLine>
+            </a:ext>
+            <a:ext uri="{AF507438-7753-43E0-B8FC-AC1667EBCBE1}">
+              <a14:hiddenEffects xmlns:a14="http://schemas.microsoft.com/office/drawing/2010/main">
+                <a:effectLst>
+                  <a:outerShdw dist="35921" dir="2700000" algn="ctr" rotWithShape="0">
+                    <a:schemeClr val="bg2"/>
+                  </a:outerShdw>
+                </a:effectLst>
+              </a14:hiddenEffects>
+            </a:ext>
+          </a:extLst>
+        </p:spPr>
+      </p:pic>
+    </p:spTree>
+    <p:extLst>
+      <p:ext uri="{BB962C8B-B14F-4D97-AF65-F5344CB8AC3E}">
+        <p14:creationId xmlns:p14="http://schemas.microsoft.com/office/powerpoint/2010/main" val="3819668022"/>
+      </p:ext>
+    </p:extLst>
+  </p:cSld>
+  <p:clrMapOvr>
+    <a:masterClrMapping/>
+  </p:clrMapOvr>
+</p:sld>
+</file>
+
 <file path=ppt/theme/theme1.xml><?xml version="1.0" encoding="utf-8"?>
 <a:theme xmlns:a="http://schemas.openxmlformats.org/drawingml/2006/main" name="Office Theme">
   <a:themeElements>
-    <a:clrScheme name="Office">
+    <a:clrScheme name="Grayscale">
       <a:dk1>
         <a:sysClr val="windowText" lastClr="000000"/>
       </a:dk1>
@@ -4312,106 +8334,46 @@
         <a:sysClr val="window" lastClr="FFFFFF"/>
       </a:lt1>
       <a:dk2>
-        <a:srgbClr val="1F497D"/>
+        <a:srgbClr val="000000"/>
       </a:dk2>
       <a:lt2>
-        <a:srgbClr val="EEECE1"/>
+        <a:srgbClr val="F8F8F8"/>
       </a:lt2>
       <a:accent1>
-        <a:srgbClr val="4F81BD"/>
+        <a:srgbClr val="DDDDDD"/>
       </a:accent1>
       <a:accent2>
-        <a:srgbClr val="C0504D"/>
+        <a:srgbClr val="B2B2B2"/>
       </a:accent2>
       <a:accent3>
-        <a:srgbClr val="9BBB59"/>
+        <a:srgbClr val="969696"/>
       </a:accent3>
       <a:accent4>
-        <a:srgbClr val="8064A2"/>
+        <a:srgbClr val="808080"/>
       </a:accent4>
       <a:accent5>
-        <a:srgbClr val="4BACC6"/>
+        <a:srgbClr val="5F5F5F"/>
       </a:accent5>
       <a:accent6>
-        <a:srgbClr val="F79646"/>
+        <a:srgbClr val="4D4D4D"/>
       </a:accent6>
       <a:hlink>
-        <a:srgbClr val="0000FF"/>
+        <a:srgbClr val="5F5F5F"/>
       </a:hlink>
       <a:folHlink>
-        <a:srgbClr val="800080"/>
+        <a:srgbClr val="919191"/>
       </a:folHlink>
     </a:clrScheme>
-    <a:fontScheme name="Office">
+    <a:fontScheme name="Helvetic-OpenSans">
       <a:majorFont>
-        <a:latin typeface="Calibri"/>
+        <a:latin typeface="HelveticaNeueLT Com 47 LtCn"/>
         <a:ea typeface=""/>
         <a:cs typeface=""/>
-        <a:font script="Jpan" typeface="ＭＳ Ｐゴシック"/>
-        <a:font script="Hang" typeface="맑은 고딕"/>
-        <a:font script="Hans" typeface="宋体"/>
-        <a:font script="Hant" typeface="新細明體"/>
-        <a:font script="Arab" typeface="Times New Roman"/>
-        <a:font script="Hebr" typeface="Times New Roman"/>
-        <a:font script="Thai" typeface="Angsana New"/>
-        <a:font script="Ethi" typeface="Nyala"/>
-        <a:font script="Beng" typeface="Vrinda"/>
-        <a:font script="Gujr" typeface="Shruti"/>
-        <a:font script="Khmr" typeface="MoolBoran"/>
-        <a:font script="Knda" typeface="Tunga"/>
-        <a:font script="Guru" typeface="Raavi"/>
-        <a:font script="Cans" typeface="Euphemia"/>
-        <a:font script="Cher" typeface="Plantagenet Cherokee"/>
-        <a:font script="Yiii" typeface="Microsoft Yi Baiti"/>
-        <a:font script="Tibt" typeface="Microsoft Himalaya"/>
-        <a:font script="Thaa" typeface="MV Boli"/>
-        <a:font script="Deva" typeface="Mangal"/>
-        <a:font script="Telu" typeface="Gautami"/>
-        <a:font script="Taml" typeface="Latha"/>
-        <a:font script="Syrc" typeface="Estrangelo Edessa"/>
-        <a:font script="Orya" typeface="Kalinga"/>
-        <a:font script="Mlym" typeface="Kartika"/>
-        <a:font script="Laoo" typeface="DokChampa"/>
-        <a:font script="Sinh" typeface="Iskoola Pota"/>
-        <a:font script="Mong" typeface="Mongolian Baiti"/>
-        <a:font script="Viet" typeface="Times New Roman"/>
-        <a:font script="Uigh" typeface="Microsoft Uighur"/>
-        <a:font script="Geor" typeface="Sylfaen"/>
       </a:majorFont>
       <a:minorFont>
-        <a:latin typeface="Calibri"/>
+        <a:latin typeface="Open Sans Condensed Light"/>
         <a:ea typeface=""/>
         <a:cs typeface=""/>
-        <a:font script="Jpan" typeface="ＭＳ Ｐゴシック"/>
-        <a:font script="Hang" typeface="맑은 고딕"/>
-        <a:font script="Hans" typeface="宋体"/>
-        <a:font script="Hant" typeface="新細明體"/>
-        <a:font script="Arab" typeface="Arial"/>
-        <a:font script="Hebr" typeface="Arial"/>
-        <a:font script="Thai" typeface="Cordia New"/>
-        <a:font script="Ethi" typeface="Nyala"/>
-        <a:font script="Beng" typeface="Vrinda"/>
-        <a:font script="Gujr" typeface="Shruti"/>
-        <a:font script="Khmr" typeface="DaunPenh"/>
-        <a:font script="Knda" typeface="Tunga"/>
-        <a:font script="Guru" typeface="Raavi"/>
-        <a:font script="Cans" typeface="Euphemia"/>
-        <a:font script="Cher" typeface="Plantagenet Cherokee"/>
-        <a:font script="Yiii" typeface="Microsoft Yi Baiti"/>
-        <a:font script="Tibt" typeface="Microsoft Himalaya"/>
-        <a:font script="Thaa" typeface="MV Boli"/>
-        <a:font script="Deva" typeface="Mangal"/>
-        <a:font script="Telu" typeface="Gautami"/>
-        <a:font script="Taml" typeface="Latha"/>
-        <a:font script="Syrc" typeface="Estrangelo Edessa"/>
-        <a:font script="Orya" typeface="Kalinga"/>
-        <a:font script="Mlym" typeface="Kartika"/>
-        <a:font script="Laoo" typeface="DokChampa"/>
-        <a:font script="Sinh" typeface="Iskoola Pota"/>
-        <a:font script="Mong" typeface="Mongolian Baiti"/>
-        <a:font script="Viet" typeface="Arial"/>
-        <a:font script="Uigh" typeface="Microsoft Uighur"/>
-        <a:font script="Geor" typeface="Sylfaen"/>
       </a:minorFont>
     </a:fontScheme>
     <a:fmtScheme name="Office">

</xml_diff>

<commit_message>
Up to slide 50
</commit_message>
<xml_diff>
--- a/slides.pptx
+++ b/slides.pptx
@@ -5,7 +5,7 @@
     <p:sldMasterId id="2147483648" r:id="rId1"/>
   </p:sldMasterIdLst>
   <p:notesMasterIdLst>
-    <p:notesMasterId r:id="rId26"/>
+    <p:notesMasterId r:id="rId52"/>
   </p:notesMasterIdLst>
   <p:sldIdLst>
     <p:sldId id="256" r:id="rId2"/>
@@ -32,6 +32,32 @@
     <p:sldId id="295" r:id="rId23"/>
     <p:sldId id="294" r:id="rId24"/>
     <p:sldId id="296" r:id="rId25"/>
+    <p:sldId id="297" r:id="rId26"/>
+    <p:sldId id="298" r:id="rId27"/>
+    <p:sldId id="299" r:id="rId28"/>
+    <p:sldId id="300" r:id="rId29"/>
+    <p:sldId id="301" r:id="rId30"/>
+    <p:sldId id="302" r:id="rId31"/>
+    <p:sldId id="303" r:id="rId32"/>
+    <p:sldId id="306" r:id="rId33"/>
+    <p:sldId id="307" r:id="rId34"/>
+    <p:sldId id="310" r:id="rId35"/>
+    <p:sldId id="309" r:id="rId36"/>
+    <p:sldId id="313" r:id="rId37"/>
+    <p:sldId id="312" r:id="rId38"/>
+    <p:sldId id="315" r:id="rId39"/>
+    <p:sldId id="314" r:id="rId40"/>
+    <p:sldId id="316" r:id="rId41"/>
+    <p:sldId id="318" r:id="rId42"/>
+    <p:sldId id="319" r:id="rId43"/>
+    <p:sldId id="320" r:id="rId44"/>
+    <p:sldId id="321" r:id="rId45"/>
+    <p:sldId id="322" r:id="rId46"/>
+    <p:sldId id="323" r:id="rId47"/>
+    <p:sldId id="324" r:id="rId48"/>
+    <p:sldId id="325" r:id="rId49"/>
+    <p:sldId id="326" r:id="rId50"/>
+    <p:sldId id="327" r:id="rId51"/>
   </p:sldIdLst>
   <p:sldSz cx="9144000" cy="6858000" type="screen4x3"/>
   <p:notesSz cx="6858000" cy="9144000"/>
@@ -4341,75 +4367,6 @@
           <a:chExt cx="0" cy="0"/>
         </a:xfrm>
       </p:grpSpPr>
-      <p:sp>
-        <p:nvSpPr>
-          <p:cNvPr id="2" name="Title 1"/>
-          <p:cNvSpPr>
-            <a:spLocks noGrp="1"/>
-          </p:cNvSpPr>
-          <p:nvPr>
-            <p:ph type="title"/>
-          </p:nvPr>
-        </p:nvSpPr>
-        <p:spPr>
-          <a:xfrm>
-            <a:off x="457200" y="0"/>
-            <a:ext cx="8229600" cy="1115616"/>
-          </a:xfrm>
-        </p:spPr>
-        <p:txBody>
-          <a:bodyPr>
-            <a:normAutofit/>
-          </a:bodyPr>
-          <a:lstStyle/>
-          <a:p>
-            <a:r>
-              <a:rPr lang="fr-FR" sz="4000" dirty="0" smtClean="0"/>
-              <a:t>Approches historiques</a:t>
-            </a:r>
-            <a:endParaRPr lang="en-US" sz="4000" dirty="0"/>
-          </a:p>
-        </p:txBody>
-      </p:sp>
-      <p:sp>
-        <p:nvSpPr>
-          <p:cNvPr id="3" name="TextBox 2"/>
-          <p:cNvSpPr txBox="1"/>
-          <p:nvPr/>
-        </p:nvSpPr>
-        <p:spPr>
-          <a:xfrm>
-            <a:off x="2606334" y="6084004"/>
-            <a:ext cx="3931333" cy="369332"/>
-          </a:xfrm>
-          <a:prstGeom prst="rect">
-            <a:avLst/>
-          </a:prstGeom>
-          <a:noFill/>
-        </p:spPr>
-        <p:txBody>
-          <a:bodyPr wrap="none" rtlCol="0">
-            <a:spAutoFit/>
-          </a:bodyPr>
-          <a:lstStyle/>
-          <a:p>
-            <a:pPr algn="ctr"/>
-            <a:r>
-              <a:rPr lang="fr-FR" dirty="0" smtClean="0"/>
-              <a:t>Carte du réseau ARPANET, </a:t>
-            </a:r>
-            <a:r>
-              <a:rPr lang="fr-FR" i="1" dirty="0" smtClean="0"/>
-              <a:t>BNN Technologies, </a:t>
-            </a:r>
-            <a:r>
-              <a:rPr lang="fr-FR" dirty="0" smtClean="0"/>
-              <a:t>1977</a:t>
-            </a:r>
-            <a:endParaRPr lang="en-US" i="1" dirty="0"/>
-          </a:p>
-        </p:txBody>
-      </p:sp>
       <p:pic>
         <p:nvPicPr>
           <p:cNvPr id="1026" name="Picture 2" descr="C:\Users\Elie Rotenberg\git\phd\src\images\arpa-1977.jpg"/>
@@ -4433,8 +4390,8 @@
         </p:blipFill>
         <p:spPr bwMode="auto">
           <a:xfrm>
-            <a:off x="1979712" y="2175308"/>
-            <a:ext cx="5184576" cy="3391804"/>
+            <a:off x="1043608" y="1764706"/>
+            <a:ext cx="7056784" cy="4616622"/>
           </a:xfrm>
           <a:prstGeom prst="rect">
             <a:avLst/>
@@ -4451,6 +4408,75 @@
           </a:extLst>
         </p:spPr>
       </p:pic>
+      <p:sp>
+        <p:nvSpPr>
+          <p:cNvPr id="2" name="Title 1"/>
+          <p:cNvSpPr>
+            <a:spLocks noGrp="1"/>
+          </p:cNvSpPr>
+          <p:nvPr>
+            <p:ph type="title"/>
+          </p:nvPr>
+        </p:nvSpPr>
+        <p:spPr>
+          <a:xfrm>
+            <a:off x="457200" y="0"/>
+            <a:ext cx="8229600" cy="1115616"/>
+          </a:xfrm>
+        </p:spPr>
+        <p:txBody>
+          <a:bodyPr>
+            <a:normAutofit/>
+          </a:bodyPr>
+          <a:lstStyle/>
+          <a:p>
+            <a:r>
+              <a:rPr lang="fr-FR" sz="4000" dirty="0" smtClean="0"/>
+              <a:t>Approches historiques</a:t>
+            </a:r>
+            <a:endParaRPr lang="en-US" sz="4000" dirty="0"/>
+          </a:p>
+        </p:txBody>
+      </p:sp>
+      <p:sp>
+        <p:nvSpPr>
+          <p:cNvPr id="3" name="TextBox 2"/>
+          <p:cNvSpPr txBox="1"/>
+          <p:nvPr/>
+        </p:nvSpPr>
+        <p:spPr>
+          <a:xfrm>
+            <a:off x="2606334" y="6084004"/>
+            <a:ext cx="3931333" cy="369332"/>
+          </a:xfrm>
+          <a:prstGeom prst="rect">
+            <a:avLst/>
+          </a:prstGeom>
+          <a:noFill/>
+        </p:spPr>
+        <p:txBody>
+          <a:bodyPr wrap="none" rtlCol="0">
+            <a:spAutoFit/>
+          </a:bodyPr>
+          <a:lstStyle/>
+          <a:p>
+            <a:pPr algn="ctr"/>
+            <a:r>
+              <a:rPr lang="fr-FR" dirty="0" smtClean="0"/>
+              <a:t>Carte du réseau ARPANET, </a:t>
+            </a:r>
+            <a:r>
+              <a:rPr lang="fr-FR" i="1" dirty="0" smtClean="0"/>
+              <a:t>BNN Technologies, </a:t>
+            </a:r>
+            <a:r>
+              <a:rPr lang="fr-FR" dirty="0" smtClean="0"/>
+              <a:t>1977</a:t>
+            </a:r>
+            <a:endParaRPr lang="en-US" i="1" dirty="0"/>
+          </a:p>
+        </p:txBody>
+      </p:sp>
       <p:sp>
         <p:nvSpPr>
           <p:cNvPr id="4" name="TextBox 3"/>
@@ -5204,11 +5230,7 @@
             </a:pPr>
             <a:r>
               <a:rPr lang="fr-FR" sz="2400" dirty="0" smtClean="0"/>
-              <a:t>Description formelle </a:t>
-            </a:r>
-            <a:r>
-              <a:rPr lang="fr-FR" sz="2400" dirty="0" smtClean="0"/>
-              <a:t>de nos objets et de nos outils</a:t>
+              <a:t>Description formelle de nos objets et de nos outils</a:t>
             </a:r>
           </a:p>
           <a:p>
@@ -5448,7 +5470,7 @@
           <a:p>
             <a:r>
               <a:rPr lang="fr-FR" sz="4000" dirty="0" smtClean="0"/>
-              <a:t>Motivation</a:t>
+              <a:t>Topologie logique : motivation</a:t>
             </a:r>
             <a:endParaRPr lang="en-US" sz="4000" dirty="0"/>
           </a:p>
@@ -5482,11 +5504,7 @@
             </a:pPr>
             <a:r>
               <a:rPr lang="fr-FR" sz="2800" dirty="0" smtClean="0"/>
-              <a:t>Correspond à l’intuition </a:t>
-            </a:r>
-            <a:r>
-              <a:rPr lang="fr-FR" sz="2800" dirty="0" smtClean="0"/>
-              <a:t>usuelle (« machines connectées »)</a:t>
+              <a:t>Correspond à l’intuition usuelle (« hôtes connectés »)</a:t>
             </a:r>
           </a:p>
           <a:p>
@@ -5499,11 +5517,7 @@
             </a:pPr>
             <a:r>
               <a:rPr lang="fr-FR" sz="2800" dirty="0" smtClean="0"/>
-              <a:t>Importance </a:t>
-            </a:r>
-            <a:r>
-              <a:rPr lang="fr-FR" sz="2800" dirty="0" smtClean="0"/>
-              <a:t>historique</a:t>
+              <a:t>Importance historique</a:t>
             </a:r>
           </a:p>
           <a:p>
@@ -5516,15 +5530,7 @@
             </a:pPr>
             <a:r>
               <a:rPr lang="fr-FR" sz="2800" dirty="0" smtClean="0"/>
-              <a:t>Niveau </a:t>
-            </a:r>
-            <a:r>
-              <a:rPr lang="fr-FR" sz="2800" dirty="0" smtClean="0"/>
-              <a:t>d’opération par défaut </a:t>
-            </a:r>
-            <a:r>
-              <a:rPr lang="fr-FR" sz="2800" dirty="0" smtClean="0"/>
-              <a:t>de </a:t>
+              <a:t>Niveau d’opération par défaut de </a:t>
             </a:r>
             <a:r>
               <a:rPr lang="fr-FR" sz="2800" i="1" dirty="0" err="1" smtClean="0">
@@ -5559,7 +5565,6 @@
               <a:rPr lang="fr-FR" sz="2800" dirty="0" smtClean="0"/>
               <a:t>Première tentative de mettre en place notre approche</a:t>
             </a:r>
-            <a:endParaRPr lang="fr-FR" sz="2800" dirty="0" smtClean="0"/>
           </a:p>
         </p:txBody>
       </p:sp>
@@ -7883,6 +7888,950 @@
 </p:sld>
 </file>
 
+<file path=ppt/slides/slide25.xml><?xml version="1.0" encoding="utf-8"?>
+<p:sld xmlns:a="http://schemas.openxmlformats.org/drawingml/2006/main" xmlns:r="http://schemas.openxmlformats.org/officeDocument/2006/relationships" xmlns:p="http://schemas.openxmlformats.org/presentationml/2006/main">
+  <p:cSld>
+    <p:spTree>
+      <p:nvGrpSpPr>
+        <p:cNvPr id="1" name=""/>
+        <p:cNvGrpSpPr/>
+        <p:nvPr/>
+      </p:nvGrpSpPr>
+      <p:grpSpPr>
+        <a:xfrm>
+          <a:off x="0" y="0"/>
+          <a:ext cx="0" cy="0"/>
+          <a:chOff x="0" y="0"/>
+          <a:chExt cx="0" cy="0"/>
+        </a:xfrm>
+      </p:grpSpPr>
+      <p:sp>
+        <p:nvSpPr>
+          <p:cNvPr id="2" name="Title 1"/>
+          <p:cNvSpPr>
+            <a:spLocks noGrp="1"/>
+          </p:cNvSpPr>
+          <p:nvPr>
+            <p:ph type="title"/>
+          </p:nvPr>
+        </p:nvSpPr>
+        <p:spPr>
+          <a:xfrm>
+            <a:off x="457200" y="0"/>
+            <a:ext cx="8229600" cy="1115616"/>
+          </a:xfrm>
+        </p:spPr>
+        <p:txBody>
+          <a:bodyPr>
+            <a:normAutofit/>
+          </a:bodyPr>
+          <a:lstStyle/>
+          <a:p>
+            <a:r>
+              <a:rPr lang="fr-FR" sz="4000" dirty="0" smtClean="0"/>
+              <a:t>Estimation de la distribution de degrés</a:t>
+            </a:r>
+            <a:endParaRPr lang="en-US" sz="4000" dirty="0"/>
+          </a:p>
+        </p:txBody>
+      </p:sp>
+      <p:sp>
+        <p:nvSpPr>
+          <p:cNvPr id="4" name="TextBox 3"/>
+          <p:cNvSpPr txBox="1"/>
+          <p:nvPr/>
+        </p:nvSpPr>
+        <p:spPr>
+          <a:xfrm>
+            <a:off x="1206880" y="1823913"/>
+            <a:ext cx="6903365" cy="3693319"/>
+          </a:xfrm>
+          <a:prstGeom prst="rect">
+            <a:avLst/>
+          </a:prstGeom>
+          <a:noFill/>
+        </p:spPr>
+        <p:txBody>
+          <a:bodyPr wrap="none" rtlCol="0">
+            <a:spAutoFit/>
+          </a:bodyPr>
+          <a:lstStyle/>
+          <a:p>
+            <a:pPr marL="457200" indent="-457200">
+              <a:buFont typeface="+mj-lt"/>
+              <a:buAutoNum type="arabicParenR"/>
+            </a:pPr>
+            <a:r>
+              <a:rPr lang="fr-FR" sz="2400" dirty="0" smtClean="0"/>
+              <a:t>Obtenir un ensemble de moniteurs suffisamment grand</a:t>
+            </a:r>
+          </a:p>
+          <a:p>
+            <a:pPr marL="228600" indent="-228600">
+              <a:buFont typeface="+mj-lt"/>
+              <a:buAutoNum type="arabicParenR"/>
+            </a:pPr>
+            <a:endParaRPr lang="fr-FR" dirty="0" smtClean="0"/>
+          </a:p>
+          <a:p>
+            <a:pPr marL="457200" indent="-457200">
+              <a:buFont typeface="+mj-lt"/>
+              <a:buAutoNum type="arabicParenR"/>
+            </a:pPr>
+            <a:r>
+              <a:rPr lang="fr-FR" sz="2400" dirty="0" smtClean="0"/>
+              <a:t>Tirer un échantillon uniforme et suffisamment grand de cibles</a:t>
+            </a:r>
+          </a:p>
+          <a:p>
+            <a:pPr marL="228600" indent="-228600">
+              <a:buFont typeface="+mj-lt"/>
+              <a:buAutoNum type="arabicParenR"/>
+            </a:pPr>
+            <a:endParaRPr lang="fr-FR" dirty="0" smtClean="0"/>
+          </a:p>
+          <a:p>
+            <a:pPr marL="457200" indent="-457200">
+              <a:buFont typeface="+mj-lt"/>
+              <a:buAutoNum type="arabicParenR"/>
+            </a:pPr>
+            <a:r>
+              <a:rPr lang="fr-FR" sz="2400" dirty="0" smtClean="0"/>
+              <a:t>Effectuer </a:t>
+            </a:r>
+            <a:r>
+              <a:rPr lang="fr-FR" sz="2400" i="1" dirty="0" err="1" smtClean="0"/>
+              <a:t>traceroute</a:t>
+            </a:r>
+            <a:r>
+              <a:rPr lang="fr-FR" sz="2400" i="1" dirty="0"/>
+              <a:t> </a:t>
+            </a:r>
+            <a:r>
+              <a:rPr lang="fr-FR" sz="2400" i="1" dirty="0" smtClean="0"/>
+              <a:t> </a:t>
+            </a:r>
+            <a:r>
+              <a:rPr lang="fr-FR" sz="2400" dirty="0" smtClean="0"/>
+              <a:t>depuis chaque moniteur vers chaque cible</a:t>
+            </a:r>
+          </a:p>
+          <a:p>
+            <a:pPr marL="228600" indent="-228600">
+              <a:buFont typeface="+mj-lt"/>
+              <a:buAutoNum type="arabicParenR"/>
+            </a:pPr>
+            <a:endParaRPr lang="fr-FR" dirty="0" smtClean="0"/>
+          </a:p>
+          <a:p>
+            <a:pPr marL="457200" indent="-457200">
+              <a:buFont typeface="+mj-lt"/>
+              <a:buAutoNum type="arabicParenR"/>
+            </a:pPr>
+            <a:r>
+              <a:rPr lang="fr-FR" sz="2400" dirty="0" smtClean="0"/>
+              <a:t>(Corriger les artefacts de mesure)</a:t>
+            </a:r>
+          </a:p>
+          <a:p>
+            <a:pPr marL="228600" indent="-228600">
+              <a:buFont typeface="+mj-lt"/>
+              <a:buAutoNum type="arabicParenR"/>
+            </a:pPr>
+            <a:endParaRPr lang="fr-FR" dirty="0" smtClean="0"/>
+          </a:p>
+          <a:p>
+            <a:pPr marL="457200" indent="-457200">
+              <a:buFont typeface="+mj-lt"/>
+              <a:buAutoNum type="arabicParenR"/>
+            </a:pPr>
+            <a:r>
+              <a:rPr lang="fr-FR" sz="2400" dirty="0" smtClean="0"/>
+              <a:t>Calculer le degré de chaque cible</a:t>
+            </a:r>
+          </a:p>
+          <a:p>
+            <a:pPr marL="228600" indent="-228600">
+              <a:buFont typeface="+mj-lt"/>
+              <a:buAutoNum type="arabicParenR"/>
+            </a:pPr>
+            <a:endParaRPr lang="fr-FR" dirty="0" smtClean="0"/>
+          </a:p>
+          <a:p>
+            <a:pPr marL="457200" indent="-457200">
+              <a:buFont typeface="+mj-lt"/>
+              <a:buAutoNum type="arabicParenR"/>
+            </a:pPr>
+            <a:r>
+              <a:rPr lang="fr-FR" sz="2400" dirty="0" smtClean="0"/>
+              <a:t>Déduire la distribution de degrés.</a:t>
+            </a:r>
+            <a:endParaRPr lang="en-US" sz="2400" dirty="0"/>
+          </a:p>
+        </p:txBody>
+      </p:sp>
+    </p:spTree>
+    <p:extLst>
+      <p:ext uri="{BB962C8B-B14F-4D97-AF65-F5344CB8AC3E}">
+        <p14:creationId xmlns:p14="http://schemas.microsoft.com/office/powerpoint/2010/main" val="3709333981"/>
+      </p:ext>
+    </p:extLst>
+  </p:cSld>
+  <p:clrMapOvr>
+    <a:masterClrMapping/>
+  </p:clrMapOvr>
+</p:sld>
+</file>
+
+<file path=ppt/slides/slide26.xml><?xml version="1.0" encoding="utf-8"?>
+<p:sld xmlns:a="http://schemas.openxmlformats.org/drawingml/2006/main" xmlns:r="http://schemas.openxmlformats.org/officeDocument/2006/relationships" xmlns:p="http://schemas.openxmlformats.org/presentationml/2006/main">
+  <p:cSld>
+    <p:spTree>
+      <p:nvGrpSpPr>
+        <p:cNvPr id="1" name=""/>
+        <p:cNvGrpSpPr/>
+        <p:nvPr/>
+      </p:nvGrpSpPr>
+      <p:grpSpPr>
+        <a:xfrm>
+          <a:off x="0" y="0"/>
+          <a:ext cx="0" cy="0"/>
+          <a:chOff x="0" y="0"/>
+          <a:chExt cx="0" cy="0"/>
+        </a:xfrm>
+      </p:grpSpPr>
+      <p:sp>
+        <p:nvSpPr>
+          <p:cNvPr id="2" name="Title 1"/>
+          <p:cNvSpPr>
+            <a:spLocks noGrp="1"/>
+          </p:cNvSpPr>
+          <p:nvPr>
+            <p:ph type="title"/>
+          </p:nvPr>
+        </p:nvSpPr>
+        <p:spPr>
+          <a:xfrm>
+            <a:off x="457200" y="0"/>
+            <a:ext cx="8229600" cy="1115616"/>
+          </a:xfrm>
+        </p:spPr>
+        <p:txBody>
+          <a:bodyPr>
+            <a:normAutofit/>
+          </a:bodyPr>
+          <a:lstStyle/>
+          <a:p>
+            <a:r>
+              <a:rPr lang="fr-FR" sz="4000" dirty="0" smtClean="0"/>
+              <a:t>Validation de la méthode</a:t>
+            </a:r>
+            <a:endParaRPr lang="en-US" sz="4000" dirty="0"/>
+          </a:p>
+        </p:txBody>
+      </p:sp>
+      <p:sp>
+        <p:nvSpPr>
+          <p:cNvPr id="4" name="TextBox 3"/>
+          <p:cNvSpPr txBox="1"/>
+          <p:nvPr/>
+        </p:nvSpPr>
+        <p:spPr>
+          <a:xfrm>
+            <a:off x="1206880" y="1823913"/>
+            <a:ext cx="6337761" cy="3693319"/>
+          </a:xfrm>
+          <a:prstGeom prst="rect">
+            <a:avLst/>
+          </a:prstGeom>
+          <a:noFill/>
+        </p:spPr>
+        <p:txBody>
+          <a:bodyPr wrap="none" rtlCol="0">
+            <a:spAutoFit/>
+          </a:bodyPr>
+          <a:lstStyle/>
+          <a:p>
+            <a:pPr marL="457200" indent="-457200">
+              <a:buFont typeface="+mj-lt"/>
+              <a:buAutoNum type="arabicParenR"/>
+            </a:pPr>
+            <a:r>
+              <a:rPr lang="fr-FR" sz="2400" dirty="0" smtClean="0"/>
+              <a:t>Générer des graphes aléatoires selon des modèles usuels</a:t>
+            </a:r>
+          </a:p>
+          <a:p>
+            <a:pPr marL="228600" indent="-228600">
+              <a:buFont typeface="+mj-lt"/>
+              <a:buAutoNum type="arabicParenR"/>
+            </a:pPr>
+            <a:endParaRPr lang="fr-FR" dirty="0" smtClean="0"/>
+          </a:p>
+          <a:p>
+            <a:pPr marL="457200" indent="-457200">
+              <a:buFont typeface="+mj-lt"/>
+              <a:buAutoNum type="arabicParenR"/>
+            </a:pPr>
+            <a:r>
+              <a:rPr lang="fr-FR" sz="2400" dirty="0" smtClean="0"/>
+              <a:t>Tirer un grand nombre de nœuds, les </a:t>
+            </a:r>
+            <a:r>
+              <a:rPr lang="fr-FR" sz="2400" i="1" dirty="0" smtClean="0"/>
+              <a:t>moniteurs</a:t>
+            </a:r>
+          </a:p>
+          <a:p>
+            <a:pPr marL="228600" indent="-228600">
+              <a:buFont typeface="+mj-lt"/>
+              <a:buAutoNum type="arabicParenR"/>
+            </a:pPr>
+            <a:endParaRPr lang="fr-FR" dirty="0" smtClean="0"/>
+          </a:p>
+          <a:p>
+            <a:pPr marL="457200" indent="-457200">
+              <a:buFont typeface="+mj-lt"/>
+              <a:buAutoNum type="arabicParenR"/>
+            </a:pPr>
+            <a:r>
+              <a:rPr lang="fr-FR" sz="2400" dirty="0" smtClean="0"/>
+              <a:t>Considérer que </a:t>
+            </a:r>
+            <a:r>
+              <a:rPr lang="fr-FR" sz="2400" i="1" dirty="0" smtClean="0"/>
+              <a:t>tous les nœuds </a:t>
+            </a:r>
+            <a:r>
+              <a:rPr lang="fr-FR" sz="2400" i="1" dirty="0" smtClean="0"/>
+              <a:t> </a:t>
+            </a:r>
+            <a:r>
+              <a:rPr lang="fr-FR" sz="2400" dirty="0" smtClean="0"/>
+              <a:t>sont </a:t>
+            </a:r>
+            <a:r>
+              <a:rPr lang="fr-FR" sz="2400" dirty="0" smtClean="0"/>
+              <a:t>des cibles</a:t>
+            </a:r>
+          </a:p>
+          <a:p>
+            <a:pPr marL="228600" indent="-228600">
+              <a:buFont typeface="+mj-lt"/>
+              <a:buAutoNum type="arabicParenR"/>
+            </a:pPr>
+            <a:endParaRPr lang="fr-FR" dirty="0" smtClean="0"/>
+          </a:p>
+          <a:p>
+            <a:pPr marL="457200" indent="-457200">
+              <a:buFont typeface="+mj-lt"/>
+              <a:buAutoNum type="arabicParenR"/>
+            </a:pPr>
+            <a:r>
+              <a:rPr lang="fr-FR" sz="2400" dirty="0" smtClean="0"/>
+              <a:t>Simuler </a:t>
+            </a:r>
+            <a:r>
+              <a:rPr lang="fr-FR" sz="2400" i="1" dirty="0" err="1" smtClean="0"/>
+              <a:t>traceroute</a:t>
+            </a:r>
+            <a:r>
+              <a:rPr lang="fr-FR" sz="2400" dirty="0" smtClean="0"/>
+              <a:t> par des plus courts chemins</a:t>
+            </a:r>
+          </a:p>
+          <a:p>
+            <a:pPr marL="228600" indent="-228600">
+              <a:buFont typeface="+mj-lt"/>
+              <a:buAutoNum type="arabicParenR"/>
+            </a:pPr>
+            <a:endParaRPr lang="fr-FR" dirty="0" smtClean="0"/>
+          </a:p>
+          <a:p>
+            <a:pPr marL="457200" indent="-457200">
+              <a:buFont typeface="+mj-lt"/>
+              <a:buAutoNum type="arabicParenR"/>
+            </a:pPr>
+            <a:r>
+              <a:rPr lang="fr-FR" sz="2400" dirty="0" smtClean="0"/>
+              <a:t>Calculer le degré de chaque cible</a:t>
+            </a:r>
+          </a:p>
+          <a:p>
+            <a:pPr marL="228600" indent="-228600">
+              <a:buFont typeface="+mj-lt"/>
+              <a:buAutoNum type="arabicParenR"/>
+            </a:pPr>
+            <a:endParaRPr lang="fr-FR" dirty="0" smtClean="0"/>
+          </a:p>
+          <a:p>
+            <a:pPr marL="457200" indent="-457200">
+              <a:buFont typeface="+mj-lt"/>
+              <a:buAutoNum type="arabicParenR"/>
+            </a:pPr>
+            <a:r>
+              <a:rPr lang="fr-FR" sz="2400" dirty="0" smtClean="0"/>
+              <a:t>Comparer les distributions de degrés mesurée et réelle</a:t>
+            </a:r>
+            <a:endParaRPr lang="en-US" sz="2400" dirty="0"/>
+          </a:p>
+        </p:txBody>
+      </p:sp>
+    </p:spTree>
+    <p:extLst>
+      <p:ext uri="{BB962C8B-B14F-4D97-AF65-F5344CB8AC3E}">
+        <p14:creationId xmlns:p14="http://schemas.microsoft.com/office/powerpoint/2010/main" val="3895687795"/>
+      </p:ext>
+    </p:extLst>
+  </p:cSld>
+  <p:clrMapOvr>
+    <a:masterClrMapping/>
+  </p:clrMapOvr>
+</p:sld>
+</file>
+
+<file path=ppt/slides/slide27.xml><?xml version="1.0" encoding="utf-8"?>
+<p:sld xmlns:a="http://schemas.openxmlformats.org/drawingml/2006/main" xmlns:r="http://schemas.openxmlformats.org/officeDocument/2006/relationships" xmlns:p="http://schemas.openxmlformats.org/presentationml/2006/main">
+  <p:cSld>
+    <p:spTree>
+      <p:nvGrpSpPr>
+        <p:cNvPr id="1" name=""/>
+        <p:cNvGrpSpPr/>
+        <p:nvPr/>
+      </p:nvGrpSpPr>
+      <p:grpSpPr>
+        <a:xfrm>
+          <a:off x="0" y="0"/>
+          <a:ext cx="0" cy="0"/>
+          <a:chOff x="0" y="0"/>
+          <a:chExt cx="0" cy="0"/>
+        </a:xfrm>
+      </p:grpSpPr>
+      <p:sp>
+        <p:nvSpPr>
+          <p:cNvPr id="2" name="Title 1"/>
+          <p:cNvSpPr>
+            <a:spLocks noGrp="1"/>
+          </p:cNvSpPr>
+          <p:nvPr>
+            <p:ph type="title"/>
+          </p:nvPr>
+        </p:nvSpPr>
+        <p:spPr>
+          <a:xfrm>
+            <a:off x="457200" y="0"/>
+            <a:ext cx="8229600" cy="1115616"/>
+          </a:xfrm>
+        </p:spPr>
+        <p:txBody>
+          <a:bodyPr>
+            <a:normAutofit/>
+          </a:bodyPr>
+          <a:lstStyle/>
+          <a:p>
+            <a:r>
+              <a:rPr lang="fr-FR" sz="4000" dirty="0" smtClean="0"/>
+              <a:t>Validation de la méthode</a:t>
+            </a:r>
+            <a:endParaRPr lang="en-US" sz="4000" dirty="0"/>
+          </a:p>
+        </p:txBody>
+      </p:sp>
+      <p:pic>
+        <p:nvPicPr>
+          <p:cNvPr id="5122" name="Picture 2" descr="C:\Users\Elie Rotenberg\git\phd\src\images\traceroute-simuls.png"/>
+          <p:cNvPicPr>
+            <a:picLocks noChangeAspect="1" noChangeArrowheads="1"/>
+          </p:cNvPicPr>
+          <p:nvPr/>
+        </p:nvPicPr>
+        <p:blipFill>
+          <a:blip r:embed="rId2">
+            <a:extLst>
+              <a:ext uri="{28A0092B-C50C-407E-A947-70E740481C1C}">
+                <a14:useLocalDpi xmlns:a14="http://schemas.microsoft.com/office/drawing/2010/main" val="0"/>
+              </a:ext>
+            </a:extLst>
+          </a:blip>
+          <a:srcRect/>
+          <a:stretch>
+            <a:fillRect/>
+          </a:stretch>
+        </p:blipFill>
+        <p:spPr bwMode="auto">
+          <a:xfrm>
+            <a:off x="566738" y="1700808"/>
+            <a:ext cx="8010525" cy="2992437"/>
+          </a:xfrm>
+          <a:prstGeom prst="rect">
+            <a:avLst/>
+          </a:prstGeom>
+          <a:noFill/>
+          <a:extLst>
+            <a:ext uri="{909E8E84-426E-40DD-AFC4-6F175D3DCCD1}">
+              <a14:hiddenFill xmlns:a14="http://schemas.microsoft.com/office/drawing/2010/main">
+                <a:solidFill>
+                  <a:srgbClr val="FFFFFF"/>
+                </a:solidFill>
+              </a14:hiddenFill>
+            </a:ext>
+          </a:extLst>
+        </p:spPr>
+      </p:pic>
+      <p:sp>
+        <p:nvSpPr>
+          <p:cNvPr id="3" name="TextBox 2"/>
+          <p:cNvSpPr txBox="1"/>
+          <p:nvPr/>
+        </p:nvSpPr>
+        <p:spPr>
+          <a:xfrm>
+            <a:off x="2544458" y="5445224"/>
+            <a:ext cx="4055084" cy="1015663"/>
+          </a:xfrm>
+          <a:prstGeom prst="rect">
+            <a:avLst/>
+          </a:prstGeom>
+          <a:noFill/>
+        </p:spPr>
+        <p:txBody>
+          <a:bodyPr wrap="none" rtlCol="0">
+            <a:spAutoFit/>
+          </a:bodyPr>
+          <a:lstStyle/>
+          <a:p>
+            <a:r>
+              <a:rPr lang="fr-FR" sz="2400" dirty="0" smtClean="0"/>
+              <a:t>Distribution de degré mesurée et réelle</a:t>
+            </a:r>
+          </a:p>
+          <a:p>
+            <a:r>
+              <a:rPr lang="fr-FR" i="1" dirty="0" smtClean="0"/>
+              <a:t>x  </a:t>
+            </a:r>
+            <a:r>
+              <a:rPr lang="fr-FR" dirty="0" smtClean="0"/>
+              <a:t>: nombre de voisins</a:t>
+            </a:r>
+          </a:p>
+          <a:p>
+            <a:r>
+              <a:rPr lang="fr-FR" i="1" dirty="0" smtClean="0"/>
+              <a:t>y  </a:t>
+            </a:r>
+            <a:r>
+              <a:rPr lang="fr-FR" dirty="0" smtClean="0"/>
+              <a:t>: nombre de cibles</a:t>
+            </a:r>
+            <a:endParaRPr lang="en-US" dirty="0"/>
+          </a:p>
+        </p:txBody>
+      </p:sp>
+      <p:sp>
+        <p:nvSpPr>
+          <p:cNvPr id="5" name="TextBox 4"/>
+          <p:cNvSpPr txBox="1"/>
+          <p:nvPr/>
+        </p:nvSpPr>
+        <p:spPr>
+          <a:xfrm>
+            <a:off x="1691680" y="4797152"/>
+            <a:ext cx="1863202" cy="369332"/>
+          </a:xfrm>
+          <a:prstGeom prst="rect">
+            <a:avLst/>
+          </a:prstGeom>
+          <a:noFill/>
+        </p:spPr>
+        <p:txBody>
+          <a:bodyPr wrap="none" rtlCol="0">
+            <a:spAutoFit/>
+          </a:bodyPr>
+          <a:lstStyle/>
+          <a:p>
+            <a:r>
+              <a:rPr lang="fr-FR" dirty="0" smtClean="0"/>
+              <a:t>Graphe de 10</a:t>
+            </a:r>
+            <a:r>
+              <a:rPr lang="fr-FR" baseline="30000" dirty="0" smtClean="0"/>
+              <a:t>6</a:t>
+            </a:r>
+            <a:r>
+              <a:rPr lang="fr-FR" dirty="0" smtClean="0"/>
+              <a:t> nœuds</a:t>
+            </a:r>
+            <a:endParaRPr lang="en-US" dirty="0"/>
+          </a:p>
+        </p:txBody>
+      </p:sp>
+      <p:sp>
+        <p:nvSpPr>
+          <p:cNvPr id="7" name="TextBox 6"/>
+          <p:cNvSpPr txBox="1"/>
+          <p:nvPr/>
+        </p:nvSpPr>
+        <p:spPr>
+          <a:xfrm>
+            <a:off x="5796136" y="4797152"/>
+            <a:ext cx="1892056" cy="369332"/>
+          </a:xfrm>
+          <a:prstGeom prst="rect">
+            <a:avLst/>
+          </a:prstGeom>
+          <a:noFill/>
+        </p:spPr>
+        <p:txBody>
+          <a:bodyPr wrap="none" rtlCol="0">
+            <a:spAutoFit/>
+          </a:bodyPr>
+          <a:lstStyle/>
+          <a:p>
+            <a:r>
+              <a:rPr lang="fr-FR" dirty="0" smtClean="0"/>
+              <a:t>Graphe de 10</a:t>
+            </a:r>
+            <a:r>
+              <a:rPr lang="fr-FR" baseline="30000" dirty="0" smtClean="0"/>
+              <a:t>7</a:t>
+            </a:r>
+            <a:r>
+              <a:rPr lang="fr-FR" dirty="0" smtClean="0"/>
+              <a:t> nœuds</a:t>
+            </a:r>
+            <a:endParaRPr lang="en-US" dirty="0"/>
+          </a:p>
+        </p:txBody>
+      </p:sp>
+    </p:spTree>
+    <p:extLst>
+      <p:ext uri="{BB962C8B-B14F-4D97-AF65-F5344CB8AC3E}">
+        <p14:creationId xmlns:p14="http://schemas.microsoft.com/office/powerpoint/2010/main" val="2719386314"/>
+      </p:ext>
+    </p:extLst>
+  </p:cSld>
+  <p:clrMapOvr>
+    <a:masterClrMapping/>
+  </p:clrMapOvr>
+</p:sld>
+</file>
+
+<file path=ppt/slides/slide28.xml><?xml version="1.0" encoding="utf-8"?>
+<p:sld xmlns:a="http://schemas.openxmlformats.org/drawingml/2006/main" xmlns:r="http://schemas.openxmlformats.org/officeDocument/2006/relationships" xmlns:p="http://schemas.openxmlformats.org/presentationml/2006/main">
+  <p:cSld>
+    <p:spTree>
+      <p:nvGrpSpPr>
+        <p:cNvPr id="1" name=""/>
+        <p:cNvGrpSpPr/>
+        <p:nvPr/>
+      </p:nvGrpSpPr>
+      <p:grpSpPr>
+        <a:xfrm>
+          <a:off x="0" y="0"/>
+          <a:ext cx="0" cy="0"/>
+          <a:chOff x="0" y="0"/>
+          <a:chExt cx="0" cy="0"/>
+        </a:xfrm>
+      </p:grpSpPr>
+      <p:sp>
+        <p:nvSpPr>
+          <p:cNvPr id="2" name="Title 1"/>
+          <p:cNvSpPr>
+            <a:spLocks noGrp="1"/>
+          </p:cNvSpPr>
+          <p:nvPr>
+            <p:ph type="title"/>
+          </p:nvPr>
+        </p:nvSpPr>
+        <p:spPr>
+          <a:xfrm>
+            <a:off x="457200" y="0"/>
+            <a:ext cx="8229600" cy="1115616"/>
+          </a:xfrm>
+        </p:spPr>
+        <p:txBody>
+          <a:bodyPr>
+            <a:normAutofit/>
+          </a:bodyPr>
+          <a:lstStyle/>
+          <a:p>
+            <a:r>
+              <a:rPr lang="fr-FR" sz="4000" dirty="0" smtClean="0"/>
+              <a:t>Mesure réelle sur </a:t>
+            </a:r>
+            <a:r>
+              <a:rPr lang="fr-FR" sz="4000" dirty="0" err="1" smtClean="0"/>
+              <a:t>PlanetLab</a:t>
+            </a:r>
+            <a:endParaRPr lang="en-US" sz="4000" dirty="0"/>
+          </a:p>
+        </p:txBody>
+      </p:sp>
+      <p:sp>
+        <p:nvSpPr>
+          <p:cNvPr id="3" name="TextBox 2"/>
+          <p:cNvSpPr txBox="1"/>
+          <p:nvPr/>
+        </p:nvSpPr>
+        <p:spPr>
+          <a:xfrm>
+            <a:off x="2002098" y="5589240"/>
+            <a:ext cx="4174797" cy="830997"/>
+          </a:xfrm>
+          <a:prstGeom prst="rect">
+            <a:avLst/>
+          </a:prstGeom>
+          <a:noFill/>
+        </p:spPr>
+        <p:txBody>
+          <a:bodyPr wrap="none" rtlCol="0">
+            <a:spAutoFit/>
+          </a:bodyPr>
+          <a:lstStyle/>
+          <a:p>
+            <a:r>
+              <a:rPr lang="fr-FR" sz="2400" i="1" dirty="0" smtClean="0"/>
+              <a:t>x</a:t>
+            </a:r>
+            <a:r>
+              <a:rPr lang="fr-FR" sz="2400" dirty="0" smtClean="0"/>
+              <a:t>  : nombre de voisins logiques observés</a:t>
+            </a:r>
+          </a:p>
+          <a:p>
+            <a:r>
+              <a:rPr lang="fr-FR" sz="2400" i="1" dirty="0" smtClean="0"/>
+              <a:t>y</a:t>
+            </a:r>
+            <a:r>
+              <a:rPr lang="fr-FR" sz="2400" dirty="0" smtClean="0"/>
+              <a:t>  : nombre de cibles</a:t>
+            </a:r>
+            <a:endParaRPr lang="en-US" sz="2400" dirty="0"/>
+          </a:p>
+        </p:txBody>
+      </p:sp>
+      <p:pic>
+        <p:nvPicPr>
+          <p:cNvPr id="6146" name="Picture 2" descr="C:\Users\Elie Rotenberg\git\phd\src\images\traceroute-distrib.png"/>
+          <p:cNvPicPr>
+            <a:picLocks noChangeAspect="1" noChangeArrowheads="1"/>
+          </p:cNvPicPr>
+          <p:nvPr/>
+        </p:nvPicPr>
+        <p:blipFill>
+          <a:blip r:embed="rId2">
+            <a:extLst>
+              <a:ext uri="{28A0092B-C50C-407E-A947-70E740481C1C}">
+                <a14:useLocalDpi xmlns:a14="http://schemas.microsoft.com/office/drawing/2010/main" val="0"/>
+              </a:ext>
+            </a:extLst>
+          </a:blip>
+          <a:srcRect/>
+          <a:stretch>
+            <a:fillRect/>
+          </a:stretch>
+        </p:blipFill>
+        <p:spPr bwMode="auto">
+          <a:xfrm>
+            <a:off x="1403648" y="1133154"/>
+            <a:ext cx="5760640" cy="4240062"/>
+          </a:xfrm>
+          <a:prstGeom prst="rect">
+            <a:avLst/>
+          </a:prstGeom>
+          <a:noFill/>
+          <a:extLst>
+            <a:ext uri="{909E8E84-426E-40DD-AFC4-6F175D3DCCD1}">
+              <a14:hiddenFill xmlns:a14="http://schemas.microsoft.com/office/drawing/2010/main">
+                <a:solidFill>
+                  <a:srgbClr val="FFFFFF"/>
+                </a:solidFill>
+              </a14:hiddenFill>
+            </a:ext>
+          </a:extLst>
+        </p:spPr>
+      </p:pic>
+    </p:spTree>
+    <p:extLst>
+      <p:ext uri="{BB962C8B-B14F-4D97-AF65-F5344CB8AC3E}">
+        <p14:creationId xmlns:p14="http://schemas.microsoft.com/office/powerpoint/2010/main" val="3598419895"/>
+      </p:ext>
+    </p:extLst>
+  </p:cSld>
+  <p:clrMapOvr>
+    <a:masterClrMapping/>
+  </p:clrMapOvr>
+</p:sld>
+</file>
+
+<file path=ppt/slides/slide29.xml><?xml version="1.0" encoding="utf-8"?>
+<p:sld xmlns:a="http://schemas.openxmlformats.org/drawingml/2006/main" xmlns:r="http://schemas.openxmlformats.org/officeDocument/2006/relationships" xmlns:p="http://schemas.openxmlformats.org/presentationml/2006/main">
+  <p:cSld>
+    <p:spTree>
+      <p:nvGrpSpPr>
+        <p:cNvPr id="1" name=""/>
+        <p:cNvGrpSpPr/>
+        <p:nvPr/>
+      </p:nvGrpSpPr>
+      <p:grpSpPr>
+        <a:xfrm>
+          <a:off x="0" y="0"/>
+          <a:ext cx="0" cy="0"/>
+          <a:chOff x="0" y="0"/>
+          <a:chExt cx="0" cy="0"/>
+        </a:xfrm>
+      </p:grpSpPr>
+      <p:sp>
+        <p:nvSpPr>
+          <p:cNvPr id="2" name="Title 1"/>
+          <p:cNvSpPr>
+            <a:spLocks noGrp="1"/>
+          </p:cNvSpPr>
+          <p:nvPr>
+            <p:ph type="title"/>
+          </p:nvPr>
+        </p:nvSpPr>
+        <p:spPr>
+          <a:xfrm>
+            <a:off x="457200" y="0"/>
+            <a:ext cx="8229600" cy="1115616"/>
+          </a:xfrm>
+        </p:spPr>
+        <p:txBody>
+          <a:bodyPr>
+            <a:normAutofit/>
+          </a:bodyPr>
+          <a:lstStyle/>
+          <a:p>
+            <a:r>
+              <a:rPr lang="fr-FR" sz="4000" dirty="0" smtClean="0"/>
+              <a:t>Limites de l’approche</a:t>
+            </a:r>
+            <a:endParaRPr lang="en-US" sz="4000" dirty="0"/>
+          </a:p>
+        </p:txBody>
+      </p:sp>
+      <p:sp>
+        <p:nvSpPr>
+          <p:cNvPr id="4" name="TextBox 3"/>
+          <p:cNvSpPr txBox="1"/>
+          <p:nvPr/>
+        </p:nvSpPr>
+        <p:spPr>
+          <a:xfrm>
+            <a:off x="1206880" y="1823913"/>
+            <a:ext cx="5838714" cy="3046988"/>
+          </a:xfrm>
+          <a:prstGeom prst="rect">
+            <a:avLst/>
+          </a:prstGeom>
+          <a:noFill/>
+        </p:spPr>
+        <p:txBody>
+          <a:bodyPr wrap="none" rtlCol="0">
+            <a:spAutoFit/>
+          </a:bodyPr>
+          <a:lstStyle/>
+          <a:p>
+            <a:pPr marL="457200" indent="-457200">
+              <a:buFont typeface="Arial" panose="020B0604020202020204" pitchFamily="34" charset="0"/>
+              <a:buChar char="•"/>
+            </a:pPr>
+            <a:r>
+              <a:rPr lang="fr-FR" sz="2400" dirty="0" smtClean="0"/>
+              <a:t>Sensible aux filtrages ICMP</a:t>
+            </a:r>
+          </a:p>
+          <a:p>
+            <a:pPr marL="285750" indent="-285750">
+              <a:buFont typeface="Arial" panose="020B0604020202020204" pitchFamily="34" charset="0"/>
+              <a:buChar char="•"/>
+            </a:pPr>
+            <a:endParaRPr lang="fr-FR" dirty="0" smtClean="0"/>
+          </a:p>
+          <a:p>
+            <a:pPr marL="457200" indent="-457200">
+              <a:buFont typeface="Arial" panose="020B0604020202020204" pitchFamily="34" charset="0"/>
+              <a:buChar char="•"/>
+            </a:pPr>
+            <a:r>
+              <a:rPr lang="fr-FR" sz="2400" dirty="0" smtClean="0"/>
+              <a:t>Sensible à l’</a:t>
+            </a:r>
+            <a:r>
+              <a:rPr lang="fr-FR" sz="2400" i="1" dirty="0" smtClean="0"/>
+              <a:t>aliasing</a:t>
+            </a:r>
+          </a:p>
+          <a:p>
+            <a:pPr marL="285750" indent="-285750">
+              <a:buFont typeface="Arial" panose="020B0604020202020204" pitchFamily="34" charset="0"/>
+              <a:buChar char="•"/>
+            </a:pPr>
+            <a:endParaRPr lang="fr-FR" dirty="0" smtClean="0"/>
+          </a:p>
+          <a:p>
+            <a:pPr marL="457200" indent="-457200">
+              <a:buFont typeface="Arial" panose="020B0604020202020204" pitchFamily="34" charset="0"/>
+              <a:buChar char="•"/>
+            </a:pPr>
+            <a:r>
+              <a:rPr lang="fr-FR" sz="2400" dirty="0" smtClean="0"/>
+              <a:t>Non-uniformité des cibles (par rapport à ces limites)</a:t>
+            </a:r>
+          </a:p>
+          <a:p>
+            <a:pPr marL="285750" indent="-285750">
+              <a:buFont typeface="Arial" panose="020B0604020202020204" pitchFamily="34" charset="0"/>
+              <a:buChar char="•"/>
+            </a:pPr>
+            <a:endParaRPr lang="fr-FR" dirty="0" smtClean="0"/>
+          </a:p>
+          <a:p>
+            <a:pPr marL="457200" indent="-457200">
+              <a:buFont typeface="Arial" panose="020B0604020202020204" pitchFamily="34" charset="0"/>
+              <a:buChar char="•"/>
+            </a:pPr>
+            <a:r>
+              <a:rPr lang="fr-FR" sz="2400" dirty="0" smtClean="0"/>
+              <a:t>Routes de tailles variables et faux voisins</a:t>
+            </a:r>
+          </a:p>
+          <a:p>
+            <a:pPr marL="285750" indent="-285750">
+              <a:buFont typeface="Arial" panose="020B0604020202020204" pitchFamily="34" charset="0"/>
+              <a:buChar char="•"/>
+            </a:pPr>
+            <a:endParaRPr lang="fr-FR" dirty="0" smtClean="0"/>
+          </a:p>
+          <a:p>
+            <a:pPr marL="457200" indent="-457200">
+              <a:buFont typeface="Arial" panose="020B0604020202020204" pitchFamily="34" charset="0"/>
+              <a:buChar char="•"/>
+            </a:pPr>
+            <a:r>
+              <a:rPr lang="fr-FR" sz="2400" dirty="0" smtClean="0"/>
+              <a:t>Qu’a-t-on réellement mesuré ?</a:t>
+            </a:r>
+            <a:endParaRPr lang="en-US" sz="2400" dirty="0"/>
+          </a:p>
+        </p:txBody>
+      </p:sp>
+    </p:spTree>
+    <p:extLst>
+      <p:ext uri="{BB962C8B-B14F-4D97-AF65-F5344CB8AC3E}">
+        <p14:creationId xmlns:p14="http://schemas.microsoft.com/office/powerpoint/2010/main" val="2904055578"/>
+      </p:ext>
+    </p:extLst>
+  </p:cSld>
+  <p:clrMapOvr>
+    <a:masterClrMapping/>
+  </p:clrMapOvr>
+</p:sld>
+</file>
+
 <file path=ppt/slides/slide3.xml><?xml version="1.0" encoding="utf-8"?>
 <p:sld xmlns:a="http://schemas.openxmlformats.org/drawingml/2006/main" xmlns:r="http://schemas.openxmlformats.org/officeDocument/2006/relationships" xmlns:p="http://schemas.openxmlformats.org/presentationml/2006/main">
   <p:cSld>
@@ -7934,6 +8883,1692 @@
     <p:extLst>
       <p:ext uri="{BB962C8B-B14F-4D97-AF65-F5344CB8AC3E}">
         <p14:creationId xmlns:p14="http://schemas.microsoft.com/office/powerpoint/2010/main" val="3939371657"/>
+      </p:ext>
+    </p:extLst>
+  </p:cSld>
+  <p:clrMapOvr>
+    <a:masterClrMapping/>
+  </p:clrMapOvr>
+</p:sld>
+</file>
+
+<file path=ppt/slides/slide30.xml><?xml version="1.0" encoding="utf-8"?>
+<p:sld xmlns:a="http://schemas.openxmlformats.org/drawingml/2006/main" xmlns:r="http://schemas.openxmlformats.org/officeDocument/2006/relationships" xmlns:p="http://schemas.openxmlformats.org/presentationml/2006/main">
+  <p:cSld>
+    <p:spTree>
+      <p:nvGrpSpPr>
+        <p:cNvPr id="1" name=""/>
+        <p:cNvGrpSpPr/>
+        <p:nvPr/>
+      </p:nvGrpSpPr>
+      <p:grpSpPr>
+        <a:xfrm>
+          <a:off x="0" y="0"/>
+          <a:ext cx="0" cy="0"/>
+          <a:chOff x="0" y="0"/>
+          <a:chExt cx="0" cy="0"/>
+        </a:xfrm>
+      </p:grpSpPr>
+      <p:sp>
+        <p:nvSpPr>
+          <p:cNvPr id="2" name="Title 1"/>
+          <p:cNvSpPr>
+            <a:spLocks noGrp="1"/>
+          </p:cNvSpPr>
+          <p:nvPr>
+            <p:ph type="ctrTitle"/>
+          </p:nvPr>
+        </p:nvSpPr>
+        <p:spPr>
+          <a:xfrm>
+            <a:off x="685800" y="2693988"/>
+            <a:ext cx="7772400" cy="1470025"/>
+          </a:xfrm>
+        </p:spPr>
+        <p:txBody>
+          <a:bodyPr>
+            <a:normAutofit/>
+          </a:bodyPr>
+          <a:lstStyle/>
+          <a:p>
+            <a:r>
+              <a:rPr lang="fr-FR" sz="3600" dirty="0" smtClean="0"/>
+              <a:t>Distribution de degrés au niveau physique</a:t>
+            </a:r>
+            <a:endParaRPr lang="en-US" sz="3600" dirty="0"/>
+          </a:p>
+        </p:txBody>
+      </p:sp>
+    </p:spTree>
+    <p:extLst>
+      <p:ext uri="{BB962C8B-B14F-4D97-AF65-F5344CB8AC3E}">
+        <p14:creationId xmlns:p14="http://schemas.microsoft.com/office/powerpoint/2010/main" val="1746263867"/>
+      </p:ext>
+    </p:extLst>
+  </p:cSld>
+  <p:clrMapOvr>
+    <a:masterClrMapping/>
+  </p:clrMapOvr>
+</p:sld>
+</file>
+
+<file path=ppt/slides/slide31.xml><?xml version="1.0" encoding="utf-8"?>
+<p:sld xmlns:a="http://schemas.openxmlformats.org/drawingml/2006/main" xmlns:r="http://schemas.openxmlformats.org/officeDocument/2006/relationships" xmlns:p="http://schemas.openxmlformats.org/presentationml/2006/main">
+  <p:cSld>
+    <p:spTree>
+      <p:nvGrpSpPr>
+        <p:cNvPr id="1" name=""/>
+        <p:cNvGrpSpPr/>
+        <p:nvPr/>
+      </p:nvGrpSpPr>
+      <p:grpSpPr>
+        <a:xfrm>
+          <a:off x="0" y="0"/>
+          <a:ext cx="0" cy="0"/>
+          <a:chOff x="0" y="0"/>
+          <a:chExt cx="0" cy="0"/>
+        </a:xfrm>
+      </p:grpSpPr>
+      <p:sp>
+        <p:nvSpPr>
+          <p:cNvPr id="2" name="Title 1"/>
+          <p:cNvSpPr>
+            <a:spLocks noGrp="1"/>
+          </p:cNvSpPr>
+          <p:nvPr>
+            <p:ph type="title"/>
+          </p:nvPr>
+        </p:nvSpPr>
+        <p:spPr>
+          <a:xfrm>
+            <a:off x="457200" y="0"/>
+            <a:ext cx="8229600" cy="1115616"/>
+          </a:xfrm>
+        </p:spPr>
+        <p:txBody>
+          <a:bodyPr>
+            <a:normAutofit/>
+          </a:bodyPr>
+          <a:lstStyle/>
+          <a:p>
+            <a:r>
+              <a:rPr lang="fr-FR" sz="4000" dirty="0" smtClean="0"/>
+              <a:t>Topologie physique : motivation</a:t>
+            </a:r>
+            <a:endParaRPr lang="en-US" sz="4000" dirty="0"/>
+          </a:p>
+        </p:txBody>
+      </p:sp>
+      <p:sp>
+        <p:nvSpPr>
+          <p:cNvPr id="4" name="TextBox 3"/>
+          <p:cNvSpPr txBox="1"/>
+          <p:nvPr/>
+        </p:nvSpPr>
+        <p:spPr>
+          <a:xfrm>
+            <a:off x="818710" y="2204864"/>
+            <a:ext cx="7506580" cy="2369880"/>
+          </a:xfrm>
+          <a:prstGeom prst="rect">
+            <a:avLst/>
+          </a:prstGeom>
+          <a:noFill/>
+        </p:spPr>
+        <p:txBody>
+          <a:bodyPr wrap="square" rtlCol="0">
+            <a:spAutoFit/>
+          </a:bodyPr>
+          <a:lstStyle/>
+          <a:p>
+            <a:pPr marL="457200" indent="-457200">
+              <a:buFont typeface="Arial" panose="020B0604020202020204" pitchFamily="34" charset="0"/>
+              <a:buChar char="•"/>
+            </a:pPr>
+            <a:r>
+              <a:rPr lang="fr-FR" sz="2800" dirty="0" smtClean="0"/>
+              <a:t>Plus proche de la réalité matérielle (« machines et câbles »)</a:t>
+            </a:r>
+          </a:p>
+          <a:p>
+            <a:endParaRPr lang="fr-FR" sz="1200" dirty="0" smtClean="0"/>
+          </a:p>
+          <a:p>
+            <a:pPr marL="457200" indent="-457200">
+              <a:buFont typeface="Arial" panose="020B0604020202020204" pitchFamily="34" charset="0"/>
+              <a:buChar char="•"/>
+            </a:pPr>
+            <a:r>
+              <a:rPr lang="fr-FR" sz="2800" dirty="0" smtClean="0"/>
+              <a:t>Sous-jacente à la topologie logique</a:t>
+            </a:r>
+          </a:p>
+          <a:p>
+            <a:endParaRPr lang="fr-FR" sz="1200" dirty="0" smtClean="0"/>
+          </a:p>
+          <a:p>
+            <a:pPr marL="457200" indent="-457200">
+              <a:buFont typeface="Arial" panose="020B0604020202020204" pitchFamily="34" charset="0"/>
+              <a:buChar char="•"/>
+            </a:pPr>
+            <a:r>
+              <a:rPr lang="fr-FR" sz="2800" dirty="0" smtClean="0"/>
+              <a:t>Pertinence mise en évidence par nos travaux préliminaires</a:t>
+            </a:r>
+          </a:p>
+          <a:p>
+            <a:endParaRPr lang="fr-FR" sz="1200" dirty="0" smtClean="0"/>
+          </a:p>
+          <a:p>
+            <a:pPr marL="457200" indent="-457200">
+              <a:buFont typeface="Arial" panose="020B0604020202020204" pitchFamily="34" charset="0"/>
+              <a:buChar char="•"/>
+            </a:pPr>
+            <a:r>
+              <a:rPr lang="fr-FR" sz="2800" dirty="0" smtClean="0"/>
+              <a:t>Opportunité d’approfondir notre approche</a:t>
+            </a:r>
+          </a:p>
+        </p:txBody>
+      </p:sp>
+    </p:spTree>
+    <p:extLst>
+      <p:ext uri="{BB962C8B-B14F-4D97-AF65-F5344CB8AC3E}">
+        <p14:creationId xmlns:p14="http://schemas.microsoft.com/office/powerpoint/2010/main" val="2864683335"/>
+      </p:ext>
+    </p:extLst>
+  </p:cSld>
+  <p:clrMapOvr>
+    <a:masterClrMapping/>
+  </p:clrMapOvr>
+</p:sld>
+</file>
+
+<file path=ppt/slides/slide32.xml><?xml version="1.0" encoding="utf-8"?>
+<p:sld xmlns:a="http://schemas.openxmlformats.org/drawingml/2006/main" xmlns:r="http://schemas.openxmlformats.org/officeDocument/2006/relationships" xmlns:p="http://schemas.openxmlformats.org/presentationml/2006/main">
+  <p:cSld>
+    <p:spTree>
+      <p:nvGrpSpPr>
+        <p:cNvPr id="1" name=""/>
+        <p:cNvGrpSpPr/>
+        <p:nvPr/>
+      </p:nvGrpSpPr>
+      <p:grpSpPr>
+        <a:xfrm>
+          <a:off x="0" y="0"/>
+          <a:ext cx="0" cy="0"/>
+          <a:chOff x="0" y="0"/>
+          <a:chExt cx="0" cy="0"/>
+        </a:xfrm>
+      </p:grpSpPr>
+      <p:sp>
+        <p:nvSpPr>
+          <p:cNvPr id="2" name="Title 1"/>
+          <p:cNvSpPr>
+            <a:spLocks noGrp="1"/>
+          </p:cNvSpPr>
+          <p:nvPr>
+            <p:ph type="title"/>
+          </p:nvPr>
+        </p:nvSpPr>
+        <p:spPr>
+          <a:xfrm>
+            <a:off x="457200" y="0"/>
+            <a:ext cx="8229600" cy="1115616"/>
+          </a:xfrm>
+        </p:spPr>
+        <p:txBody>
+          <a:bodyPr>
+            <a:normAutofit/>
+          </a:bodyPr>
+          <a:lstStyle/>
+          <a:p>
+            <a:r>
+              <a:rPr lang="fr-FR" sz="4000" dirty="0" smtClean="0"/>
+              <a:t>Description formelle des objets</a:t>
+            </a:r>
+            <a:endParaRPr lang="en-US" sz="4000" dirty="0"/>
+          </a:p>
+        </p:txBody>
+      </p:sp>
+      <p:pic>
+        <p:nvPicPr>
+          <p:cNvPr id="1026" name="Picture 2"/>
+          <p:cNvPicPr>
+            <a:picLocks noChangeAspect="1" noChangeArrowheads="1"/>
+          </p:cNvPicPr>
+          <p:nvPr/>
+        </p:nvPicPr>
+        <p:blipFill>
+          <a:blip r:embed="rId2">
+            <a:extLst>
+              <a:ext uri="{28A0092B-C50C-407E-A947-70E740481C1C}">
+                <a14:useLocalDpi xmlns:a14="http://schemas.microsoft.com/office/drawing/2010/main" val="0"/>
+              </a:ext>
+            </a:extLst>
+          </a:blip>
+          <a:stretch>
+            <a:fillRect/>
+          </a:stretch>
+        </p:blipFill>
+        <p:spPr bwMode="auto">
+          <a:xfrm>
+            <a:off x="1691681" y="1411359"/>
+            <a:ext cx="5760640" cy="2533358"/>
+          </a:xfrm>
+          <a:prstGeom prst="rect">
+            <a:avLst/>
+          </a:prstGeom>
+          <a:noFill/>
+          <a:extLst>
+            <a:ext uri="{909E8E84-426E-40DD-AFC4-6F175D3DCCD1}">
+              <a14:hiddenFill xmlns:a14="http://schemas.microsoft.com/office/drawing/2010/main">
+                <a:solidFill>
+                  <a:srgbClr val="FFFFFF"/>
+                </a:solidFill>
+              </a14:hiddenFill>
+            </a:ext>
+          </a:extLst>
+        </p:spPr>
+      </p:pic>
+      <p:sp>
+        <p:nvSpPr>
+          <p:cNvPr id="6" name="TextBox 5"/>
+          <p:cNvSpPr txBox="1"/>
+          <p:nvPr/>
+        </p:nvSpPr>
+        <p:spPr>
+          <a:xfrm>
+            <a:off x="1777207" y="4739660"/>
+            <a:ext cx="3449983" cy="1569660"/>
+          </a:xfrm>
+          <a:prstGeom prst="rect">
+            <a:avLst/>
+          </a:prstGeom>
+          <a:noFill/>
+        </p:spPr>
+        <p:txBody>
+          <a:bodyPr wrap="none" rtlCol="0">
+            <a:spAutoFit/>
+          </a:bodyPr>
+          <a:lstStyle/>
+          <a:p>
+            <a:pPr marL="285750" indent="-285750">
+              <a:buFont typeface="Arial" panose="020B0604020202020204" pitchFamily="34" charset="0"/>
+              <a:buChar char="•"/>
+            </a:pPr>
+            <a:r>
+              <a:rPr lang="fr-FR" sz="2400" dirty="0" smtClean="0"/>
+              <a:t>Hôtes</a:t>
+            </a:r>
+          </a:p>
+          <a:p>
+            <a:pPr marL="285750" indent="-285750">
+              <a:buFont typeface="Arial" panose="020B0604020202020204" pitchFamily="34" charset="0"/>
+              <a:buChar char="•"/>
+            </a:pPr>
+            <a:r>
+              <a:rPr lang="fr-FR" sz="2400" dirty="0" smtClean="0"/>
+              <a:t>Interfaces</a:t>
+            </a:r>
+          </a:p>
+          <a:p>
+            <a:pPr marL="285750" indent="-285750">
+              <a:buFont typeface="Arial" panose="020B0604020202020204" pitchFamily="34" charset="0"/>
+              <a:buChar char="•"/>
+            </a:pPr>
+            <a:r>
+              <a:rPr lang="fr-FR" sz="2400" dirty="0" smtClean="0"/>
+              <a:t>Topologie physique « L2/L3 »</a:t>
+            </a:r>
+          </a:p>
+          <a:p>
+            <a:pPr marL="285750" indent="-285750">
+              <a:buFont typeface="Arial" panose="020B0604020202020204" pitchFamily="34" charset="0"/>
+              <a:buChar char="•"/>
+            </a:pPr>
+            <a:r>
+              <a:rPr lang="fr-FR" sz="2400" dirty="0" smtClean="0"/>
+              <a:t>Liens dans L2 </a:t>
+            </a:r>
+            <a:r>
+              <a:rPr lang="fr-FR" sz="2400" dirty="0" smtClean="0">
+                <a:latin typeface="Open Sans Condensed Light"/>
+                <a:ea typeface="Open Sans Condensed Light"/>
+                <a:cs typeface="Open Sans Condensed Light"/>
+              </a:rPr>
+              <a:t>≠ liens dans L3</a:t>
+            </a:r>
+            <a:endParaRPr lang="en-US" sz="2400" dirty="0"/>
+          </a:p>
+        </p:txBody>
+      </p:sp>
+      <p:sp>
+        <p:nvSpPr>
+          <p:cNvPr id="4" name="TextBox 3"/>
+          <p:cNvSpPr txBox="1"/>
+          <p:nvPr/>
+        </p:nvSpPr>
+        <p:spPr>
+          <a:xfrm>
+            <a:off x="2449544" y="4077072"/>
+            <a:ext cx="1114344" cy="369332"/>
+          </a:xfrm>
+          <a:prstGeom prst="rect">
+            <a:avLst/>
+          </a:prstGeom>
+          <a:noFill/>
+        </p:spPr>
+        <p:txBody>
+          <a:bodyPr wrap="none" rtlCol="0">
+            <a:spAutoFit/>
+          </a:bodyPr>
+          <a:lstStyle/>
+          <a:p>
+            <a:r>
+              <a:rPr lang="fr-FR" dirty="0" smtClean="0"/>
+              <a:t>Topologie L3</a:t>
+            </a:r>
+            <a:endParaRPr lang="en-US" dirty="0"/>
+          </a:p>
+        </p:txBody>
+      </p:sp>
+      <p:sp>
+        <p:nvSpPr>
+          <p:cNvPr id="8" name="TextBox 7"/>
+          <p:cNvSpPr txBox="1"/>
+          <p:nvPr/>
+        </p:nvSpPr>
+        <p:spPr>
+          <a:xfrm>
+            <a:off x="5338465" y="4077072"/>
+            <a:ext cx="1681807" cy="369332"/>
+          </a:xfrm>
+          <a:prstGeom prst="rect">
+            <a:avLst/>
+          </a:prstGeom>
+          <a:noFill/>
+        </p:spPr>
+        <p:txBody>
+          <a:bodyPr wrap="none" rtlCol="0">
+            <a:spAutoFit/>
+          </a:bodyPr>
+          <a:lstStyle/>
+          <a:p>
+            <a:r>
+              <a:rPr lang="fr-FR" dirty="0" smtClean="0"/>
+              <a:t>Topologie L2 induite</a:t>
+            </a:r>
+            <a:endParaRPr lang="en-US" dirty="0"/>
+          </a:p>
+        </p:txBody>
+      </p:sp>
+    </p:spTree>
+    <p:extLst>
+      <p:ext uri="{BB962C8B-B14F-4D97-AF65-F5344CB8AC3E}">
+        <p14:creationId xmlns:p14="http://schemas.microsoft.com/office/powerpoint/2010/main" val="158420983"/>
+      </p:ext>
+    </p:extLst>
+  </p:cSld>
+  <p:clrMapOvr>
+    <a:masterClrMapping/>
+  </p:clrMapOvr>
+</p:sld>
+</file>
+
+<file path=ppt/slides/slide33.xml><?xml version="1.0" encoding="utf-8"?>
+<p:sld xmlns:a="http://schemas.openxmlformats.org/drawingml/2006/main" xmlns:r="http://schemas.openxmlformats.org/officeDocument/2006/relationships" xmlns:p="http://schemas.openxmlformats.org/presentationml/2006/main">
+  <p:cSld>
+    <p:spTree>
+      <p:nvGrpSpPr>
+        <p:cNvPr id="1" name=""/>
+        <p:cNvGrpSpPr/>
+        <p:nvPr/>
+      </p:nvGrpSpPr>
+      <p:grpSpPr>
+        <a:xfrm>
+          <a:off x="0" y="0"/>
+          <a:ext cx="0" cy="0"/>
+          <a:chOff x="0" y="0"/>
+          <a:chExt cx="0" cy="0"/>
+        </a:xfrm>
+      </p:grpSpPr>
+      <p:sp>
+        <p:nvSpPr>
+          <p:cNvPr id="2" name="Title 1"/>
+          <p:cNvSpPr>
+            <a:spLocks noGrp="1"/>
+          </p:cNvSpPr>
+          <p:nvPr>
+            <p:ph type="title"/>
+          </p:nvPr>
+        </p:nvSpPr>
+        <p:spPr>
+          <a:xfrm>
+            <a:off x="457200" y="0"/>
+            <a:ext cx="8229600" cy="1115616"/>
+          </a:xfrm>
+        </p:spPr>
+        <p:txBody>
+          <a:bodyPr>
+            <a:normAutofit/>
+          </a:bodyPr>
+          <a:lstStyle/>
+          <a:p>
+            <a:r>
+              <a:rPr lang="fr-FR" sz="4000" dirty="0" smtClean="0"/>
+              <a:t>Description formelle des outils</a:t>
+            </a:r>
+            <a:endParaRPr lang="en-US" sz="4000" dirty="0"/>
+          </a:p>
+        </p:txBody>
+      </p:sp>
+      <p:sp>
+        <p:nvSpPr>
+          <p:cNvPr id="3" name="TextBox 2"/>
+          <p:cNvSpPr txBox="1"/>
+          <p:nvPr/>
+        </p:nvSpPr>
+        <p:spPr>
+          <a:xfrm>
+            <a:off x="1708748" y="3284984"/>
+            <a:ext cx="5726504" cy="830997"/>
+          </a:xfrm>
+          <a:prstGeom prst="rect">
+            <a:avLst/>
+          </a:prstGeom>
+          <a:noFill/>
+        </p:spPr>
+        <p:txBody>
+          <a:bodyPr wrap="square" rtlCol="0">
+            <a:spAutoFit/>
+          </a:bodyPr>
+          <a:lstStyle/>
+          <a:p>
+            <a:r>
+              <a:rPr lang="fr-FR" sz="2400" i="1" dirty="0" smtClean="0"/>
+              <a:t>UDP Ping </a:t>
+            </a:r>
+            <a:r>
+              <a:rPr lang="fr-FR" sz="2400" dirty="0" smtClean="0"/>
+              <a:t>envoie </a:t>
+            </a:r>
+            <a:r>
+              <a:rPr lang="fr-FR" sz="2400" dirty="0"/>
+              <a:t>des sondes </a:t>
+            </a:r>
+            <a:r>
+              <a:rPr lang="fr-FR" sz="2400" dirty="0" smtClean="0"/>
+              <a:t>malformées vers une cible </a:t>
+            </a:r>
+            <a:r>
+              <a:rPr lang="fr-FR" sz="2400" i="1" dirty="0" smtClean="0"/>
+              <a:t>t </a:t>
+            </a:r>
+            <a:r>
+              <a:rPr lang="fr-FR" sz="2400" dirty="0" smtClean="0"/>
+              <a:t> qui répond un message d’erreur.</a:t>
+            </a:r>
+            <a:endParaRPr lang="en-US" sz="2400" dirty="0"/>
+          </a:p>
+        </p:txBody>
+      </p:sp>
+      <p:pic>
+        <p:nvPicPr>
+          <p:cNvPr id="2051" name="Picture 3"/>
+          <p:cNvPicPr>
+            <a:picLocks noChangeAspect="1" noChangeArrowheads="1"/>
+          </p:cNvPicPr>
+          <p:nvPr/>
+        </p:nvPicPr>
+        <p:blipFill>
+          <a:blip r:embed="rId2">
+            <a:extLst>
+              <a:ext uri="{28A0092B-C50C-407E-A947-70E740481C1C}">
+                <a14:useLocalDpi xmlns:a14="http://schemas.microsoft.com/office/drawing/2010/main" val="0"/>
+              </a:ext>
+            </a:extLst>
+          </a:blip>
+          <a:stretch>
+            <a:fillRect/>
+          </a:stretch>
+        </p:blipFill>
+        <p:spPr bwMode="auto">
+          <a:xfrm>
+            <a:off x="1974150" y="1340768"/>
+            <a:ext cx="5195701" cy="1628775"/>
+          </a:xfrm>
+          <a:prstGeom prst="rect">
+            <a:avLst/>
+          </a:prstGeom>
+          <a:noFill/>
+          <a:extLst>
+            <a:ext uri="{909E8E84-426E-40DD-AFC4-6F175D3DCCD1}">
+              <a14:hiddenFill xmlns:a14="http://schemas.microsoft.com/office/drawing/2010/main">
+                <a:solidFill>
+                  <a:srgbClr val="FFFFFF"/>
+                </a:solidFill>
+              </a14:hiddenFill>
+            </a:ext>
+          </a:extLst>
+        </p:spPr>
+      </p:pic>
+      <p:sp>
+        <p:nvSpPr>
+          <p:cNvPr id="4" name="TextBox 3"/>
+          <p:cNvSpPr txBox="1"/>
+          <p:nvPr/>
+        </p:nvSpPr>
+        <p:spPr>
+          <a:xfrm>
+            <a:off x="1708748" y="4149080"/>
+            <a:ext cx="4972515" cy="830997"/>
+          </a:xfrm>
+          <a:prstGeom prst="rect">
+            <a:avLst/>
+          </a:prstGeom>
+          <a:noFill/>
+        </p:spPr>
+        <p:txBody>
+          <a:bodyPr wrap="none" rtlCol="0">
+            <a:spAutoFit/>
+          </a:bodyPr>
+          <a:lstStyle/>
+          <a:p>
+            <a:r>
+              <a:rPr lang="fr-FR" sz="2400" dirty="0" smtClean="0"/>
+              <a:t>Interprétation :</a:t>
+            </a:r>
+          </a:p>
+          <a:p>
+            <a:r>
+              <a:rPr lang="fr-FR" sz="2400" dirty="0" smtClean="0"/>
+              <a:t>« L’interface de réponse </a:t>
+            </a:r>
+            <a:r>
+              <a:rPr lang="fr-FR" sz="2400" i="1" dirty="0" smtClean="0"/>
+              <a:t>i = m(t</a:t>
+            </a:r>
+            <a:r>
+              <a:rPr lang="fr-FR" sz="2400" dirty="0" smtClean="0"/>
+              <a:t>) appartient à </a:t>
+            </a:r>
+            <a:r>
+              <a:rPr lang="fr-FR" sz="2400" i="1" dirty="0" smtClean="0"/>
+              <a:t>t</a:t>
+            </a:r>
+            <a:r>
+              <a:rPr lang="fr-FR" sz="2400" dirty="0" smtClean="0"/>
+              <a:t>. »</a:t>
+            </a:r>
+            <a:endParaRPr lang="en-US" sz="2400" dirty="0"/>
+          </a:p>
+        </p:txBody>
+      </p:sp>
+    </p:spTree>
+    <p:extLst>
+      <p:ext uri="{BB962C8B-B14F-4D97-AF65-F5344CB8AC3E}">
+        <p14:creationId xmlns:p14="http://schemas.microsoft.com/office/powerpoint/2010/main" val="2560506677"/>
+      </p:ext>
+    </p:extLst>
+  </p:cSld>
+  <p:clrMapOvr>
+    <a:masterClrMapping/>
+  </p:clrMapOvr>
+</p:sld>
+</file>
+
+<file path=ppt/slides/slide34.xml><?xml version="1.0" encoding="utf-8"?>
+<p:sld xmlns:a="http://schemas.openxmlformats.org/drawingml/2006/main" xmlns:r="http://schemas.openxmlformats.org/officeDocument/2006/relationships" xmlns:p="http://schemas.openxmlformats.org/presentationml/2006/main">
+  <p:cSld>
+    <p:spTree>
+      <p:nvGrpSpPr>
+        <p:cNvPr id="1" name=""/>
+        <p:cNvGrpSpPr/>
+        <p:nvPr/>
+      </p:nvGrpSpPr>
+      <p:grpSpPr>
+        <a:xfrm>
+          <a:off x="0" y="0"/>
+          <a:ext cx="0" cy="0"/>
+          <a:chOff x="0" y="0"/>
+          <a:chExt cx="0" cy="0"/>
+        </a:xfrm>
+      </p:grpSpPr>
+      <p:sp>
+        <p:nvSpPr>
+          <p:cNvPr id="2" name="Title 1"/>
+          <p:cNvSpPr>
+            <a:spLocks noGrp="1"/>
+          </p:cNvSpPr>
+          <p:nvPr>
+            <p:ph type="title"/>
+          </p:nvPr>
+        </p:nvSpPr>
+        <p:spPr>
+          <a:xfrm>
+            <a:off x="457200" y="0"/>
+            <a:ext cx="8229600" cy="1115616"/>
+          </a:xfrm>
+        </p:spPr>
+        <p:txBody>
+          <a:bodyPr>
+            <a:normAutofit/>
+          </a:bodyPr>
+          <a:lstStyle/>
+          <a:p>
+            <a:r>
+              <a:rPr lang="fr-FR" sz="4000" dirty="0" smtClean="0"/>
+              <a:t>Description formelle des outils</a:t>
+            </a:r>
+            <a:endParaRPr lang="en-US" sz="4000" dirty="0"/>
+          </a:p>
+        </p:txBody>
+      </p:sp>
+      <p:sp>
+        <p:nvSpPr>
+          <p:cNvPr id="4" name="TextBox 3"/>
+          <p:cNvSpPr txBox="1"/>
+          <p:nvPr/>
+        </p:nvSpPr>
+        <p:spPr>
+          <a:xfrm>
+            <a:off x="1708748" y="4149080"/>
+            <a:ext cx="4722447" cy="1200329"/>
+          </a:xfrm>
+          <a:prstGeom prst="rect">
+            <a:avLst/>
+          </a:prstGeom>
+          <a:noFill/>
+        </p:spPr>
+        <p:txBody>
+          <a:bodyPr wrap="none" rtlCol="0">
+            <a:spAutoFit/>
+          </a:bodyPr>
+          <a:lstStyle/>
+          <a:p>
+            <a:r>
+              <a:rPr lang="fr-FR" sz="2400" dirty="0" smtClean="0"/>
+              <a:t>Interprétation :</a:t>
+            </a:r>
+          </a:p>
+          <a:p>
+            <a:r>
+              <a:rPr lang="fr-FR" sz="2400" dirty="0" smtClean="0"/>
+              <a:t>« L’interface de réponse </a:t>
+            </a:r>
+            <a:r>
+              <a:rPr lang="fr-FR" sz="2400" i="1" dirty="0" smtClean="0"/>
+              <a:t>i = m(t</a:t>
+            </a:r>
+            <a:r>
+              <a:rPr lang="fr-FR" sz="2400" dirty="0" smtClean="0"/>
+              <a:t>) appartient à </a:t>
+            </a:r>
+            <a:r>
+              <a:rPr lang="fr-FR" sz="2400" i="1" dirty="0" smtClean="0"/>
+              <a:t>t</a:t>
+            </a:r>
+            <a:endParaRPr lang="fr-FR" sz="2400" dirty="0" smtClean="0"/>
+          </a:p>
+          <a:p>
+            <a:r>
+              <a:rPr lang="fr-FR" sz="2400" dirty="0" smtClean="0">
+                <a:solidFill>
+                  <a:srgbClr val="FF0000"/>
+                </a:solidFill>
+              </a:rPr>
+              <a:t>et cette interface dépend de </a:t>
+            </a:r>
+            <a:r>
+              <a:rPr lang="fr-FR" sz="2400" i="1" dirty="0" smtClean="0">
+                <a:solidFill>
+                  <a:srgbClr val="FF0000"/>
+                </a:solidFill>
+              </a:rPr>
+              <a:t>m</a:t>
+            </a:r>
+            <a:r>
+              <a:rPr lang="fr-FR" sz="2400" dirty="0" smtClean="0"/>
+              <a:t>. »</a:t>
+            </a:r>
+            <a:endParaRPr lang="en-US" sz="2400" dirty="0"/>
+          </a:p>
+        </p:txBody>
+      </p:sp>
+      <p:pic>
+        <p:nvPicPr>
+          <p:cNvPr id="6" name="Picture 3"/>
+          <p:cNvPicPr>
+            <a:picLocks noChangeAspect="1" noChangeArrowheads="1"/>
+          </p:cNvPicPr>
+          <p:nvPr/>
+        </p:nvPicPr>
+        <p:blipFill>
+          <a:blip r:embed="rId2">
+            <a:extLst>
+              <a:ext uri="{28A0092B-C50C-407E-A947-70E740481C1C}">
+                <a14:useLocalDpi xmlns:a14="http://schemas.microsoft.com/office/drawing/2010/main" val="0"/>
+              </a:ext>
+            </a:extLst>
+          </a:blip>
+          <a:stretch>
+            <a:fillRect/>
+          </a:stretch>
+        </p:blipFill>
+        <p:spPr bwMode="auto">
+          <a:xfrm>
+            <a:off x="634617" y="1412776"/>
+            <a:ext cx="7874768" cy="2255956"/>
+          </a:xfrm>
+          <a:prstGeom prst="rect">
+            <a:avLst/>
+          </a:prstGeom>
+          <a:noFill/>
+          <a:extLst>
+            <a:ext uri="{909E8E84-426E-40DD-AFC4-6F175D3DCCD1}">
+              <a14:hiddenFill xmlns:a14="http://schemas.microsoft.com/office/drawing/2010/main">
+                <a:solidFill>
+                  <a:srgbClr val="FFFFFF"/>
+                </a:solidFill>
+              </a14:hiddenFill>
+            </a:ext>
+          </a:extLst>
+        </p:spPr>
+      </p:pic>
+      <p:sp>
+        <p:nvSpPr>
+          <p:cNvPr id="5" name="TextBox 4"/>
+          <p:cNvSpPr txBox="1"/>
+          <p:nvPr/>
+        </p:nvSpPr>
+        <p:spPr>
+          <a:xfrm>
+            <a:off x="1404562" y="5517232"/>
+            <a:ext cx="6334876" cy="400110"/>
+          </a:xfrm>
+          <a:prstGeom prst="rect">
+            <a:avLst/>
+          </a:prstGeom>
+          <a:noFill/>
+        </p:spPr>
+        <p:txBody>
+          <a:bodyPr wrap="none" rtlCol="0">
+            <a:spAutoFit/>
+          </a:bodyPr>
+          <a:lstStyle/>
+          <a:p>
+            <a:r>
+              <a:rPr lang="fr-FR" sz="2000" b="1" dirty="0" smtClean="0"/>
+              <a:t>Avec assez de moniteurs, peut-on obtenir </a:t>
+            </a:r>
+            <a:r>
+              <a:rPr lang="fr-FR" sz="2000" b="1" i="1" dirty="0" smtClean="0"/>
+              <a:t>toutes </a:t>
+            </a:r>
+            <a:r>
+              <a:rPr lang="fr-FR" sz="2000" b="1" dirty="0" smtClean="0"/>
+              <a:t> les interfaces d’une cible ?</a:t>
+            </a:r>
+            <a:endParaRPr lang="en-US" sz="2000" b="1" dirty="0"/>
+          </a:p>
+        </p:txBody>
+      </p:sp>
+    </p:spTree>
+    <p:extLst>
+      <p:ext uri="{BB962C8B-B14F-4D97-AF65-F5344CB8AC3E}">
+        <p14:creationId xmlns:p14="http://schemas.microsoft.com/office/powerpoint/2010/main" val="3100149997"/>
+      </p:ext>
+    </p:extLst>
+  </p:cSld>
+  <p:clrMapOvr>
+    <a:masterClrMapping/>
+  </p:clrMapOvr>
+</p:sld>
+</file>
+
+<file path=ppt/slides/slide35.xml><?xml version="1.0" encoding="utf-8"?>
+<p:sld xmlns:a="http://schemas.openxmlformats.org/drawingml/2006/main" xmlns:r="http://schemas.openxmlformats.org/officeDocument/2006/relationships" xmlns:p="http://schemas.openxmlformats.org/presentationml/2006/main">
+  <p:cSld>
+    <p:spTree>
+      <p:nvGrpSpPr>
+        <p:cNvPr id="1" name=""/>
+        <p:cNvGrpSpPr/>
+        <p:nvPr/>
+      </p:nvGrpSpPr>
+      <p:grpSpPr>
+        <a:xfrm>
+          <a:off x="0" y="0"/>
+          <a:ext cx="0" cy="0"/>
+          <a:chOff x="0" y="0"/>
+          <a:chExt cx="0" cy="0"/>
+        </a:xfrm>
+      </p:grpSpPr>
+      <p:sp>
+        <p:nvSpPr>
+          <p:cNvPr id="2" name="Title 1"/>
+          <p:cNvSpPr>
+            <a:spLocks noGrp="1"/>
+          </p:cNvSpPr>
+          <p:nvPr>
+            <p:ph type="title"/>
+          </p:nvPr>
+        </p:nvSpPr>
+        <p:spPr>
+          <a:xfrm>
+            <a:off x="457200" y="0"/>
+            <a:ext cx="8229600" cy="1115616"/>
+          </a:xfrm>
+        </p:spPr>
+        <p:txBody>
+          <a:bodyPr>
+            <a:normAutofit/>
+          </a:bodyPr>
+          <a:lstStyle/>
+          <a:p>
+            <a:r>
+              <a:rPr lang="fr-FR" sz="4000" dirty="0" smtClean="0"/>
+              <a:t>Cas d’une cible dans le cœur</a:t>
+            </a:r>
+            <a:endParaRPr lang="en-US" sz="4000" dirty="0"/>
+          </a:p>
+        </p:txBody>
+      </p:sp>
+      <p:pic>
+        <p:nvPicPr>
+          <p:cNvPr id="8194" name="Picture 2"/>
+          <p:cNvPicPr>
+            <a:picLocks noChangeAspect="1" noChangeArrowheads="1"/>
+          </p:cNvPicPr>
+          <p:nvPr/>
+        </p:nvPicPr>
+        <p:blipFill>
+          <a:blip r:embed="rId2">
+            <a:extLst>
+              <a:ext uri="{28A0092B-C50C-407E-A947-70E740481C1C}">
+                <a14:useLocalDpi xmlns:a14="http://schemas.microsoft.com/office/drawing/2010/main" val="0"/>
+              </a:ext>
+            </a:extLst>
+          </a:blip>
+          <a:stretch>
+            <a:fillRect/>
+          </a:stretch>
+        </p:blipFill>
+        <p:spPr bwMode="auto">
+          <a:xfrm>
+            <a:off x="1983564" y="1484784"/>
+            <a:ext cx="5176874" cy="3888434"/>
+          </a:xfrm>
+          <a:prstGeom prst="rect">
+            <a:avLst/>
+          </a:prstGeom>
+          <a:noFill/>
+          <a:extLst>
+            <a:ext uri="{909E8E84-426E-40DD-AFC4-6F175D3DCCD1}">
+              <a14:hiddenFill xmlns:a14="http://schemas.microsoft.com/office/drawing/2010/main">
+                <a:solidFill>
+                  <a:srgbClr val="FFFFFF"/>
+                </a:solidFill>
+              </a14:hiddenFill>
+            </a:ext>
+          </a:extLst>
+        </p:spPr>
+      </p:pic>
+      <p:sp>
+        <p:nvSpPr>
+          <p:cNvPr id="5" name="TextBox 4"/>
+          <p:cNvSpPr txBox="1"/>
+          <p:nvPr/>
+        </p:nvSpPr>
+        <p:spPr>
+          <a:xfrm>
+            <a:off x="1907704" y="5733256"/>
+            <a:ext cx="5328592" cy="646331"/>
+          </a:xfrm>
+          <a:prstGeom prst="rect">
+            <a:avLst/>
+          </a:prstGeom>
+          <a:noFill/>
+        </p:spPr>
+        <p:txBody>
+          <a:bodyPr wrap="square" rtlCol="0">
+            <a:spAutoFit/>
+          </a:bodyPr>
+          <a:lstStyle/>
+          <a:p>
+            <a:r>
+              <a:rPr lang="fr-FR" dirty="0" smtClean="0"/>
+              <a:t>En bleu, </a:t>
+            </a:r>
+            <a:r>
+              <a:rPr lang="fr-FR" dirty="0" smtClean="0">
+                <a:solidFill>
+                  <a:srgbClr val="0070C0"/>
+                </a:solidFill>
+              </a:rPr>
+              <a:t>les interfaces tournées vers le cœur</a:t>
+            </a:r>
+            <a:r>
+              <a:rPr lang="fr-FR" dirty="0" smtClean="0"/>
+              <a:t>, sont toutes observées.</a:t>
+            </a:r>
+          </a:p>
+          <a:p>
+            <a:r>
+              <a:rPr lang="fr-FR" dirty="0" smtClean="0"/>
+              <a:t>En route, </a:t>
+            </a:r>
+            <a:r>
+              <a:rPr lang="fr-FR" dirty="0" smtClean="0">
+                <a:solidFill>
+                  <a:srgbClr val="FF0000"/>
+                </a:solidFill>
+              </a:rPr>
+              <a:t>les interfaces tournées vers le bord</a:t>
+            </a:r>
+            <a:r>
+              <a:rPr lang="fr-FR" dirty="0" smtClean="0"/>
+              <a:t>, ne sont pas observées.</a:t>
+            </a:r>
+            <a:endParaRPr lang="en-US" dirty="0"/>
+          </a:p>
+        </p:txBody>
+      </p:sp>
+    </p:spTree>
+    <p:extLst>
+      <p:ext uri="{BB962C8B-B14F-4D97-AF65-F5344CB8AC3E}">
+        <p14:creationId xmlns:p14="http://schemas.microsoft.com/office/powerpoint/2010/main" val="3337510467"/>
+      </p:ext>
+    </p:extLst>
+  </p:cSld>
+  <p:clrMapOvr>
+    <a:masterClrMapping/>
+  </p:clrMapOvr>
+</p:sld>
+</file>
+
+<file path=ppt/slides/slide36.xml><?xml version="1.0" encoding="utf-8"?>
+<p:sld xmlns:a="http://schemas.openxmlformats.org/drawingml/2006/main" xmlns:r="http://schemas.openxmlformats.org/officeDocument/2006/relationships" xmlns:p="http://schemas.openxmlformats.org/presentationml/2006/main">
+  <p:cSld>
+    <p:spTree>
+      <p:nvGrpSpPr>
+        <p:cNvPr id="1" name=""/>
+        <p:cNvGrpSpPr/>
+        <p:nvPr/>
+      </p:nvGrpSpPr>
+      <p:grpSpPr>
+        <a:xfrm>
+          <a:off x="0" y="0"/>
+          <a:ext cx="0" cy="0"/>
+          <a:chOff x="0" y="0"/>
+          <a:chExt cx="0" cy="0"/>
+        </a:xfrm>
+      </p:grpSpPr>
+      <p:sp>
+        <p:nvSpPr>
+          <p:cNvPr id="2" name="Title 1"/>
+          <p:cNvSpPr>
+            <a:spLocks noGrp="1"/>
+          </p:cNvSpPr>
+          <p:nvPr>
+            <p:ph type="title"/>
+          </p:nvPr>
+        </p:nvSpPr>
+        <p:spPr>
+          <a:xfrm>
+            <a:off x="457200" y="0"/>
+            <a:ext cx="8229600" cy="1115616"/>
+          </a:xfrm>
+        </p:spPr>
+        <p:txBody>
+          <a:bodyPr>
+            <a:normAutofit/>
+          </a:bodyPr>
+          <a:lstStyle/>
+          <a:p>
+            <a:r>
+              <a:rPr lang="fr-FR" sz="4000" dirty="0" smtClean="0"/>
+              <a:t>Cas d’une cible dans le bord</a:t>
+            </a:r>
+            <a:endParaRPr lang="en-US" sz="4000" dirty="0"/>
+          </a:p>
+        </p:txBody>
+      </p:sp>
+      <p:pic>
+        <p:nvPicPr>
+          <p:cNvPr id="8194" name="Picture 2"/>
+          <p:cNvPicPr>
+            <a:picLocks noChangeAspect="1" noChangeArrowheads="1"/>
+          </p:cNvPicPr>
+          <p:nvPr/>
+        </p:nvPicPr>
+        <p:blipFill>
+          <a:blip r:embed="rId2">
+            <a:extLst>
+              <a:ext uri="{28A0092B-C50C-407E-A947-70E740481C1C}">
+                <a14:useLocalDpi xmlns:a14="http://schemas.microsoft.com/office/drawing/2010/main" val="0"/>
+              </a:ext>
+            </a:extLst>
+          </a:blip>
+          <a:stretch>
+            <a:fillRect/>
+          </a:stretch>
+        </p:blipFill>
+        <p:spPr bwMode="auto">
+          <a:xfrm>
+            <a:off x="1983564" y="1484784"/>
+            <a:ext cx="5176874" cy="3888433"/>
+          </a:xfrm>
+          <a:prstGeom prst="rect">
+            <a:avLst/>
+          </a:prstGeom>
+          <a:noFill/>
+          <a:extLst>
+            <a:ext uri="{909E8E84-426E-40DD-AFC4-6F175D3DCCD1}">
+              <a14:hiddenFill xmlns:a14="http://schemas.microsoft.com/office/drawing/2010/main">
+                <a:solidFill>
+                  <a:srgbClr val="FFFFFF"/>
+                </a:solidFill>
+              </a14:hiddenFill>
+            </a:ext>
+          </a:extLst>
+        </p:spPr>
+      </p:pic>
+      <p:sp>
+        <p:nvSpPr>
+          <p:cNvPr id="5" name="TextBox 4"/>
+          <p:cNvSpPr txBox="1"/>
+          <p:nvPr/>
+        </p:nvSpPr>
+        <p:spPr>
+          <a:xfrm>
+            <a:off x="1907704" y="5733256"/>
+            <a:ext cx="5328592" cy="646331"/>
+          </a:xfrm>
+          <a:prstGeom prst="rect">
+            <a:avLst/>
+          </a:prstGeom>
+          <a:noFill/>
+        </p:spPr>
+        <p:txBody>
+          <a:bodyPr wrap="square" rtlCol="0">
+            <a:spAutoFit/>
+          </a:bodyPr>
+          <a:lstStyle/>
+          <a:p>
+            <a:r>
+              <a:rPr lang="fr-FR" dirty="0" smtClean="0"/>
+              <a:t>En bleu, </a:t>
+            </a:r>
+            <a:r>
+              <a:rPr lang="fr-FR" dirty="0" smtClean="0">
+                <a:solidFill>
+                  <a:srgbClr val="0070C0"/>
+                </a:solidFill>
+              </a:rPr>
+              <a:t>l’unique interface tournée vers le cœur</a:t>
+            </a:r>
+            <a:r>
+              <a:rPr lang="fr-FR" dirty="0" smtClean="0"/>
+              <a:t>, est observée.</a:t>
+            </a:r>
+          </a:p>
+          <a:p>
+            <a:r>
+              <a:rPr lang="fr-FR" dirty="0" smtClean="0"/>
+              <a:t>En route, </a:t>
+            </a:r>
+            <a:r>
+              <a:rPr lang="fr-FR" dirty="0" smtClean="0">
+                <a:solidFill>
+                  <a:srgbClr val="FF0000"/>
+                </a:solidFill>
+              </a:rPr>
+              <a:t>les interfaces tournées vers le bord</a:t>
+            </a:r>
+            <a:r>
+              <a:rPr lang="fr-FR" dirty="0" smtClean="0"/>
+              <a:t>, ne sont pas observées.</a:t>
+            </a:r>
+            <a:endParaRPr lang="en-US" dirty="0"/>
+          </a:p>
+        </p:txBody>
+      </p:sp>
+    </p:spTree>
+    <p:extLst>
+      <p:ext uri="{BB962C8B-B14F-4D97-AF65-F5344CB8AC3E}">
+        <p14:creationId xmlns:p14="http://schemas.microsoft.com/office/powerpoint/2010/main" val="4255892585"/>
+      </p:ext>
+    </p:extLst>
+  </p:cSld>
+  <p:clrMapOvr>
+    <a:masterClrMapping/>
+  </p:clrMapOvr>
+</p:sld>
+</file>
+
+<file path=ppt/slides/slide37.xml><?xml version="1.0" encoding="utf-8"?>
+<p:sld xmlns:a="http://schemas.openxmlformats.org/drawingml/2006/main" xmlns:r="http://schemas.openxmlformats.org/officeDocument/2006/relationships" xmlns:p="http://schemas.openxmlformats.org/presentationml/2006/main">
+  <p:cSld>
+    <p:spTree>
+      <p:nvGrpSpPr>
+        <p:cNvPr id="1" name=""/>
+        <p:cNvGrpSpPr/>
+        <p:nvPr/>
+      </p:nvGrpSpPr>
+      <p:grpSpPr>
+        <a:xfrm>
+          <a:off x="0" y="0"/>
+          <a:ext cx="0" cy="0"/>
+          <a:chOff x="0" y="0"/>
+          <a:chExt cx="0" cy="0"/>
+        </a:xfrm>
+      </p:grpSpPr>
+      <p:sp>
+        <p:nvSpPr>
+          <p:cNvPr id="2" name="Title 1"/>
+          <p:cNvSpPr>
+            <a:spLocks noGrp="1"/>
+          </p:cNvSpPr>
+          <p:nvPr>
+            <p:ph type="title"/>
+          </p:nvPr>
+        </p:nvSpPr>
+        <p:spPr>
+          <a:xfrm>
+            <a:off x="457200" y="0"/>
+            <a:ext cx="8229600" cy="1115616"/>
+          </a:xfrm>
+        </p:spPr>
+        <p:txBody>
+          <a:bodyPr>
+            <a:normAutofit/>
+          </a:bodyPr>
+          <a:lstStyle/>
+          <a:p>
+            <a:r>
+              <a:rPr lang="fr-FR" sz="4000" dirty="0" smtClean="0"/>
+              <a:t>Description formelle des outils</a:t>
+            </a:r>
+            <a:endParaRPr lang="en-US" sz="4000" dirty="0"/>
+          </a:p>
+        </p:txBody>
+      </p:sp>
+      <p:sp>
+        <p:nvSpPr>
+          <p:cNvPr id="4" name="TextBox 3"/>
+          <p:cNvSpPr txBox="1"/>
+          <p:nvPr/>
+        </p:nvSpPr>
+        <p:spPr>
+          <a:xfrm>
+            <a:off x="1708748" y="4149080"/>
+            <a:ext cx="4722447" cy="1200329"/>
+          </a:xfrm>
+          <a:prstGeom prst="rect">
+            <a:avLst/>
+          </a:prstGeom>
+          <a:noFill/>
+        </p:spPr>
+        <p:txBody>
+          <a:bodyPr wrap="none" rtlCol="0">
+            <a:spAutoFit/>
+          </a:bodyPr>
+          <a:lstStyle/>
+          <a:p>
+            <a:r>
+              <a:rPr lang="fr-FR" sz="2400" dirty="0" smtClean="0"/>
+              <a:t>Interprétation :</a:t>
+            </a:r>
+          </a:p>
+          <a:p>
+            <a:r>
+              <a:rPr lang="fr-FR" sz="2400" dirty="0" smtClean="0"/>
+              <a:t>« L’interface de réponse </a:t>
+            </a:r>
+            <a:r>
+              <a:rPr lang="fr-FR" sz="2400" i="1" dirty="0" smtClean="0"/>
+              <a:t>i = m(t)</a:t>
+            </a:r>
+            <a:r>
+              <a:rPr lang="fr-FR" sz="2400" dirty="0" smtClean="0"/>
+              <a:t> appartient à </a:t>
+            </a:r>
+            <a:r>
+              <a:rPr lang="fr-FR" sz="2400" i="1" dirty="0" smtClean="0"/>
+              <a:t>t</a:t>
+            </a:r>
+            <a:endParaRPr lang="fr-FR" sz="2400" dirty="0" smtClean="0"/>
+          </a:p>
+          <a:p>
+            <a:r>
+              <a:rPr lang="fr-FR" sz="2400" dirty="0" smtClean="0"/>
+              <a:t>et cette interface dépend de </a:t>
+            </a:r>
+            <a:r>
+              <a:rPr lang="fr-FR" sz="2400" i="1" dirty="0" smtClean="0"/>
+              <a:t>m</a:t>
+            </a:r>
+            <a:r>
+              <a:rPr lang="fr-FR" sz="2400" dirty="0" smtClean="0"/>
+              <a:t>. »</a:t>
+            </a:r>
+            <a:endParaRPr lang="en-US" sz="2400" dirty="0"/>
+          </a:p>
+        </p:txBody>
+      </p:sp>
+      <p:pic>
+        <p:nvPicPr>
+          <p:cNvPr id="6" name="Picture 3"/>
+          <p:cNvPicPr>
+            <a:picLocks noChangeAspect="1" noChangeArrowheads="1"/>
+          </p:cNvPicPr>
+          <p:nvPr/>
+        </p:nvPicPr>
+        <p:blipFill>
+          <a:blip r:embed="rId2">
+            <a:extLst>
+              <a:ext uri="{28A0092B-C50C-407E-A947-70E740481C1C}">
+                <a14:useLocalDpi xmlns:a14="http://schemas.microsoft.com/office/drawing/2010/main" val="0"/>
+              </a:ext>
+            </a:extLst>
+          </a:blip>
+          <a:stretch>
+            <a:fillRect/>
+          </a:stretch>
+        </p:blipFill>
+        <p:spPr bwMode="auto">
+          <a:xfrm>
+            <a:off x="634617" y="1412776"/>
+            <a:ext cx="7874768" cy="2255956"/>
+          </a:xfrm>
+          <a:prstGeom prst="rect">
+            <a:avLst/>
+          </a:prstGeom>
+          <a:noFill/>
+          <a:extLst>
+            <a:ext uri="{909E8E84-426E-40DD-AFC4-6F175D3DCCD1}">
+              <a14:hiddenFill xmlns:a14="http://schemas.microsoft.com/office/drawing/2010/main">
+                <a:solidFill>
+                  <a:srgbClr val="FFFFFF"/>
+                </a:solidFill>
+              </a14:hiddenFill>
+            </a:ext>
+          </a:extLst>
+        </p:spPr>
+      </p:pic>
+      <p:sp>
+        <p:nvSpPr>
+          <p:cNvPr id="5" name="TextBox 4"/>
+          <p:cNvSpPr txBox="1"/>
+          <p:nvPr/>
+        </p:nvSpPr>
+        <p:spPr>
+          <a:xfrm>
+            <a:off x="1404562" y="5517232"/>
+            <a:ext cx="6435864" cy="400110"/>
+          </a:xfrm>
+          <a:prstGeom prst="rect">
+            <a:avLst/>
+          </a:prstGeom>
+          <a:noFill/>
+        </p:spPr>
+        <p:txBody>
+          <a:bodyPr wrap="none" rtlCol="0">
+            <a:spAutoFit/>
+          </a:bodyPr>
+          <a:lstStyle/>
+          <a:p>
+            <a:r>
+              <a:rPr lang="fr-FR" sz="2000" b="1" dirty="0" smtClean="0"/>
+              <a:t>Avec assez de moniteurs, peut-on obtenir </a:t>
+            </a:r>
+            <a:r>
+              <a:rPr lang="fr-FR" sz="2000" b="1" i="1" dirty="0" smtClean="0">
+                <a:solidFill>
+                  <a:srgbClr val="FF0000"/>
+                </a:solidFill>
+              </a:rPr>
+              <a:t>toutes </a:t>
+            </a:r>
+            <a:r>
+              <a:rPr lang="fr-FR" sz="2000" b="1" dirty="0" smtClean="0">
+                <a:solidFill>
+                  <a:srgbClr val="FF0000"/>
+                </a:solidFill>
+              </a:rPr>
+              <a:t> les interfaces d’une cible</a:t>
+            </a:r>
+            <a:r>
+              <a:rPr lang="fr-FR" sz="2000" b="1" dirty="0" smtClean="0"/>
+              <a:t> ?</a:t>
+            </a:r>
+            <a:endParaRPr lang="en-US" sz="2000" b="1" dirty="0"/>
+          </a:p>
+        </p:txBody>
+      </p:sp>
+      <p:sp>
+        <p:nvSpPr>
+          <p:cNvPr id="7" name="TextBox 6"/>
+          <p:cNvSpPr txBox="1"/>
+          <p:nvPr/>
+        </p:nvSpPr>
+        <p:spPr>
+          <a:xfrm>
+            <a:off x="1404562" y="5939988"/>
+            <a:ext cx="6349623" cy="461665"/>
+          </a:xfrm>
+          <a:prstGeom prst="rect">
+            <a:avLst/>
+          </a:prstGeom>
+          <a:noFill/>
+        </p:spPr>
+        <p:txBody>
+          <a:bodyPr wrap="none" rtlCol="0">
+            <a:spAutoFit/>
+          </a:bodyPr>
+          <a:lstStyle/>
+          <a:p>
+            <a:pPr marL="285750" indent="-285750">
+              <a:buFont typeface="Wingdings" panose="05000000000000000000" pitchFamily="2" charset="2"/>
+              <a:buChar char="ü"/>
+            </a:pPr>
+            <a:r>
+              <a:rPr lang="fr-FR" sz="2400" dirty="0" smtClean="0">
+                <a:solidFill>
+                  <a:srgbClr val="00B050"/>
+                </a:solidFill>
+              </a:rPr>
+              <a:t>Toutes les interfaces dans le cœur d’une cible dans le cœur.</a:t>
+            </a:r>
+            <a:endParaRPr lang="en-US" sz="2400" dirty="0">
+              <a:solidFill>
+                <a:srgbClr val="00B050"/>
+              </a:solidFill>
+            </a:endParaRPr>
+          </a:p>
+        </p:txBody>
+      </p:sp>
+    </p:spTree>
+    <p:extLst>
+      <p:ext uri="{BB962C8B-B14F-4D97-AF65-F5344CB8AC3E}">
+        <p14:creationId xmlns:p14="http://schemas.microsoft.com/office/powerpoint/2010/main" val="597765716"/>
+      </p:ext>
+    </p:extLst>
+  </p:cSld>
+  <p:clrMapOvr>
+    <a:masterClrMapping/>
+  </p:clrMapOvr>
+</p:sld>
+</file>
+
+<file path=ppt/slides/slide38.xml><?xml version="1.0" encoding="utf-8"?>
+<p:sld xmlns:a="http://schemas.openxmlformats.org/drawingml/2006/main" xmlns:r="http://schemas.openxmlformats.org/officeDocument/2006/relationships" xmlns:p="http://schemas.openxmlformats.org/presentationml/2006/main">
+  <p:cSld>
+    <p:spTree>
+      <p:nvGrpSpPr>
+        <p:cNvPr id="1" name=""/>
+        <p:cNvGrpSpPr/>
+        <p:nvPr/>
+      </p:nvGrpSpPr>
+      <p:grpSpPr>
+        <a:xfrm>
+          <a:off x="0" y="0"/>
+          <a:ext cx="0" cy="0"/>
+          <a:chOff x="0" y="0"/>
+          <a:chExt cx="0" cy="0"/>
+        </a:xfrm>
+      </p:grpSpPr>
+      <p:sp>
+        <p:nvSpPr>
+          <p:cNvPr id="2" name="Title 1"/>
+          <p:cNvSpPr>
+            <a:spLocks noGrp="1"/>
+          </p:cNvSpPr>
+          <p:nvPr>
+            <p:ph type="title"/>
+          </p:nvPr>
+        </p:nvSpPr>
+        <p:spPr>
+          <a:xfrm>
+            <a:off x="457200" y="0"/>
+            <a:ext cx="8229600" cy="1115616"/>
+          </a:xfrm>
+        </p:spPr>
+        <p:txBody>
+          <a:bodyPr>
+            <a:normAutofit/>
+          </a:bodyPr>
+          <a:lstStyle/>
+          <a:p>
+            <a:r>
+              <a:rPr lang="fr-FR" sz="4000" dirty="0" smtClean="0"/>
+              <a:t>Caractérisation des cibles dans le cœur</a:t>
+            </a:r>
+            <a:endParaRPr lang="en-US" sz="4000" dirty="0"/>
+          </a:p>
+        </p:txBody>
+      </p:sp>
+      <p:pic>
+        <p:nvPicPr>
+          <p:cNvPr id="9219" name="Picture 3"/>
+          <p:cNvPicPr>
+            <a:picLocks noChangeAspect="1" noChangeArrowheads="1"/>
+          </p:cNvPicPr>
+          <p:nvPr/>
+        </p:nvPicPr>
+        <p:blipFill>
+          <a:blip r:embed="rId2">
+            <a:extLst>
+              <a:ext uri="{28A0092B-C50C-407E-A947-70E740481C1C}">
+                <a14:useLocalDpi xmlns:a14="http://schemas.microsoft.com/office/drawing/2010/main" val="0"/>
+              </a:ext>
+            </a:extLst>
+          </a:blip>
+          <a:stretch>
+            <a:fillRect/>
+          </a:stretch>
+        </p:blipFill>
+        <p:spPr bwMode="auto">
+          <a:xfrm>
+            <a:off x="1691948" y="1190724"/>
+            <a:ext cx="5760105" cy="4326507"/>
+          </a:xfrm>
+          <a:prstGeom prst="rect">
+            <a:avLst/>
+          </a:prstGeom>
+          <a:noFill/>
+          <a:extLst>
+            <a:ext uri="{909E8E84-426E-40DD-AFC4-6F175D3DCCD1}">
+              <a14:hiddenFill xmlns:a14="http://schemas.microsoft.com/office/drawing/2010/main">
+                <a:solidFill>
+                  <a:srgbClr val="FFFFFF"/>
+                </a:solidFill>
+              </a14:hiddenFill>
+            </a:ext>
+          </a:extLst>
+        </p:spPr>
+      </p:pic>
+      <p:sp>
+        <p:nvSpPr>
+          <p:cNvPr id="3" name="TextBox 2"/>
+          <p:cNvSpPr txBox="1"/>
+          <p:nvPr/>
+        </p:nvSpPr>
+        <p:spPr>
+          <a:xfrm>
+            <a:off x="853675" y="6021288"/>
+            <a:ext cx="7436651" cy="400110"/>
+          </a:xfrm>
+          <a:prstGeom prst="rect">
+            <a:avLst/>
+          </a:prstGeom>
+          <a:noFill/>
+        </p:spPr>
+        <p:txBody>
+          <a:bodyPr wrap="none" rtlCol="0">
+            <a:spAutoFit/>
+          </a:bodyPr>
+          <a:lstStyle/>
+          <a:p>
+            <a:r>
+              <a:rPr lang="fr-FR" sz="2000" dirty="0" smtClean="0"/>
+              <a:t>La cible </a:t>
+            </a:r>
+            <a:r>
+              <a:rPr lang="fr-FR" sz="2000" i="1" dirty="0" smtClean="0"/>
+              <a:t>t</a:t>
+            </a:r>
+            <a:r>
+              <a:rPr lang="fr-FR" sz="2000" dirty="0" smtClean="0"/>
+              <a:t>  est dans le cœur : on observe au moins deux interfaces tournées vers le cœur.</a:t>
+            </a:r>
+            <a:endParaRPr lang="en-US" sz="2000" dirty="0"/>
+          </a:p>
+        </p:txBody>
+      </p:sp>
+    </p:spTree>
+    <p:extLst>
+      <p:ext uri="{BB962C8B-B14F-4D97-AF65-F5344CB8AC3E}">
+        <p14:creationId xmlns:p14="http://schemas.microsoft.com/office/powerpoint/2010/main" val="3916389735"/>
+      </p:ext>
+    </p:extLst>
+  </p:cSld>
+  <p:clrMapOvr>
+    <a:masterClrMapping/>
+  </p:clrMapOvr>
+</p:sld>
+</file>
+
+<file path=ppt/slides/slide39.xml><?xml version="1.0" encoding="utf-8"?>
+<p:sld xmlns:a="http://schemas.openxmlformats.org/drawingml/2006/main" xmlns:r="http://schemas.openxmlformats.org/officeDocument/2006/relationships" xmlns:p="http://schemas.openxmlformats.org/presentationml/2006/main">
+  <p:cSld>
+    <p:spTree>
+      <p:nvGrpSpPr>
+        <p:cNvPr id="1" name=""/>
+        <p:cNvGrpSpPr/>
+        <p:nvPr/>
+      </p:nvGrpSpPr>
+      <p:grpSpPr>
+        <a:xfrm>
+          <a:off x="0" y="0"/>
+          <a:ext cx="0" cy="0"/>
+          <a:chOff x="0" y="0"/>
+          <a:chExt cx="0" cy="0"/>
+        </a:xfrm>
+      </p:grpSpPr>
+      <p:sp>
+        <p:nvSpPr>
+          <p:cNvPr id="2" name="Title 1"/>
+          <p:cNvSpPr>
+            <a:spLocks noGrp="1"/>
+          </p:cNvSpPr>
+          <p:nvPr>
+            <p:ph type="title"/>
+          </p:nvPr>
+        </p:nvSpPr>
+        <p:spPr>
+          <a:xfrm>
+            <a:off x="457200" y="0"/>
+            <a:ext cx="8229600" cy="1115616"/>
+          </a:xfrm>
+        </p:spPr>
+        <p:txBody>
+          <a:bodyPr>
+            <a:normAutofit/>
+          </a:bodyPr>
+          <a:lstStyle/>
+          <a:p>
+            <a:r>
+              <a:rPr lang="fr-FR" sz="4000" dirty="0" smtClean="0"/>
+              <a:t>Caractérisation des cibles dans le cœur</a:t>
+            </a:r>
+            <a:endParaRPr lang="en-US" sz="4000" dirty="0"/>
+          </a:p>
+        </p:txBody>
+      </p:sp>
+      <p:pic>
+        <p:nvPicPr>
+          <p:cNvPr id="9219" name="Picture 3"/>
+          <p:cNvPicPr>
+            <a:picLocks noChangeAspect="1" noChangeArrowheads="1"/>
+          </p:cNvPicPr>
+          <p:nvPr/>
+        </p:nvPicPr>
+        <p:blipFill>
+          <a:blip r:embed="rId2">
+            <a:extLst>
+              <a:ext uri="{28A0092B-C50C-407E-A947-70E740481C1C}">
+                <a14:useLocalDpi xmlns:a14="http://schemas.microsoft.com/office/drawing/2010/main" val="0"/>
+              </a:ext>
+            </a:extLst>
+          </a:blip>
+          <a:stretch>
+            <a:fillRect/>
+          </a:stretch>
+        </p:blipFill>
+        <p:spPr bwMode="auto">
+          <a:xfrm>
+            <a:off x="1691948" y="1190724"/>
+            <a:ext cx="5760105" cy="4326508"/>
+          </a:xfrm>
+          <a:prstGeom prst="rect">
+            <a:avLst/>
+          </a:prstGeom>
+          <a:noFill/>
+          <a:extLst>
+            <a:ext uri="{909E8E84-426E-40DD-AFC4-6F175D3DCCD1}">
+              <a14:hiddenFill xmlns:a14="http://schemas.microsoft.com/office/drawing/2010/main">
+                <a:solidFill>
+                  <a:srgbClr val="FFFFFF"/>
+                </a:solidFill>
+              </a14:hiddenFill>
+            </a:ext>
+          </a:extLst>
+        </p:spPr>
+      </p:pic>
+      <p:sp>
+        <p:nvSpPr>
+          <p:cNvPr id="3" name="TextBox 2"/>
+          <p:cNvSpPr txBox="1"/>
+          <p:nvPr/>
+        </p:nvSpPr>
+        <p:spPr>
+          <a:xfrm>
+            <a:off x="1081461" y="6021288"/>
+            <a:ext cx="6981078" cy="400110"/>
+          </a:xfrm>
+          <a:prstGeom prst="rect">
+            <a:avLst/>
+          </a:prstGeom>
+          <a:noFill/>
+        </p:spPr>
+        <p:txBody>
+          <a:bodyPr wrap="none" rtlCol="0">
+            <a:spAutoFit/>
+          </a:bodyPr>
+          <a:lstStyle/>
+          <a:p>
+            <a:r>
+              <a:rPr lang="fr-FR" sz="2000" dirty="0" smtClean="0"/>
+              <a:t>La cible </a:t>
+            </a:r>
+            <a:r>
+              <a:rPr lang="fr-FR" sz="2000" i="1" dirty="0" smtClean="0"/>
+              <a:t>t</a:t>
+            </a:r>
+            <a:r>
+              <a:rPr lang="fr-FR" sz="2000" dirty="0" smtClean="0"/>
+              <a:t>  est dans le bord : on observe une unique interface tournée vers le cœur.</a:t>
+            </a:r>
+            <a:endParaRPr lang="en-US" sz="2000" dirty="0"/>
+          </a:p>
+        </p:txBody>
+      </p:sp>
+    </p:spTree>
+    <p:extLst>
+      <p:ext uri="{BB962C8B-B14F-4D97-AF65-F5344CB8AC3E}">
+        <p14:creationId xmlns:p14="http://schemas.microsoft.com/office/powerpoint/2010/main" val="1422467342"/>
       </p:ext>
     </p:extLst>
   </p:cSld>
@@ -8385,6 +11020,1505 @@
 </p:sld>
 </file>
 
+<file path=ppt/slides/slide40.xml><?xml version="1.0" encoding="utf-8"?>
+<p:sld xmlns:a="http://schemas.openxmlformats.org/drawingml/2006/main" xmlns:r="http://schemas.openxmlformats.org/officeDocument/2006/relationships" xmlns:p="http://schemas.openxmlformats.org/presentationml/2006/main">
+  <p:cSld>
+    <p:spTree>
+      <p:nvGrpSpPr>
+        <p:cNvPr id="1" name=""/>
+        <p:cNvGrpSpPr/>
+        <p:nvPr/>
+      </p:nvGrpSpPr>
+      <p:grpSpPr>
+        <a:xfrm>
+          <a:off x="0" y="0"/>
+          <a:ext cx="0" cy="0"/>
+          <a:chOff x="0" y="0"/>
+          <a:chExt cx="0" cy="0"/>
+        </a:xfrm>
+      </p:grpSpPr>
+      <p:sp>
+        <p:nvSpPr>
+          <p:cNvPr id="2" name="Title 1"/>
+          <p:cNvSpPr>
+            <a:spLocks noGrp="1"/>
+          </p:cNvSpPr>
+          <p:nvPr>
+            <p:ph type="title"/>
+          </p:nvPr>
+        </p:nvSpPr>
+        <p:spPr>
+          <a:xfrm>
+            <a:off x="457200" y="0"/>
+            <a:ext cx="8229600" cy="1115616"/>
+          </a:xfrm>
+        </p:spPr>
+        <p:txBody>
+          <a:bodyPr>
+            <a:normAutofit/>
+          </a:bodyPr>
+          <a:lstStyle/>
+          <a:p>
+            <a:r>
+              <a:rPr lang="fr-FR" sz="4000" dirty="0" smtClean="0"/>
+              <a:t>Caractérisation des cibles dans le cœur</a:t>
+            </a:r>
+            <a:endParaRPr lang="en-US" sz="4000" dirty="0"/>
+          </a:p>
+        </p:txBody>
+      </p:sp>
+      <p:pic>
+        <p:nvPicPr>
+          <p:cNvPr id="9219" name="Picture 3"/>
+          <p:cNvPicPr>
+            <a:picLocks noChangeAspect="1" noChangeArrowheads="1"/>
+          </p:cNvPicPr>
+          <p:nvPr/>
+        </p:nvPicPr>
+        <p:blipFill>
+          <a:blip r:embed="rId2">
+            <a:extLst>
+              <a:ext uri="{28A0092B-C50C-407E-A947-70E740481C1C}">
+                <a14:useLocalDpi xmlns:a14="http://schemas.microsoft.com/office/drawing/2010/main" val="0"/>
+              </a:ext>
+            </a:extLst>
+          </a:blip>
+          <a:stretch>
+            <a:fillRect/>
+          </a:stretch>
+        </p:blipFill>
+        <p:spPr bwMode="auto">
+          <a:xfrm>
+            <a:off x="1691949" y="1190724"/>
+            <a:ext cx="5760103" cy="4326507"/>
+          </a:xfrm>
+          <a:prstGeom prst="rect">
+            <a:avLst/>
+          </a:prstGeom>
+          <a:noFill/>
+          <a:extLst>
+            <a:ext uri="{909E8E84-426E-40DD-AFC4-6F175D3DCCD1}">
+              <a14:hiddenFill xmlns:a14="http://schemas.microsoft.com/office/drawing/2010/main">
+                <a:solidFill>
+                  <a:srgbClr val="FFFFFF"/>
+                </a:solidFill>
+              </a14:hiddenFill>
+            </a:ext>
+          </a:extLst>
+        </p:spPr>
+      </p:pic>
+      <p:sp>
+        <p:nvSpPr>
+          <p:cNvPr id="3" name="TextBox 2"/>
+          <p:cNvSpPr txBox="1"/>
+          <p:nvPr/>
+        </p:nvSpPr>
+        <p:spPr>
+          <a:xfrm>
+            <a:off x="432405" y="6021288"/>
+            <a:ext cx="8279190" cy="400110"/>
+          </a:xfrm>
+          <a:prstGeom prst="rect">
+            <a:avLst/>
+          </a:prstGeom>
+          <a:noFill/>
+        </p:spPr>
+        <p:txBody>
+          <a:bodyPr wrap="none" rtlCol="0">
+            <a:spAutoFit/>
+          </a:bodyPr>
+          <a:lstStyle/>
+          <a:p>
+            <a:r>
+              <a:rPr lang="fr-FR" sz="2000" dirty="0" smtClean="0"/>
+              <a:t>Cas problématique : un moniteur est situé « derrière » une cible et deux interfaces sont observées.</a:t>
+            </a:r>
+            <a:endParaRPr lang="en-US" sz="2000" dirty="0"/>
+          </a:p>
+        </p:txBody>
+      </p:sp>
+    </p:spTree>
+    <p:extLst>
+      <p:ext uri="{BB962C8B-B14F-4D97-AF65-F5344CB8AC3E}">
+        <p14:creationId xmlns:p14="http://schemas.microsoft.com/office/powerpoint/2010/main" val="4262001163"/>
+      </p:ext>
+    </p:extLst>
+  </p:cSld>
+  <p:clrMapOvr>
+    <a:masterClrMapping/>
+  </p:clrMapOvr>
+</p:sld>
+</file>
+
+<file path=ppt/slides/slide41.xml><?xml version="1.0" encoding="utf-8"?>
+<p:sld xmlns:a="http://schemas.openxmlformats.org/drawingml/2006/main" xmlns:r="http://schemas.openxmlformats.org/officeDocument/2006/relationships" xmlns:p="http://schemas.openxmlformats.org/presentationml/2006/main">
+  <p:cSld>
+    <p:spTree>
+      <p:nvGrpSpPr>
+        <p:cNvPr id="1" name=""/>
+        <p:cNvGrpSpPr/>
+        <p:nvPr/>
+      </p:nvGrpSpPr>
+      <p:grpSpPr>
+        <a:xfrm>
+          <a:off x="0" y="0"/>
+          <a:ext cx="0" cy="0"/>
+          <a:chOff x="0" y="0"/>
+          <a:chExt cx="0" cy="0"/>
+        </a:xfrm>
+      </p:grpSpPr>
+      <p:sp>
+        <p:nvSpPr>
+          <p:cNvPr id="2" name="Title 1"/>
+          <p:cNvSpPr>
+            <a:spLocks noGrp="1"/>
+          </p:cNvSpPr>
+          <p:nvPr>
+            <p:ph type="title"/>
+          </p:nvPr>
+        </p:nvSpPr>
+        <p:spPr>
+          <a:xfrm>
+            <a:off x="457200" y="0"/>
+            <a:ext cx="8229600" cy="1115616"/>
+          </a:xfrm>
+        </p:spPr>
+        <p:txBody>
+          <a:bodyPr>
+            <a:normAutofit/>
+          </a:bodyPr>
+          <a:lstStyle/>
+          <a:p>
+            <a:r>
+              <a:rPr lang="fr-FR" sz="4000" dirty="0" smtClean="0"/>
+              <a:t>Caractérisation des cibles </a:t>
+            </a:r>
+            <a:r>
+              <a:rPr lang="fr-FR" sz="4000" dirty="0" smtClean="0"/>
+              <a:t>problématiques</a:t>
+            </a:r>
+            <a:endParaRPr lang="en-US" sz="4000" dirty="0"/>
+          </a:p>
+        </p:txBody>
+      </p:sp>
+      <p:pic>
+        <p:nvPicPr>
+          <p:cNvPr id="9219" name="Picture 3"/>
+          <p:cNvPicPr>
+            <a:picLocks noChangeAspect="1" noChangeArrowheads="1"/>
+          </p:cNvPicPr>
+          <p:nvPr/>
+        </p:nvPicPr>
+        <p:blipFill>
+          <a:blip r:embed="rId2">
+            <a:extLst>
+              <a:ext uri="{28A0092B-C50C-407E-A947-70E740481C1C}">
+                <a14:useLocalDpi xmlns:a14="http://schemas.microsoft.com/office/drawing/2010/main" val="0"/>
+              </a:ext>
+            </a:extLst>
+          </a:blip>
+          <a:stretch>
+            <a:fillRect/>
+          </a:stretch>
+        </p:blipFill>
+        <p:spPr bwMode="auto">
+          <a:xfrm>
+            <a:off x="1691949" y="1430943"/>
+            <a:ext cx="5760103" cy="3846068"/>
+          </a:xfrm>
+          <a:prstGeom prst="rect">
+            <a:avLst/>
+          </a:prstGeom>
+          <a:noFill/>
+          <a:extLst>
+            <a:ext uri="{909E8E84-426E-40DD-AFC4-6F175D3DCCD1}">
+              <a14:hiddenFill xmlns:a14="http://schemas.microsoft.com/office/drawing/2010/main">
+                <a:solidFill>
+                  <a:srgbClr val="FFFFFF"/>
+                </a:solidFill>
+              </a14:hiddenFill>
+            </a:ext>
+          </a:extLst>
+        </p:spPr>
+      </p:pic>
+      <p:sp>
+        <p:nvSpPr>
+          <p:cNvPr id="3" name="TextBox 2"/>
+          <p:cNvSpPr txBox="1"/>
+          <p:nvPr/>
+        </p:nvSpPr>
+        <p:spPr>
+          <a:xfrm>
+            <a:off x="266494" y="6021288"/>
+            <a:ext cx="8611012" cy="400110"/>
+          </a:xfrm>
+          <a:prstGeom prst="rect">
+            <a:avLst/>
+          </a:prstGeom>
+          <a:noFill/>
+        </p:spPr>
+        <p:txBody>
+          <a:bodyPr wrap="none" rtlCol="0">
+            <a:spAutoFit/>
+          </a:bodyPr>
+          <a:lstStyle/>
+          <a:p>
+            <a:r>
+              <a:rPr lang="fr-FR" sz="2000" i="1" dirty="0" smtClean="0"/>
+              <a:t>UDP Explore</a:t>
+            </a:r>
+            <a:r>
+              <a:rPr lang="fr-FR" sz="2000" dirty="0" smtClean="0"/>
+              <a:t>  donne la liste des interfaces dans le bord observables par </a:t>
+            </a:r>
+            <a:r>
+              <a:rPr lang="fr-FR" sz="2000" i="1" dirty="0" smtClean="0"/>
+              <a:t>UDP Ping</a:t>
+            </a:r>
+            <a:r>
+              <a:rPr lang="fr-FR" sz="2000" dirty="0" smtClean="0"/>
+              <a:t>  depuis un moniteur.</a:t>
+            </a:r>
+            <a:endParaRPr lang="en-US" sz="2000" dirty="0"/>
+          </a:p>
+        </p:txBody>
+      </p:sp>
+    </p:spTree>
+    <p:extLst>
+      <p:ext uri="{BB962C8B-B14F-4D97-AF65-F5344CB8AC3E}">
+        <p14:creationId xmlns:p14="http://schemas.microsoft.com/office/powerpoint/2010/main" val="2475189526"/>
+      </p:ext>
+    </p:extLst>
+  </p:cSld>
+  <p:clrMapOvr>
+    <a:masterClrMapping/>
+  </p:clrMapOvr>
+</p:sld>
+</file>
+
+<file path=ppt/slides/slide42.xml><?xml version="1.0" encoding="utf-8"?>
+<p:sld xmlns:a="http://schemas.openxmlformats.org/drawingml/2006/main" xmlns:r="http://schemas.openxmlformats.org/officeDocument/2006/relationships" xmlns:p="http://schemas.openxmlformats.org/presentationml/2006/main">
+  <p:cSld>
+    <p:spTree>
+      <p:nvGrpSpPr>
+        <p:cNvPr id="1" name=""/>
+        <p:cNvGrpSpPr/>
+        <p:nvPr/>
+      </p:nvGrpSpPr>
+      <p:grpSpPr>
+        <a:xfrm>
+          <a:off x="0" y="0"/>
+          <a:ext cx="0" cy="0"/>
+          <a:chOff x="0" y="0"/>
+          <a:chExt cx="0" cy="0"/>
+        </a:xfrm>
+      </p:grpSpPr>
+      <p:sp>
+        <p:nvSpPr>
+          <p:cNvPr id="2" name="Title 1"/>
+          <p:cNvSpPr>
+            <a:spLocks noGrp="1"/>
+          </p:cNvSpPr>
+          <p:nvPr>
+            <p:ph type="title"/>
+          </p:nvPr>
+        </p:nvSpPr>
+        <p:spPr>
+          <a:xfrm>
+            <a:off x="457200" y="0"/>
+            <a:ext cx="8229600" cy="1115616"/>
+          </a:xfrm>
+        </p:spPr>
+        <p:txBody>
+          <a:bodyPr>
+            <a:normAutofit fontScale="90000"/>
+          </a:bodyPr>
+          <a:lstStyle/>
+          <a:p>
+            <a:r>
+              <a:rPr lang="fr-FR" sz="4000" dirty="0" err="1" smtClean="0"/>
+              <a:t>Echantillonage</a:t>
+            </a:r>
+            <a:r>
+              <a:rPr lang="fr-FR" sz="4000" dirty="0" smtClean="0"/>
+              <a:t> d’adresses de routeurs du cœur</a:t>
+            </a:r>
+            <a:endParaRPr lang="en-US" sz="4000" dirty="0"/>
+          </a:p>
+        </p:txBody>
+      </p:sp>
+      <p:sp>
+        <p:nvSpPr>
+          <p:cNvPr id="5" name="TextBox 4"/>
+          <p:cNvSpPr txBox="1"/>
+          <p:nvPr/>
+        </p:nvSpPr>
+        <p:spPr>
+          <a:xfrm>
+            <a:off x="455072" y="1750367"/>
+            <a:ext cx="8233857" cy="3357266"/>
+          </a:xfrm>
+          <a:prstGeom prst="rect">
+            <a:avLst/>
+          </a:prstGeom>
+          <a:noFill/>
+        </p:spPr>
+        <p:txBody>
+          <a:bodyPr wrap="none" rtlCol="0">
+            <a:spAutoFit/>
+          </a:bodyPr>
+          <a:lstStyle/>
+          <a:p>
+            <a:pPr marL="342900" indent="-342900">
+              <a:lnSpc>
+                <a:spcPct val="150000"/>
+              </a:lnSpc>
+              <a:buFont typeface="+mj-lt"/>
+              <a:buAutoNum type="arabicParenR"/>
+            </a:pPr>
+            <a:r>
+              <a:rPr lang="fr-FR" sz="2400" dirty="0" smtClean="0"/>
+              <a:t>Effectuer un tirage aléatoire uniforme d’entiers de 32 bits</a:t>
+            </a:r>
+          </a:p>
+          <a:p>
+            <a:pPr marL="342900" indent="-342900">
+              <a:lnSpc>
+                <a:spcPct val="150000"/>
+              </a:lnSpc>
+              <a:buFont typeface="+mj-lt"/>
+              <a:buAutoNum type="arabicParenR"/>
+            </a:pPr>
+            <a:r>
+              <a:rPr lang="fr-FR" sz="2400" dirty="0" smtClean="0"/>
+              <a:t>Supprimer les entiers ne correspondant pas à des adresses valides (RFC)</a:t>
+            </a:r>
+          </a:p>
+          <a:p>
+            <a:pPr marL="342900" indent="-342900">
+              <a:lnSpc>
+                <a:spcPct val="150000"/>
+              </a:lnSpc>
+              <a:buFont typeface="+mj-lt"/>
+              <a:buAutoNum type="arabicParenR"/>
+            </a:pPr>
+            <a:r>
+              <a:rPr lang="fr-FR" sz="2400" dirty="0" smtClean="0"/>
+              <a:t>Exécuter UDP Explore depuis chaque moniteur</a:t>
+            </a:r>
+          </a:p>
+          <a:p>
+            <a:pPr marL="342900" indent="-342900">
+              <a:lnSpc>
+                <a:spcPct val="150000"/>
+              </a:lnSpc>
+              <a:buFont typeface="+mj-lt"/>
+              <a:buAutoNum type="arabicParenR"/>
+            </a:pPr>
+            <a:r>
+              <a:rPr lang="fr-FR" sz="2400" dirty="0" smtClean="0"/>
+              <a:t>Exécuter UDP Ping depuis chaque moniteur vers chacune des adresses valides</a:t>
+            </a:r>
+          </a:p>
+          <a:p>
+            <a:pPr marL="342900" indent="-342900">
+              <a:lnSpc>
+                <a:spcPct val="150000"/>
+              </a:lnSpc>
+              <a:buFont typeface="+mj-lt"/>
+              <a:buAutoNum type="arabicParenR"/>
+            </a:pPr>
+            <a:r>
+              <a:rPr lang="fr-FR" sz="2400" dirty="0" smtClean="0"/>
+              <a:t>Supprimer les interfaces observées par UDP Explore des résultats</a:t>
+            </a:r>
+          </a:p>
+          <a:p>
+            <a:pPr marL="342900" indent="-342900">
+              <a:lnSpc>
+                <a:spcPct val="150000"/>
+              </a:lnSpc>
+              <a:buFont typeface="+mj-lt"/>
+              <a:buAutoNum type="arabicParenR"/>
+            </a:pPr>
+            <a:r>
+              <a:rPr lang="fr-FR" sz="2400" dirty="0" smtClean="0"/>
+              <a:t>Supprimer les cibles ayant moins de 2 interfaces dans le cœur</a:t>
+            </a:r>
+          </a:p>
+        </p:txBody>
+      </p:sp>
+    </p:spTree>
+    <p:extLst>
+      <p:ext uri="{BB962C8B-B14F-4D97-AF65-F5344CB8AC3E}">
+        <p14:creationId xmlns:p14="http://schemas.microsoft.com/office/powerpoint/2010/main" val="2691788655"/>
+      </p:ext>
+    </p:extLst>
+  </p:cSld>
+  <p:clrMapOvr>
+    <a:masterClrMapping/>
+  </p:clrMapOvr>
+</p:sld>
+</file>
+
+<file path=ppt/slides/slide43.xml><?xml version="1.0" encoding="utf-8"?>
+<p:sld xmlns:a="http://schemas.openxmlformats.org/drawingml/2006/main" xmlns:r="http://schemas.openxmlformats.org/officeDocument/2006/relationships" xmlns:p="http://schemas.openxmlformats.org/presentationml/2006/main">
+  <p:cSld>
+    <p:spTree>
+      <p:nvGrpSpPr>
+        <p:cNvPr id="1" name=""/>
+        <p:cNvGrpSpPr/>
+        <p:nvPr/>
+      </p:nvGrpSpPr>
+      <p:grpSpPr>
+        <a:xfrm>
+          <a:off x="0" y="0"/>
+          <a:ext cx="0" cy="0"/>
+          <a:chOff x="0" y="0"/>
+          <a:chExt cx="0" cy="0"/>
+        </a:xfrm>
+      </p:grpSpPr>
+      <p:sp>
+        <p:nvSpPr>
+          <p:cNvPr id="2" name="Title 1"/>
+          <p:cNvSpPr>
+            <a:spLocks noGrp="1"/>
+          </p:cNvSpPr>
+          <p:nvPr>
+            <p:ph type="title"/>
+          </p:nvPr>
+        </p:nvSpPr>
+        <p:spPr>
+          <a:xfrm>
+            <a:off x="457200" y="0"/>
+            <a:ext cx="8229600" cy="1115616"/>
+          </a:xfrm>
+        </p:spPr>
+        <p:txBody>
+          <a:bodyPr>
+            <a:normAutofit/>
+          </a:bodyPr>
+          <a:lstStyle/>
+          <a:p>
+            <a:r>
+              <a:rPr lang="fr-FR" sz="4000" dirty="0" smtClean="0"/>
+              <a:t>Correction du biais de sélection</a:t>
+            </a:r>
+            <a:endParaRPr lang="en-US" sz="4000" dirty="0"/>
+          </a:p>
+        </p:txBody>
+      </p:sp>
+      <p:sp>
+        <p:nvSpPr>
+          <p:cNvPr id="3" name="TextBox 2"/>
+          <p:cNvSpPr txBox="1"/>
+          <p:nvPr/>
+        </p:nvSpPr>
+        <p:spPr>
+          <a:xfrm>
+            <a:off x="1529662" y="1556792"/>
+            <a:ext cx="6084676" cy="461665"/>
+          </a:xfrm>
+          <a:prstGeom prst="rect">
+            <a:avLst/>
+          </a:prstGeom>
+          <a:noFill/>
+        </p:spPr>
+        <p:txBody>
+          <a:bodyPr wrap="square" rtlCol="0">
+            <a:spAutoFit/>
+          </a:bodyPr>
+          <a:lstStyle/>
+          <a:p>
+            <a:pPr algn="ctr"/>
+            <a:r>
+              <a:rPr lang="fr-FR" sz="2400" dirty="0" err="1" smtClean="0"/>
+              <a:t>Echantilloner</a:t>
+            </a:r>
+            <a:r>
+              <a:rPr lang="fr-FR" sz="2400" dirty="0" smtClean="0"/>
+              <a:t> des </a:t>
+            </a:r>
+            <a:r>
+              <a:rPr lang="fr-FR" sz="2400" b="1" dirty="0" smtClean="0"/>
+              <a:t>adresses</a:t>
+            </a:r>
+            <a:r>
+              <a:rPr lang="fr-FR" sz="2400" dirty="0" smtClean="0"/>
+              <a:t> </a:t>
+            </a:r>
+            <a:r>
+              <a:rPr lang="fr-FR" sz="2400" dirty="0" smtClean="0">
+                <a:latin typeface="Open Sans Condensed Light"/>
+                <a:ea typeface="Open Sans Condensed Light"/>
+                <a:cs typeface="Open Sans Condensed Light"/>
+              </a:rPr>
+              <a:t>≠ </a:t>
+            </a:r>
+            <a:r>
+              <a:rPr lang="fr-FR" sz="2400" dirty="0" err="1" smtClean="0">
+                <a:latin typeface="Open Sans Condensed Light"/>
+                <a:ea typeface="Open Sans Condensed Light"/>
+                <a:cs typeface="Open Sans Condensed Light"/>
+              </a:rPr>
+              <a:t>échantilloner</a:t>
+            </a:r>
+            <a:r>
+              <a:rPr lang="fr-FR" sz="2400" dirty="0" smtClean="0">
+                <a:latin typeface="Open Sans Condensed Light"/>
+                <a:ea typeface="Open Sans Condensed Light"/>
+                <a:cs typeface="Open Sans Condensed Light"/>
+              </a:rPr>
+              <a:t> des </a:t>
+            </a:r>
+            <a:r>
+              <a:rPr lang="fr-FR" sz="2400" b="1" dirty="0" smtClean="0">
+                <a:latin typeface="Open Sans Condensed Light"/>
+                <a:ea typeface="Open Sans Condensed Light"/>
+                <a:cs typeface="Open Sans Condensed Light"/>
+              </a:rPr>
+              <a:t>routeurs</a:t>
+            </a:r>
+            <a:endParaRPr lang="fr-FR" sz="2400" b="1" dirty="0" smtClean="0"/>
+          </a:p>
+        </p:txBody>
+      </p:sp>
+      <p:sp>
+        <p:nvSpPr>
+          <p:cNvPr id="4" name="TextBox 3"/>
+          <p:cNvSpPr txBox="1"/>
+          <p:nvPr/>
+        </p:nvSpPr>
+        <p:spPr>
+          <a:xfrm>
+            <a:off x="594341" y="2564904"/>
+            <a:ext cx="7955319" cy="1569660"/>
+          </a:xfrm>
+          <a:prstGeom prst="rect">
+            <a:avLst/>
+          </a:prstGeom>
+          <a:noFill/>
+        </p:spPr>
+        <p:txBody>
+          <a:bodyPr wrap="none" rtlCol="0">
+            <a:spAutoFit/>
+          </a:bodyPr>
+          <a:lstStyle/>
+          <a:p>
+            <a:pPr marL="285750" indent="-285750">
+              <a:buFont typeface="Arial" panose="020B0604020202020204" pitchFamily="34" charset="0"/>
+              <a:buChar char="•"/>
+            </a:pPr>
+            <a:r>
+              <a:rPr lang="fr-FR" sz="2400" dirty="0" smtClean="0"/>
+              <a:t>Sélection uniforme sur les adresses</a:t>
+            </a:r>
+          </a:p>
+          <a:p>
+            <a:pPr marL="285750" indent="-285750">
+              <a:buFont typeface="Arial" panose="020B0604020202020204" pitchFamily="34" charset="0"/>
+              <a:buChar char="•"/>
+            </a:pPr>
+            <a:r>
+              <a:rPr lang="fr-FR" sz="2400" dirty="0" smtClean="0"/>
+              <a:t>Probabilité de tirage d’un routeur = </a:t>
+            </a:r>
+            <a:r>
+              <a:rPr lang="fr-FR" sz="2400" dirty="0" err="1" smtClean="0"/>
+              <a:t>proportionelle</a:t>
+            </a:r>
+            <a:r>
+              <a:rPr lang="fr-FR" sz="2400" dirty="0" smtClean="0"/>
+              <a:t> à son nombre d’adresses</a:t>
+            </a:r>
+          </a:p>
+          <a:p>
+            <a:pPr marL="285750" indent="-285750">
+              <a:buFontTx/>
+              <a:buChar char="-"/>
+            </a:pPr>
+            <a:endParaRPr lang="fr-FR" sz="2400" dirty="0"/>
+          </a:p>
+          <a:p>
+            <a:pPr marL="285750" indent="-285750">
+              <a:buFont typeface="Wingdings" panose="05000000000000000000" pitchFamily="2" charset="2"/>
+              <a:buChar char="Ø"/>
+            </a:pPr>
+            <a:r>
+              <a:rPr lang="fr-FR" sz="2400" dirty="0" smtClean="0"/>
+              <a:t>Transformation de correction du biais :</a:t>
+            </a:r>
+            <a:endParaRPr lang="en-US" sz="2400" dirty="0"/>
+          </a:p>
+        </p:txBody>
+      </p:sp>
+      <p:pic>
+        <p:nvPicPr>
+          <p:cNvPr id="2050" name="Picture 2" descr="G:\misc\my-thesis\bias-correction-formula.png"/>
+          <p:cNvPicPr>
+            <a:picLocks noChangeAspect="1" noChangeArrowheads="1"/>
+          </p:cNvPicPr>
+          <p:nvPr/>
+        </p:nvPicPr>
+        <p:blipFill>
+          <a:blip r:embed="rId2">
+            <a:extLst>
+              <a:ext uri="{28A0092B-C50C-407E-A947-70E740481C1C}">
+                <a14:useLocalDpi xmlns:a14="http://schemas.microsoft.com/office/drawing/2010/main" val="0"/>
+              </a:ext>
+            </a:extLst>
+          </a:blip>
+          <a:srcRect/>
+          <a:stretch>
+            <a:fillRect/>
+          </a:stretch>
+        </p:blipFill>
+        <p:spPr bwMode="auto">
+          <a:xfrm>
+            <a:off x="2562225" y="4293096"/>
+            <a:ext cx="4019550" cy="1924050"/>
+          </a:xfrm>
+          <a:prstGeom prst="rect">
+            <a:avLst/>
+          </a:prstGeom>
+          <a:noFill/>
+          <a:extLst>
+            <a:ext uri="{909E8E84-426E-40DD-AFC4-6F175D3DCCD1}">
+              <a14:hiddenFill xmlns:a14="http://schemas.microsoft.com/office/drawing/2010/main">
+                <a:solidFill>
+                  <a:srgbClr val="FFFFFF"/>
+                </a:solidFill>
+              </a14:hiddenFill>
+            </a:ext>
+          </a:extLst>
+        </p:spPr>
+      </p:pic>
+    </p:spTree>
+    <p:extLst>
+      <p:ext uri="{BB962C8B-B14F-4D97-AF65-F5344CB8AC3E}">
+        <p14:creationId xmlns:p14="http://schemas.microsoft.com/office/powerpoint/2010/main" val="1024460363"/>
+      </p:ext>
+    </p:extLst>
+  </p:cSld>
+  <p:clrMapOvr>
+    <a:masterClrMapping/>
+  </p:clrMapOvr>
+</p:sld>
+</file>
+
+<file path=ppt/slides/slide44.xml><?xml version="1.0" encoding="utf-8"?>
+<p:sld xmlns:a="http://schemas.openxmlformats.org/drawingml/2006/main" xmlns:r="http://schemas.openxmlformats.org/officeDocument/2006/relationships" xmlns:p="http://schemas.openxmlformats.org/presentationml/2006/main">
+  <p:cSld>
+    <p:spTree>
+      <p:nvGrpSpPr>
+        <p:cNvPr id="1" name=""/>
+        <p:cNvGrpSpPr/>
+        <p:nvPr/>
+      </p:nvGrpSpPr>
+      <p:grpSpPr>
+        <a:xfrm>
+          <a:off x="0" y="0"/>
+          <a:ext cx="0" cy="0"/>
+          <a:chOff x="0" y="0"/>
+          <a:chExt cx="0" cy="0"/>
+        </a:xfrm>
+      </p:grpSpPr>
+      <p:sp>
+        <p:nvSpPr>
+          <p:cNvPr id="2" name="Title 1"/>
+          <p:cNvSpPr>
+            <a:spLocks noGrp="1"/>
+          </p:cNvSpPr>
+          <p:nvPr>
+            <p:ph type="title"/>
+          </p:nvPr>
+        </p:nvSpPr>
+        <p:spPr>
+          <a:xfrm>
+            <a:off x="457200" y="0"/>
+            <a:ext cx="8229600" cy="1115616"/>
+          </a:xfrm>
+        </p:spPr>
+        <p:txBody>
+          <a:bodyPr>
+            <a:normAutofit/>
+          </a:bodyPr>
+          <a:lstStyle/>
+          <a:p>
+            <a:r>
+              <a:rPr lang="fr-FR" sz="4000" dirty="0" smtClean="0"/>
+              <a:t>Validation de la </a:t>
+            </a:r>
+            <a:r>
+              <a:rPr lang="fr-FR" sz="4000" dirty="0" smtClean="0"/>
+              <a:t>méthode</a:t>
+            </a:r>
+            <a:endParaRPr lang="en-US" sz="4000" dirty="0"/>
+          </a:p>
+        </p:txBody>
+      </p:sp>
+      <p:sp>
+        <p:nvSpPr>
+          <p:cNvPr id="4" name="TextBox 3"/>
+          <p:cNvSpPr txBox="1"/>
+          <p:nvPr/>
+        </p:nvSpPr>
+        <p:spPr>
+          <a:xfrm>
+            <a:off x="1206880" y="1823913"/>
+            <a:ext cx="6337761" cy="3693319"/>
+          </a:xfrm>
+          <a:prstGeom prst="rect">
+            <a:avLst/>
+          </a:prstGeom>
+          <a:noFill/>
+        </p:spPr>
+        <p:txBody>
+          <a:bodyPr wrap="none" rtlCol="0">
+            <a:spAutoFit/>
+          </a:bodyPr>
+          <a:lstStyle/>
+          <a:p>
+            <a:pPr marL="457200" indent="-457200">
+              <a:buFont typeface="+mj-lt"/>
+              <a:buAutoNum type="arabicParenR"/>
+            </a:pPr>
+            <a:r>
+              <a:rPr lang="fr-FR" sz="2400" dirty="0" smtClean="0"/>
+              <a:t>Générer des graphes aléatoires selon des modèles usuels</a:t>
+            </a:r>
+            <a:endParaRPr lang="fr-FR" sz="2400" dirty="0" smtClean="0"/>
+          </a:p>
+          <a:p>
+            <a:pPr marL="228600" indent="-228600">
+              <a:buFont typeface="+mj-lt"/>
+              <a:buAutoNum type="arabicParenR"/>
+            </a:pPr>
+            <a:endParaRPr lang="fr-FR" dirty="0" smtClean="0"/>
+          </a:p>
+          <a:p>
+            <a:pPr marL="457200" indent="-457200">
+              <a:buFont typeface="+mj-lt"/>
+              <a:buAutoNum type="arabicParenR"/>
+            </a:pPr>
+            <a:r>
+              <a:rPr lang="fr-FR" sz="2400" dirty="0" smtClean="0"/>
+              <a:t>Tirer un grand nombre de nœuds, les </a:t>
+            </a:r>
+            <a:r>
+              <a:rPr lang="fr-FR" sz="2400" i="1" dirty="0" smtClean="0"/>
+              <a:t>moniteurs</a:t>
+            </a:r>
+          </a:p>
+          <a:p>
+            <a:pPr marL="228600" indent="-228600">
+              <a:buFont typeface="+mj-lt"/>
+              <a:buAutoNum type="arabicParenR"/>
+            </a:pPr>
+            <a:endParaRPr lang="fr-FR" dirty="0" smtClean="0"/>
+          </a:p>
+          <a:p>
+            <a:pPr marL="457200" indent="-457200">
+              <a:buFont typeface="+mj-lt"/>
+              <a:buAutoNum type="arabicParenR"/>
+            </a:pPr>
+            <a:r>
+              <a:rPr lang="fr-FR" sz="2400" dirty="0" smtClean="0"/>
+              <a:t>Considérer que </a:t>
+            </a:r>
+            <a:r>
+              <a:rPr lang="fr-FR" sz="2400" i="1" dirty="0" smtClean="0"/>
+              <a:t>tous les nœuds </a:t>
+            </a:r>
+            <a:r>
+              <a:rPr lang="fr-FR" sz="2400" i="1" dirty="0" smtClean="0"/>
+              <a:t> </a:t>
+            </a:r>
+            <a:r>
+              <a:rPr lang="fr-FR" sz="2400" dirty="0" smtClean="0"/>
+              <a:t>sont </a:t>
+            </a:r>
+            <a:r>
+              <a:rPr lang="fr-FR" sz="2400" dirty="0" smtClean="0"/>
+              <a:t>des cibles</a:t>
+            </a:r>
+          </a:p>
+          <a:p>
+            <a:pPr marL="228600" indent="-228600">
+              <a:buFont typeface="+mj-lt"/>
+              <a:buAutoNum type="arabicParenR"/>
+            </a:pPr>
+            <a:endParaRPr lang="fr-FR" dirty="0" smtClean="0"/>
+          </a:p>
+          <a:p>
+            <a:pPr marL="457200" indent="-457200">
+              <a:buFont typeface="+mj-lt"/>
+              <a:buAutoNum type="arabicParenR"/>
+            </a:pPr>
+            <a:r>
+              <a:rPr lang="fr-FR" sz="2400" dirty="0" smtClean="0"/>
+              <a:t>Simuler </a:t>
+            </a:r>
+            <a:r>
+              <a:rPr lang="fr-FR" sz="2400" i="1" dirty="0" smtClean="0"/>
+              <a:t>UDP Ping  </a:t>
+            </a:r>
+            <a:r>
+              <a:rPr lang="fr-FR" sz="2400" dirty="0" smtClean="0"/>
+              <a:t>par </a:t>
+            </a:r>
+            <a:r>
+              <a:rPr lang="fr-FR" sz="2400" dirty="0" smtClean="0"/>
+              <a:t>des plus courts chemins</a:t>
+            </a:r>
+          </a:p>
+          <a:p>
+            <a:pPr marL="228600" indent="-228600">
+              <a:buFont typeface="+mj-lt"/>
+              <a:buAutoNum type="arabicParenR"/>
+            </a:pPr>
+            <a:endParaRPr lang="fr-FR" dirty="0" smtClean="0"/>
+          </a:p>
+          <a:p>
+            <a:pPr marL="457200" indent="-457200">
+              <a:buFont typeface="+mj-lt"/>
+              <a:buAutoNum type="arabicParenR"/>
+            </a:pPr>
+            <a:r>
+              <a:rPr lang="fr-FR" sz="2400" dirty="0" smtClean="0"/>
+              <a:t>Calculer le degré de chaque cible</a:t>
+            </a:r>
+          </a:p>
+          <a:p>
+            <a:pPr marL="228600" indent="-228600">
+              <a:buFont typeface="+mj-lt"/>
+              <a:buAutoNum type="arabicParenR"/>
+            </a:pPr>
+            <a:endParaRPr lang="fr-FR" dirty="0" smtClean="0"/>
+          </a:p>
+          <a:p>
+            <a:pPr marL="457200" indent="-457200">
+              <a:buFont typeface="+mj-lt"/>
+              <a:buAutoNum type="arabicParenR"/>
+            </a:pPr>
+            <a:r>
+              <a:rPr lang="fr-FR" sz="2400" dirty="0" smtClean="0"/>
+              <a:t>Comparer les distributions de degrés mesurée et réelle</a:t>
+            </a:r>
+            <a:endParaRPr lang="en-US" sz="2400" dirty="0"/>
+          </a:p>
+        </p:txBody>
+      </p:sp>
+    </p:spTree>
+    <p:extLst>
+      <p:ext uri="{BB962C8B-B14F-4D97-AF65-F5344CB8AC3E}">
+        <p14:creationId xmlns:p14="http://schemas.microsoft.com/office/powerpoint/2010/main" val="2777235804"/>
+      </p:ext>
+    </p:extLst>
+  </p:cSld>
+  <p:clrMapOvr>
+    <a:masterClrMapping/>
+  </p:clrMapOvr>
+</p:sld>
+</file>
+
+<file path=ppt/slides/slide45.xml><?xml version="1.0" encoding="utf-8"?>
+<p:sld xmlns:a="http://schemas.openxmlformats.org/drawingml/2006/main" xmlns:r="http://schemas.openxmlformats.org/officeDocument/2006/relationships" xmlns:p="http://schemas.openxmlformats.org/presentationml/2006/main">
+  <p:cSld>
+    <p:spTree>
+      <p:nvGrpSpPr>
+        <p:cNvPr id="1" name=""/>
+        <p:cNvGrpSpPr/>
+        <p:nvPr/>
+      </p:nvGrpSpPr>
+      <p:grpSpPr>
+        <a:xfrm>
+          <a:off x="0" y="0"/>
+          <a:ext cx="0" cy="0"/>
+          <a:chOff x="0" y="0"/>
+          <a:chExt cx="0" cy="0"/>
+        </a:xfrm>
+      </p:grpSpPr>
+      <p:sp>
+        <p:nvSpPr>
+          <p:cNvPr id="2" name="Title 1"/>
+          <p:cNvSpPr>
+            <a:spLocks noGrp="1"/>
+          </p:cNvSpPr>
+          <p:nvPr>
+            <p:ph type="title"/>
+          </p:nvPr>
+        </p:nvSpPr>
+        <p:spPr>
+          <a:xfrm>
+            <a:off x="457200" y="0"/>
+            <a:ext cx="8229600" cy="1115616"/>
+          </a:xfrm>
+        </p:spPr>
+        <p:txBody>
+          <a:bodyPr>
+            <a:normAutofit/>
+          </a:bodyPr>
+          <a:lstStyle/>
+          <a:p>
+            <a:r>
+              <a:rPr lang="fr-FR" sz="4000" dirty="0" smtClean="0"/>
+              <a:t>Mesure réelle sur </a:t>
+            </a:r>
+            <a:r>
+              <a:rPr lang="fr-FR" sz="4000" dirty="0" err="1" smtClean="0"/>
+              <a:t>PlanetLab</a:t>
+            </a:r>
+            <a:endParaRPr lang="en-US" sz="4000" dirty="0"/>
+          </a:p>
+        </p:txBody>
+      </p:sp>
+      <p:sp>
+        <p:nvSpPr>
+          <p:cNvPr id="4" name="TextBox 3"/>
+          <p:cNvSpPr txBox="1"/>
+          <p:nvPr/>
+        </p:nvSpPr>
+        <p:spPr>
+          <a:xfrm>
+            <a:off x="1018880" y="1823913"/>
+            <a:ext cx="7106241" cy="2968248"/>
+          </a:xfrm>
+          <a:prstGeom prst="rect">
+            <a:avLst/>
+          </a:prstGeom>
+          <a:noFill/>
+        </p:spPr>
+        <p:txBody>
+          <a:bodyPr wrap="none" rtlCol="0">
+            <a:spAutoFit/>
+          </a:bodyPr>
+          <a:lstStyle/>
+          <a:p>
+            <a:pPr marL="457200" indent="-457200">
+              <a:lnSpc>
+                <a:spcPct val="150000"/>
+              </a:lnSpc>
+              <a:buFont typeface="Arial" panose="020B0604020202020204" pitchFamily="34" charset="0"/>
+              <a:buChar char="•"/>
+            </a:pPr>
+            <a:r>
+              <a:rPr lang="fr-FR" sz="3200" dirty="0" smtClean="0"/>
+              <a:t>700 moniteurs initialement</a:t>
+            </a:r>
+          </a:p>
+          <a:p>
+            <a:pPr marL="457200" indent="-457200">
+              <a:lnSpc>
+                <a:spcPct val="150000"/>
+              </a:lnSpc>
+              <a:buFont typeface="Arial" panose="020B0604020202020204" pitchFamily="34" charset="0"/>
+              <a:buChar char="•"/>
+            </a:pPr>
+            <a:r>
+              <a:rPr lang="fr-FR" sz="3200" dirty="0" smtClean="0"/>
+              <a:t>3</a:t>
+            </a:r>
+            <a:r>
+              <a:rPr lang="fr-FR" sz="3200" dirty="0" smtClean="0">
+                <a:ea typeface="Open Sans Condensed Light"/>
+                <a:cs typeface="Open Sans Condensed Light"/>
+              </a:rPr>
+              <a:t>•</a:t>
+            </a:r>
+            <a:r>
+              <a:rPr lang="fr-FR" sz="3200" dirty="0" smtClean="0"/>
+              <a:t>10</a:t>
+            </a:r>
+            <a:r>
+              <a:rPr lang="fr-FR" sz="3200" baseline="30000" dirty="0" smtClean="0"/>
+              <a:t>6</a:t>
+            </a:r>
+            <a:r>
+              <a:rPr lang="fr-FR" sz="3200" dirty="0" smtClean="0"/>
+              <a:t> cibles initiales </a:t>
+            </a:r>
+            <a:r>
+              <a:rPr lang="fr-FR" sz="3200" dirty="0" err="1" smtClean="0"/>
+              <a:t>échantillonées</a:t>
+            </a:r>
+            <a:r>
+              <a:rPr lang="fr-FR" sz="3200" dirty="0" smtClean="0"/>
+              <a:t> en 10 heures</a:t>
+            </a:r>
+          </a:p>
+          <a:p>
+            <a:pPr marL="457200" indent="-457200">
+              <a:lnSpc>
+                <a:spcPct val="150000"/>
+              </a:lnSpc>
+              <a:buFont typeface="Arial" panose="020B0604020202020204" pitchFamily="34" charset="0"/>
+              <a:buChar char="•"/>
+            </a:pPr>
+            <a:r>
+              <a:rPr lang="fr-FR" sz="3200" dirty="0" smtClean="0"/>
+              <a:t>Mesure répétée 3 fois, chacune durant 4 heures</a:t>
+            </a:r>
+          </a:p>
+          <a:p>
+            <a:pPr marL="457200" indent="-457200">
+              <a:lnSpc>
+                <a:spcPct val="150000"/>
+              </a:lnSpc>
+              <a:buFont typeface="Arial" panose="020B0604020202020204" pitchFamily="34" charset="0"/>
+              <a:buChar char="•"/>
+            </a:pPr>
+            <a:r>
+              <a:rPr lang="fr-FR" sz="3200" dirty="0" smtClean="0"/>
+              <a:t>5600 cibles dans le cœur après filtrage</a:t>
+            </a:r>
+            <a:endParaRPr lang="en-US" sz="2400" dirty="0"/>
+          </a:p>
+        </p:txBody>
+      </p:sp>
+    </p:spTree>
+    <p:extLst>
+      <p:ext uri="{BB962C8B-B14F-4D97-AF65-F5344CB8AC3E}">
+        <p14:creationId xmlns:p14="http://schemas.microsoft.com/office/powerpoint/2010/main" val="2949665774"/>
+      </p:ext>
+    </p:extLst>
+  </p:cSld>
+  <p:clrMapOvr>
+    <a:masterClrMapping/>
+  </p:clrMapOvr>
+</p:sld>
+</file>
+
+<file path=ppt/slides/slide46.xml><?xml version="1.0" encoding="utf-8"?>
+<p:sld xmlns:a="http://schemas.openxmlformats.org/drawingml/2006/main" xmlns:r="http://schemas.openxmlformats.org/officeDocument/2006/relationships" xmlns:p="http://schemas.openxmlformats.org/presentationml/2006/main">
+  <p:cSld>
+    <p:spTree>
+      <p:nvGrpSpPr>
+        <p:cNvPr id="1" name=""/>
+        <p:cNvGrpSpPr/>
+        <p:nvPr/>
+      </p:nvGrpSpPr>
+      <p:grpSpPr>
+        <a:xfrm>
+          <a:off x="0" y="0"/>
+          <a:ext cx="0" cy="0"/>
+          <a:chOff x="0" y="0"/>
+          <a:chExt cx="0" cy="0"/>
+        </a:xfrm>
+      </p:grpSpPr>
+      <p:sp>
+        <p:nvSpPr>
+          <p:cNvPr id="2" name="Title 1"/>
+          <p:cNvSpPr>
+            <a:spLocks noGrp="1"/>
+          </p:cNvSpPr>
+          <p:nvPr>
+            <p:ph type="title"/>
+          </p:nvPr>
+        </p:nvSpPr>
+        <p:spPr>
+          <a:xfrm>
+            <a:off x="457200" y="0"/>
+            <a:ext cx="8229600" cy="1115616"/>
+          </a:xfrm>
+        </p:spPr>
+        <p:txBody>
+          <a:bodyPr>
+            <a:normAutofit/>
+          </a:bodyPr>
+          <a:lstStyle/>
+          <a:p>
+            <a:r>
+              <a:rPr lang="fr-FR" sz="4000" dirty="0" smtClean="0"/>
+              <a:t>Mesure réelle sur </a:t>
+            </a:r>
+            <a:r>
+              <a:rPr lang="fr-FR" sz="4000" dirty="0" err="1" smtClean="0"/>
+              <a:t>PlanetLab</a:t>
+            </a:r>
+            <a:endParaRPr lang="en-US" sz="4000" dirty="0"/>
+          </a:p>
+        </p:txBody>
+      </p:sp>
+      <p:sp>
+        <p:nvSpPr>
+          <p:cNvPr id="3" name="TextBox 2"/>
+          <p:cNvSpPr txBox="1"/>
+          <p:nvPr/>
+        </p:nvSpPr>
+        <p:spPr>
+          <a:xfrm>
+            <a:off x="2411760" y="5589240"/>
+            <a:ext cx="4261616" cy="830997"/>
+          </a:xfrm>
+          <a:prstGeom prst="rect">
+            <a:avLst/>
+          </a:prstGeom>
+          <a:noFill/>
+        </p:spPr>
+        <p:txBody>
+          <a:bodyPr wrap="none" rtlCol="0">
+            <a:spAutoFit/>
+          </a:bodyPr>
+          <a:lstStyle/>
+          <a:p>
+            <a:r>
+              <a:rPr lang="fr-FR" sz="2400" i="1" dirty="0" smtClean="0"/>
+              <a:t>x</a:t>
+            </a:r>
+            <a:r>
+              <a:rPr lang="fr-FR" sz="2400" dirty="0" smtClean="0"/>
+              <a:t>  : </a:t>
+            </a:r>
+            <a:r>
+              <a:rPr lang="fr-FR" sz="2400" dirty="0" smtClean="0"/>
+              <a:t>nombre d’interfaces (degré physique)</a:t>
+            </a:r>
+            <a:endParaRPr lang="fr-FR" sz="2400" dirty="0" smtClean="0"/>
+          </a:p>
+          <a:p>
+            <a:r>
+              <a:rPr lang="fr-FR" sz="2400" i="1" dirty="0" smtClean="0"/>
+              <a:t>y</a:t>
+            </a:r>
+            <a:r>
+              <a:rPr lang="fr-FR" sz="2400" dirty="0" smtClean="0"/>
+              <a:t>  : </a:t>
+            </a:r>
+            <a:r>
+              <a:rPr lang="fr-FR" sz="2400" dirty="0" smtClean="0"/>
+              <a:t>fraction des routeurs</a:t>
+            </a:r>
+            <a:endParaRPr lang="en-US" sz="2400" dirty="0"/>
+          </a:p>
+        </p:txBody>
+      </p:sp>
+      <p:pic>
+        <p:nvPicPr>
+          <p:cNvPr id="6146" name="Picture 2"/>
+          <p:cNvPicPr>
+            <a:picLocks noChangeAspect="1" noChangeArrowheads="1"/>
+          </p:cNvPicPr>
+          <p:nvPr/>
+        </p:nvPicPr>
+        <p:blipFill>
+          <a:blip r:embed="rId2">
+            <a:extLst>
+              <a:ext uri="{28A0092B-C50C-407E-A947-70E740481C1C}">
+                <a14:useLocalDpi xmlns:a14="http://schemas.microsoft.com/office/drawing/2010/main" val="0"/>
+              </a:ext>
+            </a:extLst>
+          </a:blip>
+          <a:stretch>
+            <a:fillRect/>
+          </a:stretch>
+        </p:blipFill>
+        <p:spPr bwMode="auto">
+          <a:xfrm>
+            <a:off x="1428207" y="1133154"/>
+            <a:ext cx="5711522" cy="4240062"/>
+          </a:xfrm>
+          <a:prstGeom prst="rect">
+            <a:avLst/>
+          </a:prstGeom>
+          <a:noFill/>
+          <a:extLst>
+            <a:ext uri="{909E8E84-426E-40DD-AFC4-6F175D3DCCD1}">
+              <a14:hiddenFill xmlns:a14="http://schemas.microsoft.com/office/drawing/2010/main">
+                <a:solidFill>
+                  <a:srgbClr val="FFFFFF"/>
+                </a:solidFill>
+              </a14:hiddenFill>
+            </a:ext>
+          </a:extLst>
+        </p:spPr>
+      </p:pic>
+    </p:spTree>
+    <p:extLst>
+      <p:ext uri="{BB962C8B-B14F-4D97-AF65-F5344CB8AC3E}">
+        <p14:creationId xmlns:p14="http://schemas.microsoft.com/office/powerpoint/2010/main" val="2227629353"/>
+      </p:ext>
+    </p:extLst>
+  </p:cSld>
+  <p:clrMapOvr>
+    <a:masterClrMapping/>
+  </p:clrMapOvr>
+</p:sld>
+</file>
+
+<file path=ppt/slides/slide47.xml><?xml version="1.0" encoding="utf-8"?>
+<p:sld xmlns:a="http://schemas.openxmlformats.org/drawingml/2006/main" xmlns:r="http://schemas.openxmlformats.org/officeDocument/2006/relationships" xmlns:p="http://schemas.openxmlformats.org/presentationml/2006/main">
+  <p:cSld>
+    <p:spTree>
+      <p:nvGrpSpPr>
+        <p:cNvPr id="1" name=""/>
+        <p:cNvGrpSpPr/>
+        <p:nvPr/>
+      </p:nvGrpSpPr>
+      <p:grpSpPr>
+        <a:xfrm>
+          <a:off x="0" y="0"/>
+          <a:ext cx="0" cy="0"/>
+          <a:chOff x="0" y="0"/>
+          <a:chExt cx="0" cy="0"/>
+        </a:xfrm>
+      </p:grpSpPr>
+      <p:sp>
+        <p:nvSpPr>
+          <p:cNvPr id="2" name="Title 1"/>
+          <p:cNvSpPr>
+            <a:spLocks noGrp="1"/>
+          </p:cNvSpPr>
+          <p:nvPr>
+            <p:ph type="title"/>
+          </p:nvPr>
+        </p:nvSpPr>
+        <p:spPr>
+          <a:xfrm>
+            <a:off x="457200" y="0"/>
+            <a:ext cx="8229600" cy="1115616"/>
+          </a:xfrm>
+        </p:spPr>
+        <p:txBody>
+          <a:bodyPr>
+            <a:normAutofit/>
+          </a:bodyPr>
+          <a:lstStyle/>
+          <a:p>
+            <a:r>
+              <a:rPr lang="fr-FR" sz="4000" dirty="0" smtClean="0"/>
+              <a:t>Validation </a:t>
+            </a:r>
+            <a:r>
+              <a:rPr lang="fr-FR" sz="4000" dirty="0" smtClean="0"/>
+              <a:t>des résultats</a:t>
+            </a:r>
+            <a:endParaRPr lang="en-US" sz="4000" dirty="0"/>
+          </a:p>
+        </p:txBody>
+      </p:sp>
+      <p:sp>
+        <p:nvSpPr>
+          <p:cNvPr id="3" name="TextBox 2"/>
+          <p:cNvSpPr txBox="1"/>
+          <p:nvPr/>
+        </p:nvSpPr>
+        <p:spPr>
+          <a:xfrm>
+            <a:off x="515013" y="2304365"/>
+            <a:ext cx="8113974" cy="2249270"/>
+          </a:xfrm>
+          <a:prstGeom prst="rect">
+            <a:avLst/>
+          </a:prstGeom>
+          <a:noFill/>
+        </p:spPr>
+        <p:txBody>
+          <a:bodyPr wrap="square" rtlCol="0">
+            <a:spAutoFit/>
+          </a:bodyPr>
+          <a:lstStyle/>
+          <a:p>
+            <a:pPr marL="285750" indent="-285750">
+              <a:lnSpc>
+                <a:spcPct val="150000"/>
+              </a:lnSpc>
+              <a:buFont typeface="Arial" panose="020B0604020202020204" pitchFamily="34" charset="0"/>
+              <a:buChar char="•"/>
+            </a:pPr>
+            <a:r>
+              <a:rPr lang="fr-FR" sz="2400" dirty="0" smtClean="0"/>
+              <a:t>Réinjection de la distribution mesurée dans les simulations (</a:t>
+            </a:r>
+            <a:r>
+              <a:rPr lang="fr-FR" sz="2400" dirty="0" err="1" smtClean="0"/>
+              <a:t>bootstrapping</a:t>
+            </a:r>
+            <a:r>
+              <a:rPr lang="fr-FR" sz="2400" dirty="0" smtClean="0"/>
+              <a:t>)</a:t>
+            </a:r>
+          </a:p>
+          <a:p>
+            <a:pPr marL="285750" indent="-285750">
+              <a:lnSpc>
+                <a:spcPct val="150000"/>
+              </a:lnSpc>
+              <a:buFont typeface="Arial" panose="020B0604020202020204" pitchFamily="34" charset="0"/>
+              <a:buChar char="•"/>
+            </a:pPr>
+            <a:r>
+              <a:rPr lang="fr-FR" sz="2400" dirty="0" smtClean="0"/>
+              <a:t>Evaluation de la qualité de l’ensemble des moniteurs</a:t>
+            </a:r>
+          </a:p>
+          <a:p>
+            <a:pPr marL="1200150" lvl="2" indent="-285750">
+              <a:lnSpc>
+                <a:spcPct val="150000"/>
+              </a:lnSpc>
+              <a:buFont typeface="Arial" panose="020B0604020202020204" pitchFamily="34" charset="0"/>
+              <a:buChar char="•"/>
+            </a:pPr>
+            <a:r>
+              <a:rPr lang="fr-FR" sz="2400" dirty="0" smtClean="0"/>
+              <a:t>Classes de </a:t>
+            </a:r>
+            <a:r>
+              <a:rPr lang="fr-FR" sz="2400" dirty="0" err="1" smtClean="0"/>
+              <a:t>colocalisation</a:t>
+            </a:r>
+            <a:endParaRPr lang="fr-FR" sz="2400" dirty="0" smtClean="0"/>
+          </a:p>
+          <a:p>
+            <a:pPr marL="1200150" lvl="2" indent="-285750">
+              <a:lnSpc>
+                <a:spcPct val="150000"/>
+              </a:lnSpc>
+              <a:buFont typeface="Arial" panose="020B0604020202020204" pitchFamily="34" charset="0"/>
+              <a:buChar char="•"/>
+            </a:pPr>
+            <a:r>
+              <a:rPr lang="fr-FR" sz="2400" dirty="0" smtClean="0"/>
+              <a:t>Converge des résultats</a:t>
+            </a:r>
+            <a:endParaRPr lang="en-US" sz="2400" dirty="0"/>
+          </a:p>
+        </p:txBody>
+      </p:sp>
+    </p:spTree>
+    <p:extLst>
+      <p:ext uri="{BB962C8B-B14F-4D97-AF65-F5344CB8AC3E}">
+        <p14:creationId xmlns:p14="http://schemas.microsoft.com/office/powerpoint/2010/main" val="566575952"/>
+      </p:ext>
+    </p:extLst>
+  </p:cSld>
+  <p:clrMapOvr>
+    <a:masterClrMapping/>
+  </p:clrMapOvr>
+</p:sld>
+</file>
+
+<file path=ppt/slides/slide48.xml><?xml version="1.0" encoding="utf-8"?>
+<p:sld xmlns:a="http://schemas.openxmlformats.org/drawingml/2006/main" xmlns:r="http://schemas.openxmlformats.org/officeDocument/2006/relationships" xmlns:p="http://schemas.openxmlformats.org/presentationml/2006/main">
+  <p:cSld>
+    <p:spTree>
+      <p:nvGrpSpPr>
+        <p:cNvPr id="1" name=""/>
+        <p:cNvGrpSpPr/>
+        <p:nvPr/>
+      </p:nvGrpSpPr>
+      <p:grpSpPr>
+        <a:xfrm>
+          <a:off x="0" y="0"/>
+          <a:ext cx="0" cy="0"/>
+          <a:chOff x="0" y="0"/>
+          <a:chExt cx="0" cy="0"/>
+        </a:xfrm>
+      </p:grpSpPr>
+      <p:sp>
+        <p:nvSpPr>
+          <p:cNvPr id="2" name="Title 1"/>
+          <p:cNvSpPr>
+            <a:spLocks noGrp="1"/>
+          </p:cNvSpPr>
+          <p:nvPr>
+            <p:ph type="title"/>
+          </p:nvPr>
+        </p:nvSpPr>
+        <p:spPr>
+          <a:xfrm>
+            <a:off x="457200" y="0"/>
+            <a:ext cx="8229600" cy="1115616"/>
+          </a:xfrm>
+        </p:spPr>
+        <p:txBody>
+          <a:bodyPr>
+            <a:normAutofit/>
+          </a:bodyPr>
+          <a:lstStyle/>
+          <a:p>
+            <a:r>
+              <a:rPr lang="fr-FR" sz="4000" dirty="0" smtClean="0"/>
+              <a:t>Limites de l’approche</a:t>
+            </a:r>
+            <a:endParaRPr lang="en-US" sz="4000" dirty="0"/>
+          </a:p>
+        </p:txBody>
+      </p:sp>
+    </p:spTree>
+    <p:extLst>
+      <p:ext uri="{BB962C8B-B14F-4D97-AF65-F5344CB8AC3E}">
+        <p14:creationId xmlns:p14="http://schemas.microsoft.com/office/powerpoint/2010/main" val="3285149023"/>
+      </p:ext>
+    </p:extLst>
+  </p:cSld>
+  <p:clrMapOvr>
+    <a:masterClrMapping/>
+  </p:clrMapOvr>
+</p:sld>
+</file>
+
+<file path=ppt/slides/slide49.xml><?xml version="1.0" encoding="utf-8"?>
+<p:sld xmlns:a="http://schemas.openxmlformats.org/drawingml/2006/main" xmlns:r="http://schemas.openxmlformats.org/officeDocument/2006/relationships" xmlns:p="http://schemas.openxmlformats.org/presentationml/2006/main">
+  <p:cSld>
+    <p:spTree>
+      <p:nvGrpSpPr>
+        <p:cNvPr id="1" name=""/>
+        <p:cNvGrpSpPr/>
+        <p:nvPr/>
+      </p:nvGrpSpPr>
+      <p:grpSpPr>
+        <a:xfrm>
+          <a:off x="0" y="0"/>
+          <a:ext cx="0" cy="0"/>
+          <a:chOff x="0" y="0"/>
+          <a:chExt cx="0" cy="0"/>
+        </a:xfrm>
+      </p:grpSpPr>
+      <p:sp>
+        <p:nvSpPr>
+          <p:cNvPr id="2" name="Title 1"/>
+          <p:cNvSpPr>
+            <a:spLocks noGrp="1"/>
+          </p:cNvSpPr>
+          <p:nvPr>
+            <p:ph type="ctrTitle"/>
+          </p:nvPr>
+        </p:nvSpPr>
+        <p:spPr>
+          <a:xfrm>
+            <a:off x="685800" y="2693988"/>
+            <a:ext cx="7772400" cy="1470025"/>
+          </a:xfrm>
+        </p:spPr>
+        <p:txBody>
+          <a:bodyPr>
+            <a:normAutofit/>
+          </a:bodyPr>
+          <a:lstStyle/>
+          <a:p>
+            <a:r>
+              <a:rPr lang="fr-FR" sz="3600" dirty="0" smtClean="0"/>
+              <a:t>Tables de transmission</a:t>
+            </a:r>
+            <a:endParaRPr lang="en-US" sz="3600" dirty="0"/>
+          </a:p>
+        </p:txBody>
+      </p:sp>
+    </p:spTree>
+    <p:extLst>
+      <p:ext uri="{BB962C8B-B14F-4D97-AF65-F5344CB8AC3E}">
+        <p14:creationId xmlns:p14="http://schemas.microsoft.com/office/powerpoint/2010/main" val="161136269"/>
+      </p:ext>
+    </p:extLst>
+  </p:cSld>
+  <p:clrMapOvr>
+    <a:masterClrMapping/>
+  </p:clrMapOvr>
+</p:sld>
+</file>
+
 <file path=ppt/slides/slide5.xml><?xml version="1.0" encoding="utf-8"?>
 <p:sld xmlns:a="http://schemas.openxmlformats.org/drawingml/2006/main" xmlns:r="http://schemas.openxmlformats.org/officeDocument/2006/relationships" xmlns:p="http://schemas.openxmlformats.org/presentationml/2006/main">
   <p:cSld>
@@ -8843,6 +12977,70 @@
     <p:extLst>
       <p:ext uri="{BB962C8B-B14F-4D97-AF65-F5344CB8AC3E}">
         <p14:creationId xmlns:p14="http://schemas.microsoft.com/office/powerpoint/2010/main" val="1685268997"/>
+      </p:ext>
+    </p:extLst>
+  </p:cSld>
+  <p:clrMapOvr>
+    <a:masterClrMapping/>
+  </p:clrMapOvr>
+</p:sld>
+</file>
+
+<file path=ppt/slides/slide50.xml><?xml version="1.0" encoding="utf-8"?>
+<p:sld xmlns:a="http://schemas.openxmlformats.org/drawingml/2006/main" xmlns:r="http://schemas.openxmlformats.org/officeDocument/2006/relationships" xmlns:p="http://schemas.openxmlformats.org/presentationml/2006/main">
+  <p:cSld>
+    <p:spTree>
+      <p:nvGrpSpPr>
+        <p:cNvPr id="1" name=""/>
+        <p:cNvGrpSpPr/>
+        <p:nvPr/>
+      </p:nvGrpSpPr>
+      <p:grpSpPr>
+        <a:xfrm>
+          <a:off x="0" y="0"/>
+          <a:ext cx="0" cy="0"/>
+          <a:chOff x="0" y="0"/>
+          <a:chExt cx="0" cy="0"/>
+        </a:xfrm>
+      </p:grpSpPr>
+      <p:sp>
+        <p:nvSpPr>
+          <p:cNvPr id="2" name="Title 1"/>
+          <p:cNvSpPr>
+            <a:spLocks noGrp="1"/>
+          </p:cNvSpPr>
+          <p:nvPr>
+            <p:ph type="ctrTitle"/>
+          </p:nvPr>
+        </p:nvSpPr>
+        <p:spPr>
+          <a:xfrm>
+            <a:off x="685800" y="2693988"/>
+            <a:ext cx="7772400" cy="1470025"/>
+          </a:xfrm>
+        </p:spPr>
+        <p:txBody>
+          <a:bodyPr>
+            <a:normAutofit/>
+          </a:bodyPr>
+          <a:lstStyle/>
+          <a:p>
+            <a:r>
+              <a:rPr lang="fr-FR" sz="3600" dirty="0" smtClean="0"/>
+              <a:t>Conclusions </a:t>
+            </a:r>
+            <a:r>
+              <a:rPr lang="fr-FR" sz="3600" smtClean="0"/>
+              <a:t>et perspectives</a:t>
+            </a:r>
+            <a:endParaRPr lang="en-US" sz="3600" dirty="0"/>
+          </a:p>
+        </p:txBody>
+      </p:sp>
+    </p:spTree>
+    <p:extLst>
+      <p:ext uri="{BB962C8B-B14F-4D97-AF65-F5344CB8AC3E}">
+        <p14:creationId xmlns:p14="http://schemas.microsoft.com/office/powerpoint/2010/main" val="161136269"/>
       </p:ext>
     </p:extLst>
   </p:cSld>
@@ -9878,7 +14076,7 @@
             <a:p>
               <a:pPr algn="ctr"/>
               <a:r>
-                <a:rPr lang="fr-FR" smtClean="0"/>
+                <a:rPr lang="fr-FR" dirty="0" smtClean="0"/>
                 <a:t>213.245.254.151</a:t>
               </a:r>
               <a:endParaRPr lang="en-US" dirty="0"/>
@@ -10771,15 +14969,7 @@
           <a:p>
             <a:r>
               <a:rPr lang="fr-FR" sz="4000" dirty="0" smtClean="0"/>
-              <a:t>Internet </a:t>
-            </a:r>
-            <a:r>
-              <a:rPr lang="fr-FR" sz="4000" dirty="0" smtClean="0"/>
-              <a:t>: une </a:t>
-            </a:r>
-            <a:r>
-              <a:rPr lang="fr-FR" sz="4000" dirty="0" smtClean="0"/>
-              <a:t>boîte noire ?</a:t>
+              <a:t>Internet : une boîte noire ?</a:t>
             </a:r>
             <a:endParaRPr lang="en-US" sz="4000" dirty="0"/>
           </a:p>
@@ -10863,13 +15053,8 @@
             </a:pPr>
             <a:r>
               <a:rPr lang="fr-FR" sz="2000" dirty="0" smtClean="0"/>
-              <a:t>Pas de carte </a:t>
-            </a:r>
-            <a:r>
-              <a:rPr lang="fr-FR" sz="2000" dirty="0" smtClean="0"/>
-              <a:t>complète</a:t>
-            </a:r>
-            <a:endParaRPr lang="fr-FR" sz="2000" dirty="0" smtClean="0"/>
+              <a:t>Pas de carte complète</a:t>
+            </a:r>
           </a:p>
         </p:txBody>
       </p:sp>

</xml_diff>